<commit_message>
Update the design section and the
</commit_message>
<xml_diff>
--- a/OT_System_Attack_Case_Study/Railway_Train_Control/img/designDoc.pptx
+++ b/OT_System_Attack_Case_Study/Railway_Train_Control/img/designDoc.pptx
@@ -4,12 +4,15 @@
   <p:sldMasterIdLst>
     <p:sldMasterId id="2147483648" r:id="rId1"/>
   </p:sldMasterIdLst>
+  <p:notesMasterIdLst>
+    <p:notesMasterId r:id="rId7"/>
+  </p:notesMasterIdLst>
   <p:sldIdLst>
     <p:sldId id="256" r:id="rId2"/>
     <p:sldId id="258" r:id="rId3"/>
     <p:sldId id="257" r:id="rId4"/>
     <p:sldId id="259" r:id="rId5"/>
-    <p:sldId id="260" r:id="rId6"/>
+    <p:sldId id="292" r:id="rId6"/>
   </p:sldIdLst>
   <p:sldSz cx="12192000" cy="6858000"/>
   <p:notesSz cx="6858000" cy="9144000"/>
@@ -116,6 +119,440 @@
 </p:presentation>
 </file>
 
+<file path=ppt/notesMasters/notesMaster1.xml><?xml version="1.0" encoding="utf-8"?>
+<p:notesMaster xmlns:a="http://schemas.openxmlformats.org/drawingml/2006/main" xmlns:r="http://schemas.openxmlformats.org/officeDocument/2006/relationships" xmlns:p="http://schemas.openxmlformats.org/presentationml/2006/main">
+  <p:cSld>
+    <p:bg>
+      <p:bgRef idx="1001">
+        <a:schemeClr val="bg1"/>
+      </p:bgRef>
+    </p:bg>
+    <p:spTree>
+      <p:nvGrpSpPr>
+        <p:cNvPr id="1" name=""/>
+        <p:cNvGrpSpPr/>
+        <p:nvPr/>
+      </p:nvGrpSpPr>
+      <p:grpSpPr>
+        <a:xfrm>
+          <a:off x="0" y="0"/>
+          <a:ext cx="0" cy="0"/>
+          <a:chOff x="0" y="0"/>
+          <a:chExt cx="0" cy="0"/>
+        </a:xfrm>
+      </p:grpSpPr>
+      <p:sp>
+        <p:nvSpPr>
+          <p:cNvPr id="2" name="Header Placeholder 1"/>
+          <p:cNvSpPr>
+            <a:spLocks noGrp="1"/>
+          </p:cNvSpPr>
+          <p:nvPr>
+            <p:ph type="hdr" sz="quarter"/>
+          </p:nvPr>
+        </p:nvSpPr>
+        <p:spPr>
+          <a:xfrm>
+            <a:off x="0" y="0"/>
+            <a:ext cx="2971800" cy="458788"/>
+          </a:xfrm>
+          <a:prstGeom prst="rect">
+            <a:avLst/>
+          </a:prstGeom>
+        </p:spPr>
+        <p:txBody>
+          <a:bodyPr vert="horz" lIns="91440" tIns="45720" rIns="91440" bIns="45720" rtlCol="0"/>
+          <a:lstStyle>
+            <a:lvl1pPr algn="l">
+              <a:defRPr sz="1200"/>
+            </a:lvl1pPr>
+          </a:lstStyle>
+          <a:p>
+            <a:endParaRPr lang="en-SG"/>
+          </a:p>
+        </p:txBody>
+      </p:sp>
+      <p:sp>
+        <p:nvSpPr>
+          <p:cNvPr id="3" name="Date Placeholder 2"/>
+          <p:cNvSpPr>
+            <a:spLocks noGrp="1"/>
+          </p:cNvSpPr>
+          <p:nvPr>
+            <p:ph type="dt" idx="1"/>
+          </p:nvPr>
+        </p:nvSpPr>
+        <p:spPr>
+          <a:xfrm>
+            <a:off x="3884613" y="0"/>
+            <a:ext cx="2971800" cy="458788"/>
+          </a:xfrm>
+          <a:prstGeom prst="rect">
+            <a:avLst/>
+          </a:prstGeom>
+        </p:spPr>
+        <p:txBody>
+          <a:bodyPr vert="horz" lIns="91440" tIns="45720" rIns="91440" bIns="45720" rtlCol="0"/>
+          <a:lstStyle>
+            <a:lvl1pPr algn="r">
+              <a:defRPr sz="1200"/>
+            </a:lvl1pPr>
+          </a:lstStyle>
+          <a:p>
+            <a:fld id="{13F1E68C-EA5B-4EF9-A820-8F11FFDB3AFD}" type="datetimeFigureOut">
+              <a:rPr lang="en-SG" smtClean="0"/>
+              <a:t>4/7/2025</a:t>
+            </a:fld>
+            <a:endParaRPr lang="en-SG"/>
+          </a:p>
+        </p:txBody>
+      </p:sp>
+      <p:sp>
+        <p:nvSpPr>
+          <p:cNvPr id="4" name="Slide Image Placeholder 3"/>
+          <p:cNvSpPr>
+            <a:spLocks noGrp="1" noRot="1" noChangeAspect="1"/>
+          </p:cNvSpPr>
+          <p:nvPr>
+            <p:ph type="sldImg" idx="2"/>
+          </p:nvPr>
+        </p:nvSpPr>
+        <p:spPr>
+          <a:xfrm>
+            <a:off x="685800" y="1143000"/>
+            <a:ext cx="5486400" cy="3086100"/>
+          </a:xfrm>
+          <a:prstGeom prst="rect">
+            <a:avLst/>
+          </a:prstGeom>
+          <a:noFill/>
+          <a:ln w="12700">
+            <a:solidFill>
+              <a:prstClr val="black"/>
+            </a:solidFill>
+          </a:ln>
+        </p:spPr>
+        <p:txBody>
+          <a:bodyPr vert="horz" lIns="91440" tIns="45720" rIns="91440" bIns="45720" rtlCol="0" anchor="ctr"/>
+          <a:lstStyle/>
+          <a:p>
+            <a:endParaRPr lang="en-SG"/>
+          </a:p>
+        </p:txBody>
+      </p:sp>
+      <p:sp>
+        <p:nvSpPr>
+          <p:cNvPr id="5" name="Notes Placeholder 4"/>
+          <p:cNvSpPr>
+            <a:spLocks noGrp="1"/>
+          </p:cNvSpPr>
+          <p:nvPr>
+            <p:ph type="body" sz="quarter" idx="3"/>
+          </p:nvPr>
+        </p:nvSpPr>
+        <p:spPr>
+          <a:xfrm>
+            <a:off x="685800" y="4400550"/>
+            <a:ext cx="5486400" cy="3600450"/>
+          </a:xfrm>
+          <a:prstGeom prst="rect">
+            <a:avLst/>
+          </a:prstGeom>
+        </p:spPr>
+        <p:txBody>
+          <a:bodyPr vert="horz" lIns="91440" tIns="45720" rIns="91440" bIns="45720" rtlCol="0"/>
+          <a:lstStyle/>
+          <a:p>
+            <a:pPr lvl="0"/>
+            <a:r>
+              <a:rPr lang="en-US"/>
+              <a:t>Click to edit Master text styles</a:t>
+            </a:r>
+          </a:p>
+          <a:p>
+            <a:pPr lvl="1"/>
+            <a:r>
+              <a:rPr lang="en-US"/>
+              <a:t>Second level</a:t>
+            </a:r>
+          </a:p>
+          <a:p>
+            <a:pPr lvl="2"/>
+            <a:r>
+              <a:rPr lang="en-US"/>
+              <a:t>Third level</a:t>
+            </a:r>
+          </a:p>
+          <a:p>
+            <a:pPr lvl="3"/>
+            <a:r>
+              <a:rPr lang="en-US"/>
+              <a:t>Fourth level</a:t>
+            </a:r>
+          </a:p>
+          <a:p>
+            <a:pPr lvl="4"/>
+            <a:r>
+              <a:rPr lang="en-US"/>
+              <a:t>Fifth level</a:t>
+            </a:r>
+            <a:endParaRPr lang="en-SG"/>
+          </a:p>
+        </p:txBody>
+      </p:sp>
+      <p:sp>
+        <p:nvSpPr>
+          <p:cNvPr id="6" name="Footer Placeholder 5"/>
+          <p:cNvSpPr>
+            <a:spLocks noGrp="1"/>
+          </p:cNvSpPr>
+          <p:nvPr>
+            <p:ph type="ftr" sz="quarter" idx="4"/>
+          </p:nvPr>
+        </p:nvSpPr>
+        <p:spPr>
+          <a:xfrm>
+            <a:off x="0" y="8685213"/>
+            <a:ext cx="2971800" cy="458787"/>
+          </a:xfrm>
+          <a:prstGeom prst="rect">
+            <a:avLst/>
+          </a:prstGeom>
+        </p:spPr>
+        <p:txBody>
+          <a:bodyPr vert="horz" lIns="91440" tIns="45720" rIns="91440" bIns="45720" rtlCol="0" anchor="b"/>
+          <a:lstStyle>
+            <a:lvl1pPr algn="l">
+              <a:defRPr sz="1200"/>
+            </a:lvl1pPr>
+          </a:lstStyle>
+          <a:p>
+            <a:endParaRPr lang="en-SG"/>
+          </a:p>
+        </p:txBody>
+      </p:sp>
+      <p:sp>
+        <p:nvSpPr>
+          <p:cNvPr id="7" name="Slide Number Placeholder 6"/>
+          <p:cNvSpPr>
+            <a:spLocks noGrp="1"/>
+          </p:cNvSpPr>
+          <p:nvPr>
+            <p:ph type="sldNum" sz="quarter" idx="5"/>
+          </p:nvPr>
+        </p:nvSpPr>
+        <p:spPr>
+          <a:xfrm>
+            <a:off x="3884613" y="8685213"/>
+            <a:ext cx="2971800" cy="458787"/>
+          </a:xfrm>
+          <a:prstGeom prst="rect">
+            <a:avLst/>
+          </a:prstGeom>
+        </p:spPr>
+        <p:txBody>
+          <a:bodyPr vert="horz" lIns="91440" tIns="45720" rIns="91440" bIns="45720" rtlCol="0" anchor="b"/>
+          <a:lstStyle>
+            <a:lvl1pPr algn="r">
+              <a:defRPr sz="1200"/>
+            </a:lvl1pPr>
+          </a:lstStyle>
+          <a:p>
+            <a:fld id="{96308DC6-8DD5-4DF0-A70A-85C4CFE05B56}" type="slidenum">
+              <a:rPr lang="en-SG" smtClean="0"/>
+              <a:t>‹#›</a:t>
+            </a:fld>
+            <a:endParaRPr lang="en-SG"/>
+          </a:p>
+        </p:txBody>
+      </p:sp>
+    </p:spTree>
+    <p:extLst>
+      <p:ext uri="{BB962C8B-B14F-4D97-AF65-F5344CB8AC3E}">
+        <p14:creationId xmlns:p14="http://schemas.microsoft.com/office/powerpoint/2010/main" val="2785819687"/>
+      </p:ext>
+    </p:extLst>
+  </p:cSld>
+  <p:clrMap bg1="lt1" tx1="dk1" bg2="lt2" tx2="dk2" accent1="accent1" accent2="accent2" accent3="accent3" accent4="accent4" accent5="accent5" accent6="accent6" hlink="hlink" folHlink="folHlink"/>
+  <p:notesStyle>
+    <a:lvl1pPr marL="0" algn="l" defTabSz="914400" rtl="0" eaLnBrk="1" latinLnBrk="0" hangingPunct="1">
+      <a:defRPr sz="1200" kern="1200">
+        <a:solidFill>
+          <a:schemeClr val="tx1"/>
+        </a:solidFill>
+        <a:latin typeface="+mn-lt"/>
+        <a:ea typeface="+mn-ea"/>
+        <a:cs typeface="+mn-cs"/>
+      </a:defRPr>
+    </a:lvl1pPr>
+    <a:lvl2pPr marL="457200" algn="l" defTabSz="914400" rtl="0" eaLnBrk="1" latinLnBrk="0" hangingPunct="1">
+      <a:defRPr sz="1200" kern="1200">
+        <a:solidFill>
+          <a:schemeClr val="tx1"/>
+        </a:solidFill>
+        <a:latin typeface="+mn-lt"/>
+        <a:ea typeface="+mn-ea"/>
+        <a:cs typeface="+mn-cs"/>
+      </a:defRPr>
+    </a:lvl2pPr>
+    <a:lvl3pPr marL="914400" algn="l" defTabSz="914400" rtl="0" eaLnBrk="1" latinLnBrk="0" hangingPunct="1">
+      <a:defRPr sz="1200" kern="1200">
+        <a:solidFill>
+          <a:schemeClr val="tx1"/>
+        </a:solidFill>
+        <a:latin typeface="+mn-lt"/>
+        <a:ea typeface="+mn-ea"/>
+        <a:cs typeface="+mn-cs"/>
+      </a:defRPr>
+    </a:lvl3pPr>
+    <a:lvl4pPr marL="1371600" algn="l" defTabSz="914400" rtl="0" eaLnBrk="1" latinLnBrk="0" hangingPunct="1">
+      <a:defRPr sz="1200" kern="1200">
+        <a:solidFill>
+          <a:schemeClr val="tx1"/>
+        </a:solidFill>
+        <a:latin typeface="+mn-lt"/>
+        <a:ea typeface="+mn-ea"/>
+        <a:cs typeface="+mn-cs"/>
+      </a:defRPr>
+    </a:lvl4pPr>
+    <a:lvl5pPr marL="1828800" algn="l" defTabSz="914400" rtl="0" eaLnBrk="1" latinLnBrk="0" hangingPunct="1">
+      <a:defRPr sz="1200" kern="1200">
+        <a:solidFill>
+          <a:schemeClr val="tx1"/>
+        </a:solidFill>
+        <a:latin typeface="+mn-lt"/>
+        <a:ea typeface="+mn-ea"/>
+        <a:cs typeface="+mn-cs"/>
+      </a:defRPr>
+    </a:lvl5pPr>
+    <a:lvl6pPr marL="2286000" algn="l" defTabSz="914400" rtl="0" eaLnBrk="1" latinLnBrk="0" hangingPunct="1">
+      <a:defRPr sz="1200" kern="1200">
+        <a:solidFill>
+          <a:schemeClr val="tx1"/>
+        </a:solidFill>
+        <a:latin typeface="+mn-lt"/>
+        <a:ea typeface="+mn-ea"/>
+        <a:cs typeface="+mn-cs"/>
+      </a:defRPr>
+    </a:lvl6pPr>
+    <a:lvl7pPr marL="2743200" algn="l" defTabSz="914400" rtl="0" eaLnBrk="1" latinLnBrk="0" hangingPunct="1">
+      <a:defRPr sz="1200" kern="1200">
+        <a:solidFill>
+          <a:schemeClr val="tx1"/>
+        </a:solidFill>
+        <a:latin typeface="+mn-lt"/>
+        <a:ea typeface="+mn-ea"/>
+        <a:cs typeface="+mn-cs"/>
+      </a:defRPr>
+    </a:lvl7pPr>
+    <a:lvl8pPr marL="3200400" algn="l" defTabSz="914400" rtl="0" eaLnBrk="1" latinLnBrk="0" hangingPunct="1">
+      <a:defRPr sz="1200" kern="1200">
+        <a:solidFill>
+          <a:schemeClr val="tx1"/>
+        </a:solidFill>
+        <a:latin typeface="+mn-lt"/>
+        <a:ea typeface="+mn-ea"/>
+        <a:cs typeface="+mn-cs"/>
+      </a:defRPr>
+    </a:lvl8pPr>
+    <a:lvl9pPr marL="3657600" algn="l" defTabSz="914400" rtl="0" eaLnBrk="1" latinLnBrk="0" hangingPunct="1">
+      <a:defRPr sz="1200" kern="1200">
+        <a:solidFill>
+          <a:schemeClr val="tx1"/>
+        </a:solidFill>
+        <a:latin typeface="+mn-lt"/>
+        <a:ea typeface="+mn-ea"/>
+        <a:cs typeface="+mn-cs"/>
+      </a:defRPr>
+    </a:lvl9pPr>
+  </p:notesStyle>
+</p:notesMaster>
+</file>
+
+<file path=ppt/notesSlides/notesSlide1.xml><?xml version="1.0" encoding="utf-8"?>
+<p:notes xmlns:a="http://schemas.openxmlformats.org/drawingml/2006/main" xmlns:r="http://schemas.openxmlformats.org/officeDocument/2006/relationships" xmlns:p="http://schemas.openxmlformats.org/presentationml/2006/main">
+  <p:cSld>
+    <p:spTree>
+      <p:nvGrpSpPr>
+        <p:cNvPr id="1" name=""/>
+        <p:cNvGrpSpPr/>
+        <p:nvPr/>
+      </p:nvGrpSpPr>
+      <p:grpSpPr>
+        <a:xfrm>
+          <a:off x="0" y="0"/>
+          <a:ext cx="0" cy="0"/>
+          <a:chOff x="0" y="0"/>
+          <a:chExt cx="0" cy="0"/>
+        </a:xfrm>
+      </p:grpSpPr>
+      <p:sp>
+        <p:nvSpPr>
+          <p:cNvPr id="2" name="Slide Image Placeholder 1"/>
+          <p:cNvSpPr>
+            <a:spLocks noGrp="1" noRot="1" noChangeAspect="1"/>
+          </p:cNvSpPr>
+          <p:nvPr>
+            <p:ph type="sldImg"/>
+          </p:nvPr>
+        </p:nvSpPr>
+        <p:spPr/>
+      </p:sp>
+      <p:sp>
+        <p:nvSpPr>
+          <p:cNvPr id="3" name="Notes Placeholder 2"/>
+          <p:cNvSpPr>
+            <a:spLocks noGrp="1"/>
+          </p:cNvSpPr>
+          <p:nvPr>
+            <p:ph type="body" idx="1"/>
+          </p:nvPr>
+        </p:nvSpPr>
+        <p:spPr/>
+        <p:txBody>
+          <a:bodyPr/>
+          <a:lstStyle/>
+          <a:p>
+            <a:endParaRPr lang="en-SG" dirty="0"/>
+          </a:p>
+        </p:txBody>
+      </p:sp>
+      <p:sp>
+        <p:nvSpPr>
+          <p:cNvPr id="4" name="Slide Number Placeholder 3"/>
+          <p:cNvSpPr>
+            <a:spLocks noGrp="1"/>
+          </p:cNvSpPr>
+          <p:nvPr>
+            <p:ph type="sldNum" sz="quarter" idx="5"/>
+          </p:nvPr>
+        </p:nvSpPr>
+        <p:spPr/>
+        <p:txBody>
+          <a:bodyPr/>
+          <a:lstStyle/>
+          <a:p>
+            <a:fld id="{339835C3-D1D1-4287-8520-E4130C4A71CB}" type="slidenum">
+              <a:rPr lang="en-SG" smtClean="0"/>
+              <a:t>5</a:t>
+            </a:fld>
+            <a:endParaRPr lang="en-SG"/>
+          </a:p>
+        </p:txBody>
+      </p:sp>
+    </p:spTree>
+    <p:extLst>
+      <p:ext uri="{BB962C8B-B14F-4D97-AF65-F5344CB8AC3E}">
+        <p14:creationId xmlns:p14="http://schemas.microsoft.com/office/powerpoint/2010/main" val="196835459"/>
+      </p:ext>
+    </p:extLst>
+  </p:cSld>
+  <p:clrMapOvr>
+    <a:masterClrMapping/>
+  </p:clrMapOvr>
+</p:notes>
+</file>
+
 <file path=ppt/slideLayouts/slideLayout1.xml><?xml version="1.0" encoding="utf-8"?>
 <p:sldLayout xmlns:a="http://schemas.openxmlformats.org/drawingml/2006/main" xmlns:r="http://schemas.openxmlformats.org/officeDocument/2006/relationships" xmlns:p="http://schemas.openxmlformats.org/presentationml/2006/main" type="title" preserve="1">
   <p:cSld name="Title Slide">
@@ -265,7 +702,7 @@
           <a:p>
             <a:fld id="{7F70DC58-6C99-499A-9930-98E8DE65C392}" type="datetimeFigureOut">
               <a:rPr lang="en-SG" smtClean="0"/>
-              <a:t>2/7/2025</a:t>
+              <a:t>4/7/2025</a:t>
             </a:fld>
             <a:endParaRPr lang="en-SG"/>
           </a:p>
@@ -465,7 +902,7 @@
           <a:p>
             <a:fld id="{7F70DC58-6C99-499A-9930-98E8DE65C392}" type="datetimeFigureOut">
               <a:rPr lang="en-SG" smtClean="0"/>
-              <a:t>2/7/2025</a:t>
+              <a:t>4/7/2025</a:t>
             </a:fld>
             <a:endParaRPr lang="en-SG"/>
           </a:p>
@@ -675,7 +1112,7 @@
           <a:p>
             <a:fld id="{7F70DC58-6C99-499A-9930-98E8DE65C392}" type="datetimeFigureOut">
               <a:rPr lang="en-SG" smtClean="0"/>
-              <a:t>2/7/2025</a:t>
+              <a:t>4/7/2025</a:t>
             </a:fld>
             <a:endParaRPr lang="en-SG"/>
           </a:p>
@@ -875,7 +1312,7 @@
           <a:p>
             <a:fld id="{7F70DC58-6C99-499A-9930-98E8DE65C392}" type="datetimeFigureOut">
               <a:rPr lang="en-SG" smtClean="0"/>
-              <a:t>2/7/2025</a:t>
+              <a:t>4/7/2025</a:t>
             </a:fld>
             <a:endParaRPr lang="en-SG"/>
           </a:p>
@@ -1151,7 +1588,7 @@
           <a:p>
             <a:fld id="{7F70DC58-6C99-499A-9930-98E8DE65C392}" type="datetimeFigureOut">
               <a:rPr lang="en-SG" smtClean="0"/>
-              <a:t>2/7/2025</a:t>
+              <a:t>4/7/2025</a:t>
             </a:fld>
             <a:endParaRPr lang="en-SG"/>
           </a:p>
@@ -1419,7 +1856,7 @@
           <a:p>
             <a:fld id="{7F70DC58-6C99-499A-9930-98E8DE65C392}" type="datetimeFigureOut">
               <a:rPr lang="en-SG" smtClean="0"/>
-              <a:t>2/7/2025</a:t>
+              <a:t>4/7/2025</a:t>
             </a:fld>
             <a:endParaRPr lang="en-SG"/>
           </a:p>
@@ -1834,7 +2271,7 @@
           <a:p>
             <a:fld id="{7F70DC58-6C99-499A-9930-98E8DE65C392}" type="datetimeFigureOut">
               <a:rPr lang="en-SG" smtClean="0"/>
-              <a:t>2/7/2025</a:t>
+              <a:t>4/7/2025</a:t>
             </a:fld>
             <a:endParaRPr lang="en-SG"/>
           </a:p>
@@ -1976,7 +2413,7 @@
           <a:p>
             <a:fld id="{7F70DC58-6C99-499A-9930-98E8DE65C392}" type="datetimeFigureOut">
               <a:rPr lang="en-SG" smtClean="0"/>
-              <a:t>2/7/2025</a:t>
+              <a:t>4/7/2025</a:t>
             </a:fld>
             <a:endParaRPr lang="en-SG"/>
           </a:p>
@@ -2089,7 +2526,7 @@
           <a:p>
             <a:fld id="{7F70DC58-6C99-499A-9930-98E8DE65C392}" type="datetimeFigureOut">
               <a:rPr lang="en-SG" smtClean="0"/>
-              <a:t>2/7/2025</a:t>
+              <a:t>4/7/2025</a:t>
             </a:fld>
             <a:endParaRPr lang="en-SG"/>
           </a:p>
@@ -2402,7 +2839,7 @@
           <a:p>
             <a:fld id="{7F70DC58-6C99-499A-9930-98E8DE65C392}" type="datetimeFigureOut">
               <a:rPr lang="en-SG" smtClean="0"/>
-              <a:t>2/7/2025</a:t>
+              <a:t>4/7/2025</a:t>
             </a:fld>
             <a:endParaRPr lang="en-SG"/>
           </a:p>
@@ -2691,7 +3128,7 @@
           <a:p>
             <a:fld id="{7F70DC58-6C99-499A-9930-98E8DE65C392}" type="datetimeFigureOut">
               <a:rPr lang="en-SG" smtClean="0"/>
-              <a:t>2/7/2025</a:t>
+              <a:t>4/7/2025</a:t>
             </a:fld>
             <a:endParaRPr lang="en-SG"/>
           </a:p>
@@ -2934,7 +3371,7 @@
           <a:p>
             <a:fld id="{7F70DC58-6C99-499A-9930-98E8DE65C392}" type="datetimeFigureOut">
               <a:rPr lang="en-SG" smtClean="0"/>
-              <a:t>2/7/2025</a:t>
+              <a:t>4/7/2025</a:t>
             </a:fld>
             <a:endParaRPr lang="en-SG"/>
           </a:p>
@@ -9826,10 +10263,3717 @@
           <a:chExt cx="0" cy="0"/>
         </a:xfrm>
       </p:grpSpPr>
+      <p:sp>
+        <p:nvSpPr>
+          <p:cNvPr id="96" name="Rectangle 95">
+            <a:extLst>
+              <a:ext uri="{FF2B5EF4-FFF2-40B4-BE49-F238E27FC236}">
+                <a16:creationId xmlns:a16="http://schemas.microsoft.com/office/drawing/2014/main" id="{FA9595C3-4862-7AA0-5B84-F9307B757FE4}"/>
+              </a:ext>
+            </a:extLst>
+          </p:cNvPr>
+          <p:cNvSpPr/>
+          <p:nvPr/>
+        </p:nvSpPr>
+        <p:spPr>
+          <a:xfrm>
+            <a:off x="5993643" y="4137886"/>
+            <a:ext cx="1773168" cy="1414026"/>
+          </a:xfrm>
+          <a:prstGeom prst="rect">
+            <a:avLst/>
+          </a:prstGeom>
+          <a:ln w="9525">
+            <a:prstDash val="sysDash"/>
+          </a:ln>
+        </p:spPr>
+        <p:style>
+          <a:lnRef idx="2">
+            <a:schemeClr val="accent1"/>
+          </a:lnRef>
+          <a:fillRef idx="1">
+            <a:schemeClr val="lt1"/>
+          </a:fillRef>
+          <a:effectRef idx="0">
+            <a:schemeClr val="accent1"/>
+          </a:effectRef>
+          <a:fontRef idx="minor">
+            <a:schemeClr val="dk1"/>
+          </a:fontRef>
+        </p:style>
+        <p:txBody>
+          <a:bodyPr rtlCol="0" anchor="ctr"/>
+          <a:lstStyle/>
+          <a:p>
+            <a:endParaRPr lang="en-SG" sz="1400" b="1" dirty="0"/>
+          </a:p>
+        </p:txBody>
+      </p:sp>
+      <p:sp>
+        <p:nvSpPr>
+          <p:cNvPr id="5" name="TextBox 4">
+            <a:extLst>
+              <a:ext uri="{FF2B5EF4-FFF2-40B4-BE49-F238E27FC236}">
+                <a16:creationId xmlns:a16="http://schemas.microsoft.com/office/drawing/2014/main" id="{22DB61D3-2064-0BB6-CB3C-0AF3FEDF0A80}"/>
+              </a:ext>
+            </a:extLst>
+          </p:cNvPr>
+          <p:cNvSpPr txBox="1"/>
+          <p:nvPr/>
+        </p:nvSpPr>
+        <p:spPr>
+          <a:xfrm>
+            <a:off x="338339" y="105077"/>
+            <a:ext cx="3323775" cy="307777"/>
+          </a:xfrm>
+          <a:prstGeom prst="rect">
+            <a:avLst/>
+          </a:prstGeom>
+          <a:noFill/>
+        </p:spPr>
+        <p:txBody>
+          <a:bodyPr wrap="square" rtlCol="0">
+            <a:spAutoFit/>
+          </a:bodyPr>
+          <a:lstStyle/>
+          <a:p>
+            <a:r>
+              <a:rPr lang="en-US" sz="1400" b="1" dirty="0"/>
+              <a:t>Railway Physical-world Simulator </a:t>
+            </a:r>
+            <a:endParaRPr lang="en-SG" sz="1400" b="1" dirty="0"/>
+          </a:p>
+        </p:txBody>
+      </p:sp>
+      <p:cxnSp>
+        <p:nvCxnSpPr>
+          <p:cNvPr id="10" name="Connector: Elbow 9">
+            <a:extLst>
+              <a:ext uri="{FF2B5EF4-FFF2-40B4-BE49-F238E27FC236}">
+                <a16:creationId xmlns:a16="http://schemas.microsoft.com/office/drawing/2014/main" id="{77831CCB-FEC3-2BEB-16A2-56BC1FC1B555}"/>
+              </a:ext>
+            </a:extLst>
+          </p:cNvPr>
+          <p:cNvCxnSpPr>
+            <a:cxnSpLocks/>
+            <a:endCxn id="75" idx="0"/>
+          </p:cNvCxnSpPr>
+          <p:nvPr/>
+        </p:nvCxnSpPr>
+        <p:spPr>
+          <a:xfrm>
+            <a:off x="3631962" y="3564445"/>
+            <a:ext cx="827573" cy="511629"/>
+          </a:xfrm>
+          <a:prstGeom prst="bentConnector2">
+            <a:avLst/>
+          </a:prstGeom>
+          <a:ln>
+            <a:solidFill>
+              <a:schemeClr val="tx1"/>
+            </a:solidFill>
+            <a:tailEnd type="triangle"/>
+          </a:ln>
+        </p:spPr>
+        <p:style>
+          <a:lnRef idx="1">
+            <a:schemeClr val="accent1"/>
+          </a:lnRef>
+          <a:fillRef idx="0">
+            <a:schemeClr val="accent1"/>
+          </a:fillRef>
+          <a:effectRef idx="0">
+            <a:schemeClr val="accent1"/>
+          </a:effectRef>
+          <a:fontRef idx="minor">
+            <a:schemeClr val="tx1"/>
+          </a:fontRef>
+        </p:style>
+      </p:cxnSp>
+      <p:cxnSp>
+        <p:nvCxnSpPr>
+          <p:cNvPr id="15" name="Connector: Elbow 14">
+            <a:extLst>
+              <a:ext uri="{FF2B5EF4-FFF2-40B4-BE49-F238E27FC236}">
+                <a16:creationId xmlns:a16="http://schemas.microsoft.com/office/drawing/2014/main" id="{B1745667-3BE2-F2A0-BFEC-A5C8C7B83D60}"/>
+              </a:ext>
+            </a:extLst>
+          </p:cNvPr>
+          <p:cNvCxnSpPr>
+            <a:cxnSpLocks/>
+            <a:stCxn id="75" idx="1"/>
+          </p:cNvCxnSpPr>
+          <p:nvPr/>
+        </p:nvCxnSpPr>
+        <p:spPr>
+          <a:xfrm rot="10800000">
+            <a:off x="3662116" y="3677498"/>
+            <a:ext cx="607821" cy="528228"/>
+          </a:xfrm>
+          <a:prstGeom prst="bentConnector3">
+            <a:avLst>
+              <a:gd name="adj1" fmla="val -18951"/>
+            </a:avLst>
+          </a:prstGeom>
+          <a:ln>
+            <a:solidFill>
+              <a:schemeClr val="tx1"/>
+            </a:solidFill>
+            <a:tailEnd type="triangle"/>
+          </a:ln>
+        </p:spPr>
+        <p:style>
+          <a:lnRef idx="1">
+            <a:schemeClr val="accent1"/>
+          </a:lnRef>
+          <a:fillRef idx="0">
+            <a:schemeClr val="accent1"/>
+          </a:fillRef>
+          <a:effectRef idx="0">
+            <a:schemeClr val="accent1"/>
+          </a:effectRef>
+          <a:fontRef idx="minor">
+            <a:schemeClr val="tx1"/>
+          </a:fontRef>
+        </p:style>
+      </p:cxnSp>
+      <p:cxnSp>
+        <p:nvCxnSpPr>
+          <p:cNvPr id="30" name="Straight Arrow Connector 29">
+            <a:extLst>
+              <a:ext uri="{FF2B5EF4-FFF2-40B4-BE49-F238E27FC236}">
+                <a16:creationId xmlns:a16="http://schemas.microsoft.com/office/drawing/2014/main" id="{8E819578-89C0-11BE-A6D3-1C42A57EEFF0}"/>
+              </a:ext>
+            </a:extLst>
+          </p:cNvPr>
+          <p:cNvCxnSpPr>
+            <a:cxnSpLocks/>
+          </p:cNvCxnSpPr>
+          <p:nvPr/>
+        </p:nvCxnSpPr>
+        <p:spPr>
+          <a:xfrm flipV="1">
+            <a:off x="1772858" y="3758924"/>
+            <a:ext cx="0" cy="317176"/>
+          </a:xfrm>
+          <a:prstGeom prst="straightConnector1">
+            <a:avLst/>
+          </a:prstGeom>
+          <a:ln>
+            <a:tailEnd type="triangle"/>
+          </a:ln>
+        </p:spPr>
+        <p:style>
+          <a:lnRef idx="1">
+            <a:schemeClr val="dk1"/>
+          </a:lnRef>
+          <a:fillRef idx="0">
+            <a:schemeClr val="dk1"/>
+          </a:fillRef>
+          <a:effectRef idx="0">
+            <a:schemeClr val="dk1"/>
+          </a:effectRef>
+          <a:fontRef idx="minor">
+            <a:schemeClr val="tx1"/>
+          </a:fontRef>
+        </p:style>
+      </p:cxnSp>
+      <p:sp>
+        <p:nvSpPr>
+          <p:cNvPr id="34" name="TextBox 33">
+            <a:extLst>
+              <a:ext uri="{FF2B5EF4-FFF2-40B4-BE49-F238E27FC236}">
+                <a16:creationId xmlns:a16="http://schemas.microsoft.com/office/drawing/2014/main" id="{49174DFB-F985-48EA-3597-2FBC6DA7DFFB}"/>
+              </a:ext>
+            </a:extLst>
+          </p:cNvPr>
+          <p:cNvSpPr txBox="1"/>
+          <p:nvPr/>
+        </p:nvSpPr>
+        <p:spPr>
+          <a:xfrm>
+            <a:off x="1912639" y="4015064"/>
+            <a:ext cx="1023376" cy="261610"/>
+          </a:xfrm>
+          <a:prstGeom prst="rect">
+            <a:avLst/>
+          </a:prstGeom>
+          <a:noFill/>
+        </p:spPr>
+        <p:txBody>
+          <a:bodyPr wrap="square" rtlCol="0">
+            <a:spAutoFit/>
+          </a:bodyPr>
+          <a:lstStyle/>
+          <a:p>
+            <a:r>
+              <a:rPr lang="en-US" sz="1100" b="1" dirty="0">
+                <a:solidFill>
+                  <a:srgbClr val="0070C0"/>
+                </a:solidFill>
+              </a:rPr>
+              <a:t>10.0.10.12X</a:t>
+            </a:r>
+            <a:endParaRPr lang="en-SG" sz="1100" b="1" dirty="0">
+              <a:solidFill>
+                <a:srgbClr val="0070C0"/>
+              </a:solidFill>
+            </a:endParaRPr>
+          </a:p>
+        </p:txBody>
+      </p:sp>
+      <p:sp>
+        <p:nvSpPr>
+          <p:cNvPr id="42" name="TextBox 41">
+            <a:extLst>
+              <a:ext uri="{FF2B5EF4-FFF2-40B4-BE49-F238E27FC236}">
+                <a16:creationId xmlns:a16="http://schemas.microsoft.com/office/drawing/2014/main" id="{3CDAD988-4064-2AA7-6254-F257E9B09BB9}"/>
+              </a:ext>
+            </a:extLst>
+          </p:cNvPr>
+          <p:cNvSpPr txBox="1"/>
+          <p:nvPr/>
+        </p:nvSpPr>
+        <p:spPr>
+          <a:xfrm>
+            <a:off x="1522380" y="5728744"/>
+            <a:ext cx="2762029" cy="246221"/>
+          </a:xfrm>
+          <a:prstGeom prst="rect">
+            <a:avLst/>
+          </a:prstGeom>
+          <a:noFill/>
+        </p:spPr>
+        <p:txBody>
+          <a:bodyPr wrap="square" rtlCol="0">
+            <a:spAutoFit/>
+          </a:bodyPr>
+          <a:lstStyle/>
+          <a:p>
+            <a:r>
+              <a:rPr lang="en-US" sz="1000" dirty="0"/>
+              <a:t>Coils set request </a:t>
+            </a:r>
+            <a:endParaRPr lang="en-SG" sz="1000" dirty="0"/>
+          </a:p>
+        </p:txBody>
+      </p:sp>
+      <p:sp>
+        <p:nvSpPr>
+          <p:cNvPr id="50" name="TextBox 49">
+            <a:extLst>
+              <a:ext uri="{FF2B5EF4-FFF2-40B4-BE49-F238E27FC236}">
+                <a16:creationId xmlns:a16="http://schemas.microsoft.com/office/drawing/2014/main" id="{B40A1CB2-A20E-10B5-66CA-BBEBC4FBCCB8}"/>
+              </a:ext>
+            </a:extLst>
+          </p:cNvPr>
+          <p:cNvSpPr txBox="1"/>
+          <p:nvPr/>
+        </p:nvSpPr>
+        <p:spPr>
+          <a:xfrm>
+            <a:off x="332769" y="3732846"/>
+            <a:ext cx="1389885" cy="369332"/>
+          </a:xfrm>
+          <a:prstGeom prst="rect">
+            <a:avLst/>
+          </a:prstGeom>
+          <a:noFill/>
+        </p:spPr>
+        <p:txBody>
+          <a:bodyPr wrap="square" rtlCol="0">
+            <a:spAutoFit/>
+          </a:bodyPr>
+          <a:lstStyle/>
+          <a:p>
+            <a:r>
+              <a:rPr lang="en-US" sz="900" dirty="0"/>
+              <a:t>10 PLC coils state (output to 3</a:t>
+            </a:r>
+            <a:r>
+              <a:rPr lang="en-US" sz="900" baseline="30000" dirty="0"/>
+              <a:t>rd</a:t>
+            </a:r>
+            <a:r>
+              <a:rPr lang="en-US" sz="900" dirty="0"/>
+              <a:t> track power switch) </a:t>
+            </a:r>
+            <a:endParaRPr lang="en-SG" sz="900" dirty="0"/>
+          </a:p>
+        </p:txBody>
+      </p:sp>
+      <p:sp>
+        <p:nvSpPr>
+          <p:cNvPr id="54" name="TextBox 53">
+            <a:extLst>
+              <a:ext uri="{FF2B5EF4-FFF2-40B4-BE49-F238E27FC236}">
+                <a16:creationId xmlns:a16="http://schemas.microsoft.com/office/drawing/2014/main" id="{C0F40215-A092-87B7-16C8-D447AF1E897E}"/>
+              </a:ext>
+            </a:extLst>
+          </p:cNvPr>
+          <p:cNvSpPr txBox="1"/>
+          <p:nvPr/>
+        </p:nvSpPr>
+        <p:spPr>
+          <a:xfrm>
+            <a:off x="6835284" y="113722"/>
+            <a:ext cx="3003741" cy="307777"/>
+          </a:xfrm>
+          <a:prstGeom prst="rect">
+            <a:avLst/>
+          </a:prstGeom>
+          <a:noFill/>
+        </p:spPr>
+        <p:txBody>
+          <a:bodyPr wrap="square" rtlCol="0">
+            <a:spAutoFit/>
+          </a:bodyPr>
+          <a:lstStyle/>
+          <a:p>
+            <a:r>
+              <a:rPr lang="en-US" sz="1400" b="1" dirty="0"/>
+              <a:t>Railway HQ Trains Monitor HMI(s)</a:t>
+            </a:r>
+            <a:endParaRPr lang="en-SG" sz="1400" b="1" dirty="0"/>
+          </a:p>
+        </p:txBody>
+      </p:sp>
+      <p:sp>
+        <p:nvSpPr>
+          <p:cNvPr id="56" name="TextBox 55">
+            <a:extLst>
+              <a:ext uri="{FF2B5EF4-FFF2-40B4-BE49-F238E27FC236}">
+                <a16:creationId xmlns:a16="http://schemas.microsoft.com/office/drawing/2014/main" id="{67E7BD82-C789-23A4-FFA3-9B168FAC7783}"/>
+              </a:ext>
+            </a:extLst>
+          </p:cNvPr>
+          <p:cNvSpPr txBox="1"/>
+          <p:nvPr/>
+        </p:nvSpPr>
+        <p:spPr>
+          <a:xfrm>
+            <a:off x="4439306" y="3559072"/>
+            <a:ext cx="1285407" cy="369332"/>
+          </a:xfrm>
+          <a:prstGeom prst="rect">
+            <a:avLst/>
+          </a:prstGeom>
+          <a:noFill/>
+        </p:spPr>
+        <p:txBody>
+          <a:bodyPr wrap="square" rtlCol="0">
+            <a:spAutoFit/>
+          </a:bodyPr>
+          <a:lstStyle/>
+          <a:p>
+            <a:r>
+              <a:rPr lang="en-US" sz="900" dirty="0"/>
+              <a:t>10 train front radar state  ( input to PLC)   </a:t>
+            </a:r>
+            <a:endParaRPr lang="en-SG" sz="900" dirty="0"/>
+          </a:p>
+        </p:txBody>
+      </p:sp>
+      <p:sp>
+        <p:nvSpPr>
+          <p:cNvPr id="57" name="TextBox 56">
+            <a:extLst>
+              <a:ext uri="{FF2B5EF4-FFF2-40B4-BE49-F238E27FC236}">
+                <a16:creationId xmlns:a16="http://schemas.microsoft.com/office/drawing/2014/main" id="{86015DAD-6C46-866B-C574-32B529CDDBCF}"/>
+              </a:ext>
+            </a:extLst>
+          </p:cNvPr>
+          <p:cNvSpPr txBox="1"/>
+          <p:nvPr/>
+        </p:nvSpPr>
+        <p:spPr>
+          <a:xfrm>
+            <a:off x="3156810" y="3762469"/>
+            <a:ext cx="1397573" cy="369332"/>
+          </a:xfrm>
+          <a:prstGeom prst="rect">
+            <a:avLst/>
+          </a:prstGeom>
+          <a:noFill/>
+        </p:spPr>
+        <p:txBody>
+          <a:bodyPr wrap="square" rtlCol="0">
+            <a:spAutoFit/>
+          </a:bodyPr>
+          <a:lstStyle/>
+          <a:p>
+            <a:r>
+              <a:rPr lang="en-US" sz="900" dirty="0"/>
+              <a:t>20 PLC coils ( output to moto and brake) </a:t>
+            </a:r>
+            <a:endParaRPr lang="en-SG" sz="900" dirty="0"/>
+          </a:p>
+        </p:txBody>
+      </p:sp>
+      <p:cxnSp>
+        <p:nvCxnSpPr>
+          <p:cNvPr id="61" name="Straight Connector 60">
+            <a:extLst>
+              <a:ext uri="{FF2B5EF4-FFF2-40B4-BE49-F238E27FC236}">
+                <a16:creationId xmlns:a16="http://schemas.microsoft.com/office/drawing/2014/main" id="{2B02F2FB-5AEF-1130-2B1A-72B16F362A9D}"/>
+              </a:ext>
+            </a:extLst>
+          </p:cNvPr>
+          <p:cNvCxnSpPr>
+            <a:cxnSpLocks/>
+          </p:cNvCxnSpPr>
+          <p:nvPr/>
+        </p:nvCxnSpPr>
+        <p:spPr>
+          <a:xfrm>
+            <a:off x="472677" y="5986692"/>
+            <a:ext cx="7719053" cy="16973"/>
+          </a:xfrm>
+          <a:prstGeom prst="line">
+            <a:avLst/>
+          </a:prstGeom>
+          <a:ln w="38100">
+            <a:solidFill>
+              <a:srgbClr val="00B050"/>
+            </a:solidFill>
+          </a:ln>
+        </p:spPr>
+        <p:style>
+          <a:lnRef idx="1">
+            <a:schemeClr val="accent1"/>
+          </a:lnRef>
+          <a:fillRef idx="0">
+            <a:schemeClr val="accent1"/>
+          </a:fillRef>
+          <a:effectRef idx="0">
+            <a:schemeClr val="accent1"/>
+          </a:effectRef>
+          <a:fontRef idx="minor">
+            <a:schemeClr val="tx1"/>
+          </a:fontRef>
+        </p:style>
+      </p:cxnSp>
+      <p:pic>
+        <p:nvPicPr>
+          <p:cNvPr id="62" name="Picture 8" descr="Router | Cisco Network Topology Icons 3015">
+            <a:extLst>
+              <a:ext uri="{FF2B5EF4-FFF2-40B4-BE49-F238E27FC236}">
+                <a16:creationId xmlns:a16="http://schemas.microsoft.com/office/drawing/2014/main" id="{374A48B4-4BDA-34FC-DE01-EDA38C2A7681}"/>
+              </a:ext>
+            </a:extLst>
+          </p:cNvPr>
+          <p:cNvPicPr>
+            <a:picLocks noChangeAspect="1" noChangeArrowheads="1"/>
+          </p:cNvPicPr>
+          <p:nvPr/>
+        </p:nvPicPr>
+        <p:blipFill>
+          <a:blip r:embed="rId3">
+            <a:extLst>
+              <a:ext uri="{28A0092B-C50C-407E-A947-70E740481C1C}">
+                <a14:useLocalDpi xmlns:a14="http://schemas.microsoft.com/office/drawing/2010/main" val="0"/>
+              </a:ext>
+            </a:extLst>
+          </a:blip>
+          <a:srcRect/>
+          <a:stretch>
+            <a:fillRect/>
+          </a:stretch>
+        </p:blipFill>
+        <p:spPr bwMode="auto">
+          <a:xfrm>
+            <a:off x="8053617" y="4358744"/>
+            <a:ext cx="473861" cy="324037"/>
+          </a:xfrm>
+          <a:prstGeom prst="rect">
+            <a:avLst/>
+          </a:prstGeom>
+          <a:noFill/>
+          <a:extLst>
+            <a:ext uri="{909E8E84-426E-40DD-AFC4-6F175D3DCCD1}">
+              <a14:hiddenFill xmlns:a14="http://schemas.microsoft.com/office/drawing/2010/main">
+                <a:solidFill>
+                  <a:srgbClr val="FFFFFF"/>
+                </a:solidFill>
+              </a14:hiddenFill>
+            </a:ext>
+          </a:extLst>
+        </p:spPr>
+      </p:pic>
+      <p:cxnSp>
+        <p:nvCxnSpPr>
+          <p:cNvPr id="63" name="Straight Arrow Connector 62">
+            <a:extLst>
+              <a:ext uri="{FF2B5EF4-FFF2-40B4-BE49-F238E27FC236}">
+                <a16:creationId xmlns:a16="http://schemas.microsoft.com/office/drawing/2014/main" id="{CAC69845-138F-E239-2D3A-B43DC734FAEA}"/>
+              </a:ext>
+            </a:extLst>
+          </p:cNvPr>
+          <p:cNvCxnSpPr>
+            <a:cxnSpLocks/>
+          </p:cNvCxnSpPr>
+          <p:nvPr/>
+        </p:nvCxnSpPr>
+        <p:spPr>
+          <a:xfrm>
+            <a:off x="8191730" y="4665578"/>
+            <a:ext cx="0" cy="1316108"/>
+          </a:xfrm>
+          <a:prstGeom prst="straightConnector1">
+            <a:avLst/>
+          </a:prstGeom>
+          <a:ln w="19050">
+            <a:solidFill>
+              <a:srgbClr val="00B050"/>
+            </a:solidFill>
+            <a:headEnd type="triangle"/>
+            <a:tailEnd type="triangle"/>
+          </a:ln>
+        </p:spPr>
+        <p:style>
+          <a:lnRef idx="1">
+            <a:schemeClr val="accent1"/>
+          </a:lnRef>
+          <a:fillRef idx="0">
+            <a:schemeClr val="accent1"/>
+          </a:fillRef>
+          <a:effectRef idx="0">
+            <a:schemeClr val="accent1"/>
+          </a:effectRef>
+          <a:fontRef idx="minor">
+            <a:schemeClr val="tx1"/>
+          </a:fontRef>
+        </p:style>
+      </p:cxnSp>
+      <p:cxnSp>
+        <p:nvCxnSpPr>
+          <p:cNvPr id="64" name="Straight Arrow Connector 63">
+            <a:extLst>
+              <a:ext uri="{FF2B5EF4-FFF2-40B4-BE49-F238E27FC236}">
+                <a16:creationId xmlns:a16="http://schemas.microsoft.com/office/drawing/2014/main" id="{135DDBE6-340D-8804-14BB-2780758EC000}"/>
+              </a:ext>
+            </a:extLst>
+          </p:cNvPr>
+          <p:cNvCxnSpPr>
+            <a:cxnSpLocks/>
+          </p:cNvCxnSpPr>
+          <p:nvPr/>
+        </p:nvCxnSpPr>
+        <p:spPr>
+          <a:xfrm>
+            <a:off x="8299916" y="3115588"/>
+            <a:ext cx="0" cy="1249614"/>
+          </a:xfrm>
+          <a:prstGeom prst="straightConnector1">
+            <a:avLst/>
+          </a:prstGeom>
+          <a:ln w="19050">
+            <a:solidFill>
+              <a:srgbClr val="00B050"/>
+            </a:solidFill>
+            <a:headEnd type="triangle"/>
+            <a:tailEnd type="triangle"/>
+          </a:ln>
+        </p:spPr>
+        <p:style>
+          <a:lnRef idx="1">
+            <a:schemeClr val="accent1"/>
+          </a:lnRef>
+          <a:fillRef idx="0">
+            <a:schemeClr val="accent1"/>
+          </a:fillRef>
+          <a:effectRef idx="0">
+            <a:schemeClr val="accent1"/>
+          </a:effectRef>
+          <a:fontRef idx="minor">
+            <a:schemeClr val="tx1"/>
+          </a:fontRef>
+        </p:style>
+      </p:cxnSp>
+      <p:sp>
+        <p:nvSpPr>
+          <p:cNvPr id="70" name="TextBox 69">
+            <a:extLst>
+              <a:ext uri="{FF2B5EF4-FFF2-40B4-BE49-F238E27FC236}">
+                <a16:creationId xmlns:a16="http://schemas.microsoft.com/office/drawing/2014/main" id="{F15322E2-0FAD-5627-4EDE-4E077CEC60A5}"/>
+              </a:ext>
+            </a:extLst>
+          </p:cNvPr>
+          <p:cNvSpPr txBox="1"/>
+          <p:nvPr/>
+        </p:nvSpPr>
+        <p:spPr>
+          <a:xfrm>
+            <a:off x="7192099" y="3337460"/>
+            <a:ext cx="1566376" cy="461665"/>
+          </a:xfrm>
+          <a:prstGeom prst="rect">
+            <a:avLst/>
+          </a:prstGeom>
+          <a:noFill/>
+        </p:spPr>
+        <p:txBody>
+          <a:bodyPr wrap="square" rtlCol="0">
+            <a:spAutoFit/>
+          </a:bodyPr>
+          <a:lstStyle/>
+          <a:p>
+            <a:r>
+              <a:rPr lang="en-US" sz="1200" b="1" dirty="0">
+                <a:solidFill>
+                  <a:schemeClr val="accent6">
+                    <a:lumMod val="75000"/>
+                  </a:schemeClr>
+                </a:solidFill>
+              </a:rPr>
+              <a:t>HMI network 192.168.10.x</a:t>
+            </a:r>
+          </a:p>
+        </p:txBody>
+      </p:sp>
+      <p:sp>
+        <p:nvSpPr>
+          <p:cNvPr id="80" name="TextBox 79">
+            <a:extLst>
+              <a:ext uri="{FF2B5EF4-FFF2-40B4-BE49-F238E27FC236}">
+                <a16:creationId xmlns:a16="http://schemas.microsoft.com/office/drawing/2014/main" id="{6D3A0C7D-F48B-DCDA-DED9-13ADA66A59CE}"/>
+              </a:ext>
+            </a:extLst>
+          </p:cNvPr>
+          <p:cNvSpPr txBox="1"/>
+          <p:nvPr/>
+        </p:nvSpPr>
+        <p:spPr>
+          <a:xfrm>
+            <a:off x="5827685" y="5737975"/>
+            <a:ext cx="2699793" cy="276999"/>
+          </a:xfrm>
+          <a:prstGeom prst="rect">
+            <a:avLst/>
+          </a:prstGeom>
+          <a:noFill/>
+        </p:spPr>
+        <p:txBody>
+          <a:bodyPr wrap="square" rtlCol="0">
+            <a:spAutoFit/>
+          </a:bodyPr>
+          <a:lstStyle/>
+          <a:p>
+            <a:r>
+              <a:rPr lang="en-US" sz="1200" b="1" dirty="0">
+                <a:solidFill>
+                  <a:schemeClr val="accent6">
+                    <a:lumMod val="75000"/>
+                  </a:schemeClr>
+                </a:solidFill>
+              </a:rPr>
+              <a:t>Railway Modbus 192.168.100.0/24 </a:t>
+            </a:r>
+          </a:p>
+        </p:txBody>
+      </p:sp>
+      <p:cxnSp>
+        <p:nvCxnSpPr>
+          <p:cNvPr id="93" name="Straight Arrow Connector 92">
+            <a:extLst>
+              <a:ext uri="{FF2B5EF4-FFF2-40B4-BE49-F238E27FC236}">
+                <a16:creationId xmlns:a16="http://schemas.microsoft.com/office/drawing/2014/main" id="{3190321D-A2DF-C525-28F2-97E9E3614518}"/>
+              </a:ext>
+            </a:extLst>
+          </p:cNvPr>
+          <p:cNvCxnSpPr>
+            <a:cxnSpLocks/>
+          </p:cNvCxnSpPr>
+          <p:nvPr/>
+        </p:nvCxnSpPr>
+        <p:spPr>
+          <a:xfrm>
+            <a:off x="1518268" y="5658969"/>
+            <a:ext cx="0" cy="322717"/>
+          </a:xfrm>
+          <a:prstGeom prst="straightConnector1">
+            <a:avLst/>
+          </a:prstGeom>
+          <a:ln w="19050">
+            <a:solidFill>
+              <a:srgbClr val="00B050"/>
+            </a:solidFill>
+            <a:headEnd type="triangle"/>
+            <a:tailEnd type="triangle"/>
+          </a:ln>
+        </p:spPr>
+        <p:style>
+          <a:lnRef idx="1">
+            <a:schemeClr val="accent1"/>
+          </a:lnRef>
+          <a:fillRef idx="0">
+            <a:schemeClr val="accent1"/>
+          </a:fillRef>
+          <a:effectRef idx="0">
+            <a:schemeClr val="accent1"/>
+          </a:effectRef>
+          <a:fontRef idx="minor">
+            <a:schemeClr val="tx1"/>
+          </a:fontRef>
+        </p:style>
+      </p:cxnSp>
+      <p:sp>
+        <p:nvSpPr>
+          <p:cNvPr id="100" name="TextBox 99">
+            <a:extLst>
+              <a:ext uri="{FF2B5EF4-FFF2-40B4-BE49-F238E27FC236}">
+                <a16:creationId xmlns:a16="http://schemas.microsoft.com/office/drawing/2014/main" id="{D739E28A-4A4E-0057-74B5-25648FF95834}"/>
+              </a:ext>
+            </a:extLst>
+          </p:cNvPr>
+          <p:cNvSpPr txBox="1"/>
+          <p:nvPr/>
+        </p:nvSpPr>
+        <p:spPr>
+          <a:xfrm>
+            <a:off x="6226740" y="5538142"/>
+            <a:ext cx="1280656" cy="246221"/>
+          </a:xfrm>
+          <a:prstGeom prst="rect">
+            <a:avLst/>
+          </a:prstGeom>
+          <a:noFill/>
+        </p:spPr>
+        <p:txBody>
+          <a:bodyPr wrap="square" rtlCol="0">
+            <a:spAutoFit/>
+          </a:bodyPr>
+          <a:lstStyle/>
+          <a:p>
+            <a:r>
+              <a:rPr lang="en-US" sz="1000" dirty="0"/>
+              <a:t>RTU Memory data </a:t>
+            </a:r>
+            <a:endParaRPr lang="en-SG" sz="1000" dirty="0"/>
+          </a:p>
+        </p:txBody>
+      </p:sp>
+      <p:pic>
+        <p:nvPicPr>
+          <p:cNvPr id="102" name="Picture 101">
+            <a:extLst>
+              <a:ext uri="{FF2B5EF4-FFF2-40B4-BE49-F238E27FC236}">
+                <a16:creationId xmlns:a16="http://schemas.microsoft.com/office/drawing/2014/main" id="{16CA66A9-6EDC-E7EF-4D05-B706CEE9501E}"/>
+              </a:ext>
+            </a:extLst>
+          </p:cNvPr>
+          <p:cNvPicPr>
+            <a:picLocks noChangeAspect="1"/>
+          </p:cNvPicPr>
+          <p:nvPr/>
+        </p:nvPicPr>
+        <p:blipFill>
+          <a:blip r:embed="rId4"/>
+          <a:stretch>
+            <a:fillRect/>
+          </a:stretch>
+        </p:blipFill>
+        <p:spPr>
+          <a:xfrm>
+            <a:off x="6067560" y="2259038"/>
+            <a:ext cx="367500" cy="382200"/>
+          </a:xfrm>
+          <a:prstGeom prst="rect">
+            <a:avLst/>
+          </a:prstGeom>
+          <a:ln w="6350">
+            <a:solidFill>
+              <a:schemeClr val="tx1"/>
+            </a:solidFill>
+          </a:ln>
+        </p:spPr>
+      </p:pic>
+      <p:pic>
+        <p:nvPicPr>
+          <p:cNvPr id="104" name="Picture 103">
+            <a:extLst>
+              <a:ext uri="{FF2B5EF4-FFF2-40B4-BE49-F238E27FC236}">
+                <a16:creationId xmlns:a16="http://schemas.microsoft.com/office/drawing/2014/main" id="{AB07376B-BA8A-3455-063B-83A47F3DFF2A}"/>
+              </a:ext>
+            </a:extLst>
+          </p:cNvPr>
+          <p:cNvPicPr>
+            <a:picLocks noChangeAspect="1"/>
+          </p:cNvPicPr>
+          <p:nvPr/>
+        </p:nvPicPr>
+        <p:blipFill>
+          <a:blip r:embed="rId5"/>
+          <a:stretch>
+            <a:fillRect/>
+          </a:stretch>
+        </p:blipFill>
+        <p:spPr>
+          <a:xfrm>
+            <a:off x="6049317" y="1076010"/>
+            <a:ext cx="370773" cy="346781"/>
+          </a:xfrm>
+          <a:prstGeom prst="rect">
+            <a:avLst/>
+          </a:prstGeom>
+          <a:ln w="9525">
+            <a:solidFill>
+              <a:schemeClr val="tx1"/>
+            </a:solidFill>
+          </a:ln>
+        </p:spPr>
+      </p:pic>
+      <p:sp>
+        <p:nvSpPr>
+          <p:cNvPr id="105" name="TextBox 104">
+            <a:extLst>
+              <a:ext uri="{FF2B5EF4-FFF2-40B4-BE49-F238E27FC236}">
+                <a16:creationId xmlns:a16="http://schemas.microsoft.com/office/drawing/2014/main" id="{E56E1553-BACC-EABF-912E-E4BF8CBB6264}"/>
+              </a:ext>
+            </a:extLst>
+          </p:cNvPr>
+          <p:cNvSpPr txBox="1"/>
+          <p:nvPr/>
+        </p:nvSpPr>
+        <p:spPr>
+          <a:xfrm>
+            <a:off x="5962535" y="794644"/>
+            <a:ext cx="628864" cy="261610"/>
+          </a:xfrm>
+          <a:prstGeom prst="rect">
+            <a:avLst/>
+          </a:prstGeom>
+          <a:noFill/>
+        </p:spPr>
+        <p:txBody>
+          <a:bodyPr wrap="square">
+            <a:spAutoFit/>
+          </a:bodyPr>
+          <a:lstStyle/>
+          <a:p>
+            <a:r>
+              <a:rPr lang="en-US" sz="1100" b="1" dirty="0">
+                <a:solidFill>
+                  <a:schemeClr val="tx1">
+                    <a:lumMod val="75000"/>
+                    <a:lumOff val="25000"/>
+                  </a:schemeClr>
+                </a:solidFill>
+              </a:rPr>
+              <a:t>Users</a:t>
+            </a:r>
+            <a:endParaRPr lang="en-SG" sz="1100" b="1" dirty="0">
+              <a:solidFill>
+                <a:schemeClr val="tx1">
+                  <a:lumMod val="75000"/>
+                  <a:lumOff val="25000"/>
+                </a:schemeClr>
+              </a:solidFill>
+            </a:endParaRPr>
+          </a:p>
+        </p:txBody>
+      </p:sp>
+      <p:sp>
+        <p:nvSpPr>
+          <p:cNvPr id="106" name="TextBox 105">
+            <a:extLst>
+              <a:ext uri="{FF2B5EF4-FFF2-40B4-BE49-F238E27FC236}">
+                <a16:creationId xmlns:a16="http://schemas.microsoft.com/office/drawing/2014/main" id="{42836AC0-8E9E-9921-1DDA-ECE7CB0593F2}"/>
+              </a:ext>
+            </a:extLst>
+          </p:cNvPr>
+          <p:cNvSpPr txBox="1"/>
+          <p:nvPr/>
+        </p:nvSpPr>
+        <p:spPr>
+          <a:xfrm>
+            <a:off x="5956442" y="1821593"/>
+            <a:ext cx="816691" cy="400110"/>
+          </a:xfrm>
+          <a:prstGeom prst="rect">
+            <a:avLst/>
+          </a:prstGeom>
+          <a:noFill/>
+        </p:spPr>
+        <p:txBody>
+          <a:bodyPr wrap="square">
+            <a:spAutoFit/>
+          </a:bodyPr>
+          <a:lstStyle/>
+          <a:p>
+            <a:r>
+              <a:rPr lang="en-US" sz="1000" b="1" dirty="0">
+                <a:solidFill>
+                  <a:schemeClr val="tx1">
+                    <a:lumMod val="75000"/>
+                    <a:lumOff val="25000"/>
+                  </a:schemeClr>
+                </a:solidFill>
+              </a:rPr>
+              <a:t>Railway engineer </a:t>
+            </a:r>
+            <a:endParaRPr lang="en-SG" sz="1000" b="1" dirty="0">
+              <a:solidFill>
+                <a:schemeClr val="tx1">
+                  <a:lumMod val="75000"/>
+                  <a:lumOff val="25000"/>
+                </a:schemeClr>
+              </a:solidFill>
+            </a:endParaRPr>
+          </a:p>
+        </p:txBody>
+      </p:sp>
+      <p:sp>
+        <p:nvSpPr>
+          <p:cNvPr id="107" name="Arrow: Right 106">
+            <a:extLst>
+              <a:ext uri="{FF2B5EF4-FFF2-40B4-BE49-F238E27FC236}">
+                <a16:creationId xmlns:a16="http://schemas.microsoft.com/office/drawing/2014/main" id="{AB8FC1EF-BC54-E921-EE36-8F96776F526F}"/>
+              </a:ext>
+            </a:extLst>
+          </p:cNvPr>
+          <p:cNvSpPr/>
+          <p:nvPr/>
+        </p:nvSpPr>
+        <p:spPr>
+          <a:xfrm flipH="1">
+            <a:off x="5779157" y="1191053"/>
+            <a:ext cx="195046" cy="136614"/>
+          </a:xfrm>
+          <a:prstGeom prst="rightArrow">
+            <a:avLst/>
+          </a:prstGeom>
+        </p:spPr>
+        <p:style>
+          <a:lnRef idx="2">
+            <a:schemeClr val="accent1">
+              <a:shade val="15000"/>
+            </a:schemeClr>
+          </a:lnRef>
+          <a:fillRef idx="1">
+            <a:schemeClr val="accent1"/>
+          </a:fillRef>
+          <a:effectRef idx="0">
+            <a:schemeClr val="accent1"/>
+          </a:effectRef>
+          <a:fontRef idx="minor">
+            <a:schemeClr val="lt1"/>
+          </a:fontRef>
+        </p:style>
+        <p:txBody>
+          <a:bodyPr rtlCol="0" anchor="ctr"/>
+          <a:lstStyle/>
+          <a:p>
+            <a:pPr algn="ctr"/>
+            <a:endParaRPr lang="en-SG"/>
+          </a:p>
+        </p:txBody>
+      </p:sp>
+      <p:sp>
+        <p:nvSpPr>
+          <p:cNvPr id="108" name="Arrow: Right 107">
+            <a:extLst>
+              <a:ext uri="{FF2B5EF4-FFF2-40B4-BE49-F238E27FC236}">
+                <a16:creationId xmlns:a16="http://schemas.microsoft.com/office/drawing/2014/main" id="{FA4BC919-7A2A-FC11-1BBF-8F576FF9E2E5}"/>
+              </a:ext>
+            </a:extLst>
+          </p:cNvPr>
+          <p:cNvSpPr/>
+          <p:nvPr/>
+        </p:nvSpPr>
+        <p:spPr>
+          <a:xfrm flipH="1">
+            <a:off x="5713927" y="2412329"/>
+            <a:ext cx="325505" cy="132218"/>
+          </a:xfrm>
+          <a:prstGeom prst="rightArrow">
+            <a:avLst/>
+          </a:prstGeom>
+        </p:spPr>
+        <p:style>
+          <a:lnRef idx="2">
+            <a:schemeClr val="accent1">
+              <a:shade val="15000"/>
+            </a:schemeClr>
+          </a:lnRef>
+          <a:fillRef idx="1">
+            <a:schemeClr val="accent1"/>
+          </a:fillRef>
+          <a:effectRef idx="0">
+            <a:schemeClr val="accent1"/>
+          </a:effectRef>
+          <a:fontRef idx="minor">
+            <a:schemeClr val="lt1"/>
+          </a:fontRef>
+        </p:style>
+        <p:txBody>
+          <a:bodyPr rtlCol="0" anchor="ctr"/>
+          <a:lstStyle/>
+          <a:p>
+            <a:pPr algn="ctr"/>
+            <a:endParaRPr lang="en-SG"/>
+          </a:p>
+        </p:txBody>
+      </p:sp>
+      <p:sp>
+        <p:nvSpPr>
+          <p:cNvPr id="109" name="Arrow: Right 108">
+            <a:extLst>
+              <a:ext uri="{FF2B5EF4-FFF2-40B4-BE49-F238E27FC236}">
+                <a16:creationId xmlns:a16="http://schemas.microsoft.com/office/drawing/2014/main" id="{D0450FD8-B075-9A9E-40FE-2013555E54CF}"/>
+              </a:ext>
+            </a:extLst>
+          </p:cNvPr>
+          <p:cNvSpPr/>
+          <p:nvPr/>
+        </p:nvSpPr>
+        <p:spPr>
+          <a:xfrm flipV="1">
+            <a:off x="6467264" y="2407933"/>
+            <a:ext cx="305870" cy="136614"/>
+          </a:xfrm>
+          <a:prstGeom prst="rightArrow">
+            <a:avLst/>
+          </a:prstGeom>
+        </p:spPr>
+        <p:style>
+          <a:lnRef idx="2">
+            <a:schemeClr val="accent1">
+              <a:shade val="15000"/>
+            </a:schemeClr>
+          </a:lnRef>
+          <a:fillRef idx="1">
+            <a:schemeClr val="accent1"/>
+          </a:fillRef>
+          <a:effectRef idx="0">
+            <a:schemeClr val="accent1"/>
+          </a:effectRef>
+          <a:fontRef idx="minor">
+            <a:schemeClr val="lt1"/>
+          </a:fontRef>
+        </p:style>
+        <p:txBody>
+          <a:bodyPr rtlCol="0" anchor="ctr"/>
+          <a:lstStyle/>
+          <a:p>
+            <a:pPr algn="ctr"/>
+            <a:endParaRPr lang="en-SG" dirty="0"/>
+          </a:p>
+        </p:txBody>
+      </p:sp>
+      <p:sp>
+        <p:nvSpPr>
+          <p:cNvPr id="2" name="Rectangle 1">
+            <a:extLst>
+              <a:ext uri="{FF2B5EF4-FFF2-40B4-BE49-F238E27FC236}">
+                <a16:creationId xmlns:a16="http://schemas.microsoft.com/office/drawing/2014/main" id="{42DDA821-8EED-2048-FA74-0B7166D1E16C}"/>
+              </a:ext>
+            </a:extLst>
+          </p:cNvPr>
+          <p:cNvSpPr/>
+          <p:nvPr/>
+        </p:nvSpPr>
+        <p:spPr>
+          <a:xfrm>
+            <a:off x="338341" y="4251895"/>
+            <a:ext cx="2368079" cy="1414026"/>
+          </a:xfrm>
+          <a:prstGeom prst="rect">
+            <a:avLst/>
+          </a:prstGeom>
+          <a:ln w="9525">
+            <a:prstDash val="sysDash"/>
+          </a:ln>
+        </p:spPr>
+        <p:style>
+          <a:lnRef idx="2">
+            <a:schemeClr val="accent1"/>
+          </a:lnRef>
+          <a:fillRef idx="1">
+            <a:schemeClr val="lt1"/>
+          </a:fillRef>
+          <a:effectRef idx="0">
+            <a:schemeClr val="accent1"/>
+          </a:effectRef>
+          <a:fontRef idx="minor">
+            <a:schemeClr val="dk1"/>
+          </a:fontRef>
+        </p:style>
+        <p:txBody>
+          <a:bodyPr rtlCol="0" anchor="ctr"/>
+          <a:lstStyle/>
+          <a:p>
+            <a:endParaRPr lang="en-SG" sz="1400" b="1" dirty="0"/>
+          </a:p>
+        </p:txBody>
+      </p:sp>
+      <p:pic>
+        <p:nvPicPr>
+          <p:cNvPr id="3" name="Picture 2">
+            <a:extLst>
+              <a:ext uri="{FF2B5EF4-FFF2-40B4-BE49-F238E27FC236}">
+                <a16:creationId xmlns:a16="http://schemas.microsoft.com/office/drawing/2014/main" id="{C9D835C5-CDE7-CD47-0B14-EBFF11BC4FED}"/>
+              </a:ext>
+            </a:extLst>
+          </p:cNvPr>
+          <p:cNvPicPr>
+            <a:picLocks noChangeAspect="1"/>
+          </p:cNvPicPr>
+          <p:nvPr/>
+        </p:nvPicPr>
+        <p:blipFill>
+          <a:blip r:embed="rId6"/>
+          <a:stretch>
+            <a:fillRect/>
+          </a:stretch>
+        </p:blipFill>
+        <p:spPr>
+          <a:xfrm>
+            <a:off x="472677" y="4832165"/>
+            <a:ext cx="818082" cy="468901"/>
+          </a:xfrm>
+          <a:prstGeom prst="rect">
+            <a:avLst/>
+          </a:prstGeom>
+        </p:spPr>
+      </p:pic>
+      <p:pic>
+        <p:nvPicPr>
+          <p:cNvPr id="8" name="Picture 7">
+            <a:extLst>
+              <a:ext uri="{FF2B5EF4-FFF2-40B4-BE49-F238E27FC236}">
+                <a16:creationId xmlns:a16="http://schemas.microsoft.com/office/drawing/2014/main" id="{EC2BD026-5D93-43F5-B096-DB85262B7E7F}"/>
+              </a:ext>
+            </a:extLst>
+          </p:cNvPr>
+          <p:cNvPicPr>
+            <a:picLocks noChangeAspect="1"/>
+          </p:cNvPicPr>
+          <p:nvPr/>
+        </p:nvPicPr>
+        <p:blipFill>
+          <a:blip r:embed="rId6"/>
+          <a:stretch>
+            <a:fillRect/>
+          </a:stretch>
+        </p:blipFill>
+        <p:spPr>
+          <a:xfrm>
+            <a:off x="1737048" y="4824134"/>
+            <a:ext cx="818082" cy="468901"/>
+          </a:xfrm>
+          <a:prstGeom prst="rect">
+            <a:avLst/>
+          </a:prstGeom>
+        </p:spPr>
+      </p:pic>
+      <p:sp>
+        <p:nvSpPr>
+          <p:cNvPr id="16" name="TextBox 15">
+            <a:extLst>
+              <a:ext uri="{FF2B5EF4-FFF2-40B4-BE49-F238E27FC236}">
+                <a16:creationId xmlns:a16="http://schemas.microsoft.com/office/drawing/2014/main" id="{0DD068DE-A2F1-415F-33E5-9F6A58B06C02}"/>
+              </a:ext>
+            </a:extLst>
+          </p:cNvPr>
+          <p:cNvSpPr txBox="1"/>
+          <p:nvPr/>
+        </p:nvSpPr>
+        <p:spPr>
+          <a:xfrm>
+            <a:off x="350044" y="4251894"/>
+            <a:ext cx="2470445" cy="430887"/>
+          </a:xfrm>
+          <a:prstGeom prst="rect">
+            <a:avLst/>
+          </a:prstGeom>
+          <a:noFill/>
+        </p:spPr>
+        <p:txBody>
+          <a:bodyPr wrap="square" rtlCol="0">
+            <a:spAutoFit/>
+          </a:bodyPr>
+          <a:lstStyle/>
+          <a:p>
+            <a:r>
+              <a:rPr lang="en-US" sz="1100" b="1" dirty="0">
+                <a:solidFill>
+                  <a:srgbClr val="002060"/>
+                </a:solidFill>
+              </a:rPr>
+              <a:t>Railway 3</a:t>
+            </a:r>
+            <a:r>
+              <a:rPr lang="en-US" sz="1100" b="1" baseline="30000" dirty="0">
+                <a:solidFill>
+                  <a:srgbClr val="002060"/>
+                </a:solidFill>
+              </a:rPr>
+              <a:t>rd</a:t>
+            </a:r>
+            <a:r>
+              <a:rPr lang="en-US" sz="1100" b="1" dirty="0">
+                <a:solidFill>
+                  <a:srgbClr val="002060"/>
+                </a:solidFill>
+              </a:rPr>
+              <a:t> tack power switches control PLC network </a:t>
+            </a:r>
+            <a:endParaRPr lang="en-SG" sz="1100" b="1" dirty="0">
+              <a:solidFill>
+                <a:srgbClr val="002060"/>
+              </a:solidFill>
+            </a:endParaRPr>
+          </a:p>
+        </p:txBody>
+      </p:sp>
+      <p:sp>
+        <p:nvSpPr>
+          <p:cNvPr id="33" name="TextBox 32">
+            <a:extLst>
+              <a:ext uri="{FF2B5EF4-FFF2-40B4-BE49-F238E27FC236}">
+                <a16:creationId xmlns:a16="http://schemas.microsoft.com/office/drawing/2014/main" id="{1BD2E2E5-E160-08EC-F7D4-79153F841DBC}"/>
+              </a:ext>
+            </a:extLst>
+          </p:cNvPr>
+          <p:cNvSpPr txBox="1"/>
+          <p:nvPr/>
+        </p:nvSpPr>
+        <p:spPr>
+          <a:xfrm>
+            <a:off x="496324" y="4590607"/>
+            <a:ext cx="792264" cy="276999"/>
+          </a:xfrm>
+          <a:prstGeom prst="rect">
+            <a:avLst/>
+          </a:prstGeom>
+          <a:noFill/>
+        </p:spPr>
+        <p:txBody>
+          <a:bodyPr wrap="square" rtlCol="0">
+            <a:spAutoFit/>
+          </a:bodyPr>
+          <a:lstStyle/>
+          <a:p>
+            <a:r>
+              <a:rPr lang="en-US" sz="1200" b="1" dirty="0">
+                <a:solidFill>
+                  <a:srgbClr val="FF0000"/>
+                </a:solidFill>
+              </a:rPr>
+              <a:t>PLC-06</a:t>
+            </a:r>
+          </a:p>
+        </p:txBody>
+      </p:sp>
+      <p:sp>
+        <p:nvSpPr>
+          <p:cNvPr id="43" name="TextBox 42">
+            <a:extLst>
+              <a:ext uri="{FF2B5EF4-FFF2-40B4-BE49-F238E27FC236}">
+                <a16:creationId xmlns:a16="http://schemas.microsoft.com/office/drawing/2014/main" id="{7E70A207-F2AF-232A-21F2-9255D79A167E}"/>
+              </a:ext>
+            </a:extLst>
+          </p:cNvPr>
+          <p:cNvSpPr txBox="1"/>
+          <p:nvPr/>
+        </p:nvSpPr>
+        <p:spPr>
+          <a:xfrm>
+            <a:off x="1745356" y="4604887"/>
+            <a:ext cx="700546" cy="276999"/>
+          </a:xfrm>
+          <a:prstGeom prst="rect">
+            <a:avLst/>
+          </a:prstGeom>
+          <a:noFill/>
+        </p:spPr>
+        <p:txBody>
+          <a:bodyPr wrap="square" rtlCol="0">
+            <a:spAutoFit/>
+          </a:bodyPr>
+          <a:lstStyle/>
+          <a:p>
+            <a:r>
+              <a:rPr lang="en-US" sz="1200" b="1" dirty="0">
+                <a:solidFill>
+                  <a:srgbClr val="FF0000"/>
+                </a:solidFill>
+              </a:rPr>
+              <a:t>PLC-07</a:t>
+            </a:r>
+          </a:p>
+        </p:txBody>
+      </p:sp>
+      <p:sp>
+        <p:nvSpPr>
+          <p:cNvPr id="44" name="TextBox 43">
+            <a:extLst>
+              <a:ext uri="{FF2B5EF4-FFF2-40B4-BE49-F238E27FC236}">
+                <a16:creationId xmlns:a16="http://schemas.microsoft.com/office/drawing/2014/main" id="{61F4FF62-E8B9-F3FA-5059-3472408EAAA8}"/>
+              </a:ext>
+            </a:extLst>
+          </p:cNvPr>
+          <p:cNvSpPr txBox="1"/>
+          <p:nvPr/>
+        </p:nvSpPr>
+        <p:spPr>
+          <a:xfrm>
+            <a:off x="1722654" y="5235034"/>
+            <a:ext cx="1076579" cy="430887"/>
+          </a:xfrm>
+          <a:prstGeom prst="rect">
+            <a:avLst/>
+          </a:prstGeom>
+          <a:noFill/>
+        </p:spPr>
+        <p:txBody>
+          <a:bodyPr wrap="square" rtlCol="0">
+            <a:spAutoFit/>
+          </a:bodyPr>
+          <a:lstStyle/>
+          <a:p>
+            <a:r>
+              <a:rPr lang="en-US" sz="1100" b="1" dirty="0"/>
+              <a:t>[Slave, Slot-1] </a:t>
+            </a:r>
+            <a:r>
+              <a:rPr lang="en-SG" sz="1100" b="1" dirty="0"/>
+              <a:t>I/O: 0/2</a:t>
+            </a:r>
+          </a:p>
+        </p:txBody>
+      </p:sp>
+      <p:sp>
+        <p:nvSpPr>
+          <p:cNvPr id="45" name="TextBox 44">
+            <a:extLst>
+              <a:ext uri="{FF2B5EF4-FFF2-40B4-BE49-F238E27FC236}">
+                <a16:creationId xmlns:a16="http://schemas.microsoft.com/office/drawing/2014/main" id="{A7F293B0-C15C-A214-AE80-3F0609AE5C88}"/>
+              </a:ext>
+            </a:extLst>
+          </p:cNvPr>
+          <p:cNvSpPr txBox="1"/>
+          <p:nvPr/>
+        </p:nvSpPr>
+        <p:spPr>
+          <a:xfrm>
+            <a:off x="383255" y="5263890"/>
+            <a:ext cx="1202503" cy="430887"/>
+          </a:xfrm>
+          <a:prstGeom prst="rect">
+            <a:avLst/>
+          </a:prstGeom>
+          <a:noFill/>
+        </p:spPr>
+        <p:txBody>
+          <a:bodyPr wrap="square" rtlCol="0">
+            <a:spAutoFit/>
+          </a:bodyPr>
+          <a:lstStyle/>
+          <a:p>
+            <a:r>
+              <a:rPr lang="en-US" sz="1100" b="1" dirty="0"/>
+              <a:t>[Master, Slot-0]</a:t>
+            </a:r>
+          </a:p>
+          <a:p>
+            <a:r>
+              <a:rPr lang="en-US" sz="1100" b="1" dirty="0"/>
+              <a:t>I/O: 0/8</a:t>
+            </a:r>
+            <a:endParaRPr lang="en-SG" sz="1100" b="1" dirty="0"/>
+          </a:p>
+        </p:txBody>
+      </p:sp>
+      <p:pic>
+        <p:nvPicPr>
+          <p:cNvPr id="46" name="Picture 8" descr="Router | Cisco Network Topology Icons 3015">
+            <a:extLst>
+              <a:ext uri="{FF2B5EF4-FFF2-40B4-BE49-F238E27FC236}">
+                <a16:creationId xmlns:a16="http://schemas.microsoft.com/office/drawing/2014/main" id="{3C38B589-1397-2602-DA9D-0162CAAC034C}"/>
+              </a:ext>
+            </a:extLst>
+          </p:cNvPr>
+          <p:cNvPicPr>
+            <a:picLocks noChangeAspect="1" noChangeArrowheads="1"/>
+          </p:cNvPicPr>
+          <p:nvPr/>
+        </p:nvPicPr>
+        <p:blipFill>
+          <a:blip r:embed="rId3">
+            <a:extLst>
+              <a:ext uri="{28A0092B-C50C-407E-A947-70E740481C1C}">
+                <a14:useLocalDpi xmlns:a14="http://schemas.microsoft.com/office/drawing/2010/main" val="0"/>
+              </a:ext>
+            </a:extLst>
+          </a:blip>
+          <a:srcRect/>
+          <a:stretch>
+            <a:fillRect/>
+          </a:stretch>
+        </p:blipFill>
+        <p:spPr bwMode="auto">
+          <a:xfrm>
+            <a:off x="1573160" y="4084313"/>
+            <a:ext cx="379197" cy="259303"/>
+          </a:xfrm>
+          <a:prstGeom prst="rect">
+            <a:avLst/>
+          </a:prstGeom>
+          <a:noFill/>
+          <a:extLst>
+            <a:ext uri="{909E8E84-426E-40DD-AFC4-6F175D3DCCD1}">
+              <a14:hiddenFill xmlns:a14="http://schemas.microsoft.com/office/drawing/2010/main">
+                <a:solidFill>
+                  <a:srgbClr val="FFFFFF"/>
+                </a:solidFill>
+              </a14:hiddenFill>
+            </a:ext>
+          </a:extLst>
+        </p:spPr>
+      </p:pic>
+      <p:cxnSp>
+        <p:nvCxnSpPr>
+          <p:cNvPr id="51" name="Straight Connector 50">
+            <a:extLst>
+              <a:ext uri="{FF2B5EF4-FFF2-40B4-BE49-F238E27FC236}">
+                <a16:creationId xmlns:a16="http://schemas.microsoft.com/office/drawing/2014/main" id="{54B8305B-0FF6-955C-549F-C5C51A63AD40}"/>
+              </a:ext>
+            </a:extLst>
+          </p:cNvPr>
+          <p:cNvCxnSpPr>
+            <a:cxnSpLocks/>
+          </p:cNvCxnSpPr>
+          <p:nvPr/>
+        </p:nvCxnSpPr>
+        <p:spPr>
+          <a:xfrm>
+            <a:off x="1306059" y="5081267"/>
+            <a:ext cx="430989" cy="0"/>
+          </a:xfrm>
+          <a:prstGeom prst="line">
+            <a:avLst/>
+          </a:prstGeom>
+          <a:ln w="19050"/>
+        </p:spPr>
+        <p:style>
+          <a:lnRef idx="1">
+            <a:schemeClr val="dk1"/>
+          </a:lnRef>
+          <a:fillRef idx="0">
+            <a:schemeClr val="dk1"/>
+          </a:fillRef>
+          <a:effectRef idx="0">
+            <a:schemeClr val="dk1"/>
+          </a:effectRef>
+          <a:fontRef idx="minor">
+            <a:schemeClr val="tx1"/>
+          </a:fontRef>
+        </p:style>
+      </p:cxnSp>
+      <p:sp>
+        <p:nvSpPr>
+          <p:cNvPr id="59" name="Rectangle 58">
+            <a:extLst>
+              <a:ext uri="{FF2B5EF4-FFF2-40B4-BE49-F238E27FC236}">
+                <a16:creationId xmlns:a16="http://schemas.microsoft.com/office/drawing/2014/main" id="{A5E636DD-FF89-ADCA-F226-B398487703A1}"/>
+              </a:ext>
+            </a:extLst>
+          </p:cNvPr>
+          <p:cNvSpPr/>
+          <p:nvPr/>
+        </p:nvSpPr>
+        <p:spPr>
+          <a:xfrm>
+            <a:off x="3147392" y="4185088"/>
+            <a:ext cx="2368079" cy="1414026"/>
+          </a:xfrm>
+          <a:prstGeom prst="rect">
+            <a:avLst/>
+          </a:prstGeom>
+          <a:ln w="9525">
+            <a:prstDash val="sysDash"/>
+          </a:ln>
+        </p:spPr>
+        <p:style>
+          <a:lnRef idx="2">
+            <a:schemeClr val="accent1"/>
+          </a:lnRef>
+          <a:fillRef idx="1">
+            <a:schemeClr val="lt1"/>
+          </a:fillRef>
+          <a:effectRef idx="0">
+            <a:schemeClr val="accent1"/>
+          </a:effectRef>
+          <a:fontRef idx="minor">
+            <a:schemeClr val="dk1"/>
+          </a:fontRef>
+        </p:style>
+        <p:txBody>
+          <a:bodyPr rtlCol="0" anchor="ctr"/>
+          <a:lstStyle/>
+          <a:p>
+            <a:endParaRPr lang="en-SG" sz="1400" b="1" dirty="0"/>
+          </a:p>
+        </p:txBody>
+      </p:sp>
+      <p:pic>
+        <p:nvPicPr>
+          <p:cNvPr id="60" name="Picture 59">
+            <a:extLst>
+              <a:ext uri="{FF2B5EF4-FFF2-40B4-BE49-F238E27FC236}">
+                <a16:creationId xmlns:a16="http://schemas.microsoft.com/office/drawing/2014/main" id="{B66FB1E0-90EE-7398-EEEA-AA91DCC51D92}"/>
+              </a:ext>
+            </a:extLst>
+          </p:cNvPr>
+          <p:cNvPicPr>
+            <a:picLocks noChangeAspect="1"/>
+          </p:cNvPicPr>
+          <p:nvPr/>
+        </p:nvPicPr>
+        <p:blipFill>
+          <a:blip r:embed="rId6"/>
+          <a:stretch>
+            <a:fillRect/>
+          </a:stretch>
+        </p:blipFill>
+        <p:spPr>
+          <a:xfrm>
+            <a:off x="3281728" y="4765358"/>
+            <a:ext cx="818082" cy="468901"/>
+          </a:xfrm>
+          <a:prstGeom prst="rect">
+            <a:avLst/>
+          </a:prstGeom>
+        </p:spPr>
+      </p:pic>
+      <p:pic>
+        <p:nvPicPr>
+          <p:cNvPr id="67" name="Picture 66">
+            <a:extLst>
+              <a:ext uri="{FF2B5EF4-FFF2-40B4-BE49-F238E27FC236}">
+                <a16:creationId xmlns:a16="http://schemas.microsoft.com/office/drawing/2014/main" id="{9DA33BF2-3CA1-FC84-557A-BCDDF4CE2BC3}"/>
+              </a:ext>
+            </a:extLst>
+          </p:cNvPr>
+          <p:cNvPicPr>
+            <a:picLocks noChangeAspect="1"/>
+          </p:cNvPicPr>
+          <p:nvPr/>
+        </p:nvPicPr>
+        <p:blipFill>
+          <a:blip r:embed="rId6"/>
+          <a:stretch>
+            <a:fillRect/>
+          </a:stretch>
+        </p:blipFill>
+        <p:spPr>
+          <a:xfrm>
+            <a:off x="4546099" y="4757327"/>
+            <a:ext cx="818082" cy="468901"/>
+          </a:xfrm>
+          <a:prstGeom prst="rect">
+            <a:avLst/>
+          </a:prstGeom>
+        </p:spPr>
+      </p:pic>
+      <p:sp>
+        <p:nvSpPr>
+          <p:cNvPr id="69" name="TextBox 68">
+            <a:extLst>
+              <a:ext uri="{FF2B5EF4-FFF2-40B4-BE49-F238E27FC236}">
+                <a16:creationId xmlns:a16="http://schemas.microsoft.com/office/drawing/2014/main" id="{2D08880D-9F1A-B4AA-25F5-A9ED87DBD461}"/>
+              </a:ext>
+            </a:extLst>
+          </p:cNvPr>
+          <p:cNvSpPr txBox="1"/>
+          <p:nvPr/>
+        </p:nvSpPr>
+        <p:spPr>
+          <a:xfrm>
+            <a:off x="3168649" y="4233335"/>
+            <a:ext cx="2439636" cy="430887"/>
+          </a:xfrm>
+          <a:prstGeom prst="rect">
+            <a:avLst/>
+          </a:prstGeom>
+          <a:noFill/>
+        </p:spPr>
+        <p:txBody>
+          <a:bodyPr wrap="square" rtlCol="0">
+            <a:spAutoFit/>
+          </a:bodyPr>
+          <a:lstStyle/>
+          <a:p>
+            <a:r>
+              <a:rPr lang="en-US" sz="1100" b="1" dirty="0">
+                <a:solidFill>
+                  <a:srgbClr val="002060"/>
+                </a:solidFill>
+              </a:rPr>
+              <a:t>On train operation control PLC network </a:t>
+            </a:r>
+            <a:endParaRPr lang="en-SG" sz="1100" b="1" dirty="0">
+              <a:solidFill>
+                <a:srgbClr val="002060"/>
+              </a:solidFill>
+            </a:endParaRPr>
+          </a:p>
+        </p:txBody>
+      </p:sp>
+      <p:sp>
+        <p:nvSpPr>
+          <p:cNvPr id="71" name="TextBox 70">
+            <a:extLst>
+              <a:ext uri="{FF2B5EF4-FFF2-40B4-BE49-F238E27FC236}">
+                <a16:creationId xmlns:a16="http://schemas.microsoft.com/office/drawing/2014/main" id="{C5A5665C-2D76-A464-ED39-F720F96803E4}"/>
+              </a:ext>
+            </a:extLst>
+          </p:cNvPr>
+          <p:cNvSpPr txBox="1"/>
+          <p:nvPr/>
+        </p:nvSpPr>
+        <p:spPr>
+          <a:xfrm>
+            <a:off x="3305375" y="4523800"/>
+            <a:ext cx="818082" cy="276999"/>
+          </a:xfrm>
+          <a:prstGeom prst="rect">
+            <a:avLst/>
+          </a:prstGeom>
+          <a:noFill/>
+        </p:spPr>
+        <p:txBody>
+          <a:bodyPr wrap="square" rtlCol="0">
+            <a:spAutoFit/>
+          </a:bodyPr>
+          <a:lstStyle/>
+          <a:p>
+            <a:r>
+              <a:rPr lang="en-US" sz="1200" b="1" dirty="0">
+                <a:solidFill>
+                  <a:srgbClr val="FF0000"/>
+                </a:solidFill>
+              </a:rPr>
+              <a:t>PLC-11</a:t>
+            </a:r>
+          </a:p>
+        </p:txBody>
+      </p:sp>
+      <p:sp>
+        <p:nvSpPr>
+          <p:cNvPr id="72" name="TextBox 71">
+            <a:extLst>
+              <a:ext uri="{FF2B5EF4-FFF2-40B4-BE49-F238E27FC236}">
+                <a16:creationId xmlns:a16="http://schemas.microsoft.com/office/drawing/2014/main" id="{17A9F96F-1BC5-D4B2-4F3A-F55F74BF4E56}"/>
+              </a:ext>
+            </a:extLst>
+          </p:cNvPr>
+          <p:cNvSpPr txBox="1"/>
+          <p:nvPr/>
+        </p:nvSpPr>
+        <p:spPr>
+          <a:xfrm>
+            <a:off x="4554383" y="4530728"/>
+            <a:ext cx="757386" cy="276999"/>
+          </a:xfrm>
+          <a:prstGeom prst="rect">
+            <a:avLst/>
+          </a:prstGeom>
+          <a:noFill/>
+        </p:spPr>
+        <p:txBody>
+          <a:bodyPr wrap="square" rtlCol="0">
+            <a:spAutoFit/>
+          </a:bodyPr>
+          <a:lstStyle/>
+          <a:p>
+            <a:r>
+              <a:rPr lang="en-US" sz="1200" b="1" dirty="0">
+                <a:solidFill>
+                  <a:srgbClr val="FF0000"/>
+                </a:solidFill>
+              </a:rPr>
+              <a:t>PLC-12</a:t>
+            </a:r>
+          </a:p>
+        </p:txBody>
+      </p:sp>
+      <p:sp>
+        <p:nvSpPr>
+          <p:cNvPr id="73" name="TextBox 72">
+            <a:extLst>
+              <a:ext uri="{FF2B5EF4-FFF2-40B4-BE49-F238E27FC236}">
+                <a16:creationId xmlns:a16="http://schemas.microsoft.com/office/drawing/2014/main" id="{19DE159A-7BE5-4199-3F3E-6130EE6FEEAF}"/>
+              </a:ext>
+            </a:extLst>
+          </p:cNvPr>
+          <p:cNvSpPr txBox="1"/>
+          <p:nvPr/>
+        </p:nvSpPr>
+        <p:spPr>
+          <a:xfrm>
+            <a:off x="4531705" y="5168227"/>
+            <a:ext cx="1076579" cy="430887"/>
+          </a:xfrm>
+          <a:prstGeom prst="rect">
+            <a:avLst/>
+          </a:prstGeom>
+          <a:noFill/>
+        </p:spPr>
+        <p:txBody>
+          <a:bodyPr wrap="square" rtlCol="0">
+            <a:spAutoFit/>
+          </a:bodyPr>
+          <a:lstStyle/>
+          <a:p>
+            <a:r>
+              <a:rPr lang="en-US" sz="1100" b="1" dirty="0"/>
+              <a:t>[Slave, Slot-1] </a:t>
+            </a:r>
+            <a:r>
+              <a:rPr lang="en-SG" sz="1100" b="1" dirty="0"/>
+              <a:t>I/O: 2/4</a:t>
+            </a:r>
+          </a:p>
+        </p:txBody>
+      </p:sp>
+      <p:sp>
+        <p:nvSpPr>
+          <p:cNvPr id="74" name="TextBox 73">
+            <a:extLst>
+              <a:ext uri="{FF2B5EF4-FFF2-40B4-BE49-F238E27FC236}">
+                <a16:creationId xmlns:a16="http://schemas.microsoft.com/office/drawing/2014/main" id="{C912EF91-48B5-41EC-BD78-898AA89B10B1}"/>
+              </a:ext>
+            </a:extLst>
+          </p:cNvPr>
+          <p:cNvSpPr txBox="1"/>
+          <p:nvPr/>
+        </p:nvSpPr>
+        <p:spPr>
+          <a:xfrm>
+            <a:off x="3192306" y="5197083"/>
+            <a:ext cx="1239032" cy="430887"/>
+          </a:xfrm>
+          <a:prstGeom prst="rect">
+            <a:avLst/>
+          </a:prstGeom>
+          <a:noFill/>
+        </p:spPr>
+        <p:txBody>
+          <a:bodyPr wrap="square" rtlCol="0">
+            <a:spAutoFit/>
+          </a:bodyPr>
+          <a:lstStyle/>
+          <a:p>
+            <a:r>
+              <a:rPr lang="en-US" sz="1100" b="1" dirty="0"/>
+              <a:t>[Master, Slot-0]</a:t>
+            </a:r>
+          </a:p>
+          <a:p>
+            <a:r>
+              <a:rPr lang="en-US" sz="1100" b="1" dirty="0"/>
+              <a:t>I/O: 8/16</a:t>
+            </a:r>
+            <a:endParaRPr lang="en-SG" sz="1100" b="1" dirty="0"/>
+          </a:p>
+        </p:txBody>
+      </p:sp>
+      <p:pic>
+        <p:nvPicPr>
+          <p:cNvPr id="75" name="Picture 8" descr="Router | Cisco Network Topology Icons 3015">
+            <a:extLst>
+              <a:ext uri="{FF2B5EF4-FFF2-40B4-BE49-F238E27FC236}">
+                <a16:creationId xmlns:a16="http://schemas.microsoft.com/office/drawing/2014/main" id="{9CE4912C-A5A4-5BA6-CA25-835643C77786}"/>
+              </a:ext>
+            </a:extLst>
+          </p:cNvPr>
+          <p:cNvPicPr>
+            <a:picLocks noChangeAspect="1" noChangeArrowheads="1"/>
+          </p:cNvPicPr>
+          <p:nvPr/>
+        </p:nvPicPr>
+        <p:blipFill>
+          <a:blip r:embed="rId3">
+            <a:extLst>
+              <a:ext uri="{28A0092B-C50C-407E-A947-70E740481C1C}">
+                <a14:useLocalDpi xmlns:a14="http://schemas.microsoft.com/office/drawing/2010/main" val="0"/>
+              </a:ext>
+            </a:extLst>
+          </a:blip>
+          <a:srcRect/>
+          <a:stretch>
+            <a:fillRect/>
+          </a:stretch>
+        </p:blipFill>
+        <p:spPr bwMode="auto">
+          <a:xfrm>
+            <a:off x="4269936" y="4076074"/>
+            <a:ext cx="379197" cy="259303"/>
+          </a:xfrm>
+          <a:prstGeom prst="rect">
+            <a:avLst/>
+          </a:prstGeom>
+          <a:noFill/>
+          <a:extLst>
+            <a:ext uri="{909E8E84-426E-40DD-AFC4-6F175D3DCCD1}">
+              <a14:hiddenFill xmlns:a14="http://schemas.microsoft.com/office/drawing/2010/main">
+                <a:solidFill>
+                  <a:srgbClr val="FFFFFF"/>
+                </a:solidFill>
+              </a14:hiddenFill>
+            </a:ext>
+          </a:extLst>
+        </p:spPr>
+      </p:pic>
+      <p:cxnSp>
+        <p:nvCxnSpPr>
+          <p:cNvPr id="76" name="Straight Connector 75">
+            <a:extLst>
+              <a:ext uri="{FF2B5EF4-FFF2-40B4-BE49-F238E27FC236}">
+                <a16:creationId xmlns:a16="http://schemas.microsoft.com/office/drawing/2014/main" id="{4E1A5B5D-CB70-BC1C-B1F2-FEF1836031CB}"/>
+              </a:ext>
+            </a:extLst>
+          </p:cNvPr>
+          <p:cNvCxnSpPr>
+            <a:cxnSpLocks/>
+          </p:cNvCxnSpPr>
+          <p:nvPr/>
+        </p:nvCxnSpPr>
+        <p:spPr>
+          <a:xfrm>
+            <a:off x="4115110" y="5014460"/>
+            <a:ext cx="430989" cy="0"/>
+          </a:xfrm>
+          <a:prstGeom prst="line">
+            <a:avLst/>
+          </a:prstGeom>
+          <a:ln w="19050"/>
+        </p:spPr>
+        <p:style>
+          <a:lnRef idx="1">
+            <a:schemeClr val="dk1"/>
+          </a:lnRef>
+          <a:fillRef idx="0">
+            <a:schemeClr val="dk1"/>
+          </a:fillRef>
+          <a:effectRef idx="0">
+            <a:schemeClr val="dk1"/>
+          </a:effectRef>
+          <a:fontRef idx="minor">
+            <a:schemeClr val="tx1"/>
+          </a:fontRef>
+        </p:style>
+      </p:cxnSp>
+      <p:sp>
+        <p:nvSpPr>
+          <p:cNvPr id="90" name="TextBox 89">
+            <a:extLst>
+              <a:ext uri="{FF2B5EF4-FFF2-40B4-BE49-F238E27FC236}">
+                <a16:creationId xmlns:a16="http://schemas.microsoft.com/office/drawing/2014/main" id="{A301CC12-94EE-35CD-C323-A25817A5DCA3}"/>
+              </a:ext>
+            </a:extLst>
+          </p:cNvPr>
+          <p:cNvSpPr txBox="1"/>
+          <p:nvPr/>
+        </p:nvSpPr>
+        <p:spPr>
+          <a:xfrm>
+            <a:off x="4580436" y="3909812"/>
+            <a:ext cx="1023376" cy="261610"/>
+          </a:xfrm>
+          <a:prstGeom prst="rect">
+            <a:avLst/>
+          </a:prstGeom>
+          <a:noFill/>
+        </p:spPr>
+        <p:txBody>
+          <a:bodyPr wrap="square" rtlCol="0">
+            <a:spAutoFit/>
+          </a:bodyPr>
+          <a:lstStyle/>
+          <a:p>
+            <a:r>
+              <a:rPr lang="en-US" sz="1100" b="1" dirty="0">
+                <a:solidFill>
+                  <a:srgbClr val="0070C0"/>
+                </a:solidFill>
+              </a:rPr>
+              <a:t>10.0.10.13X</a:t>
+            </a:r>
+            <a:endParaRPr lang="en-SG" sz="1100" b="1" dirty="0">
+              <a:solidFill>
+                <a:srgbClr val="0070C0"/>
+              </a:solidFill>
+            </a:endParaRPr>
+          </a:p>
+        </p:txBody>
+      </p:sp>
+      <p:pic>
+        <p:nvPicPr>
+          <p:cNvPr id="95" name="Picture 94">
+            <a:extLst>
+              <a:ext uri="{FF2B5EF4-FFF2-40B4-BE49-F238E27FC236}">
+                <a16:creationId xmlns:a16="http://schemas.microsoft.com/office/drawing/2014/main" id="{3AADB3A9-70A2-5F72-9AF4-1D90AC2575DF}"/>
+              </a:ext>
+            </a:extLst>
+          </p:cNvPr>
+          <p:cNvPicPr>
+            <a:picLocks noChangeAspect="1"/>
+          </p:cNvPicPr>
+          <p:nvPr/>
+        </p:nvPicPr>
+        <p:blipFill>
+          <a:blip r:embed="rId7"/>
+          <a:stretch>
+            <a:fillRect/>
+          </a:stretch>
+        </p:blipFill>
+        <p:spPr>
+          <a:xfrm>
+            <a:off x="6331717" y="4646787"/>
+            <a:ext cx="1338285" cy="731277"/>
+          </a:xfrm>
+          <a:prstGeom prst="rect">
+            <a:avLst/>
+          </a:prstGeom>
+        </p:spPr>
+      </p:pic>
+      <p:sp>
+        <p:nvSpPr>
+          <p:cNvPr id="98" name="TextBox 97">
+            <a:extLst>
+              <a:ext uri="{FF2B5EF4-FFF2-40B4-BE49-F238E27FC236}">
+                <a16:creationId xmlns:a16="http://schemas.microsoft.com/office/drawing/2014/main" id="{CE46C77B-FE79-D549-4902-19B699ADECF0}"/>
+              </a:ext>
+            </a:extLst>
+          </p:cNvPr>
+          <p:cNvSpPr txBox="1"/>
+          <p:nvPr/>
+        </p:nvSpPr>
+        <p:spPr>
+          <a:xfrm>
+            <a:off x="6378015" y="4439446"/>
+            <a:ext cx="1194817" cy="276999"/>
+          </a:xfrm>
+          <a:prstGeom prst="rect">
+            <a:avLst/>
+          </a:prstGeom>
+          <a:noFill/>
+        </p:spPr>
+        <p:txBody>
+          <a:bodyPr wrap="square" rtlCol="0">
+            <a:spAutoFit/>
+          </a:bodyPr>
+          <a:lstStyle/>
+          <a:p>
+            <a:r>
+              <a:rPr lang="en-US" sz="1200" b="1" dirty="0">
+                <a:solidFill>
+                  <a:srgbClr val="FF0000"/>
+                </a:solidFill>
+              </a:rPr>
+              <a:t>RTU 00 - 09</a:t>
+            </a:r>
+          </a:p>
+        </p:txBody>
+      </p:sp>
+      <p:sp>
+        <p:nvSpPr>
+          <p:cNvPr id="110" name="TextBox 109">
+            <a:extLst>
+              <a:ext uri="{FF2B5EF4-FFF2-40B4-BE49-F238E27FC236}">
+                <a16:creationId xmlns:a16="http://schemas.microsoft.com/office/drawing/2014/main" id="{DAA16EDB-7B6B-0928-572A-DEF59BBBE90A}"/>
+              </a:ext>
+            </a:extLst>
+          </p:cNvPr>
+          <p:cNvSpPr txBox="1"/>
+          <p:nvPr/>
+        </p:nvSpPr>
+        <p:spPr>
+          <a:xfrm>
+            <a:off x="5963931" y="4234397"/>
+            <a:ext cx="1632906" cy="261610"/>
+          </a:xfrm>
+          <a:prstGeom prst="rect">
+            <a:avLst/>
+          </a:prstGeom>
+          <a:noFill/>
+        </p:spPr>
+        <p:txBody>
+          <a:bodyPr wrap="square" rtlCol="0">
+            <a:spAutoFit/>
+          </a:bodyPr>
+          <a:lstStyle/>
+          <a:p>
+            <a:r>
+              <a:rPr lang="en-US" sz="1100" b="1" dirty="0">
+                <a:solidFill>
+                  <a:srgbClr val="002060"/>
+                </a:solidFill>
+              </a:rPr>
+              <a:t>On train RTU network </a:t>
+            </a:r>
+            <a:endParaRPr lang="en-SG" sz="1100" b="1" dirty="0">
+              <a:solidFill>
+                <a:srgbClr val="002060"/>
+              </a:solidFill>
+            </a:endParaRPr>
+          </a:p>
+        </p:txBody>
+      </p:sp>
+      <p:pic>
+        <p:nvPicPr>
+          <p:cNvPr id="111" name="Picture 8" descr="Router | Cisco Network Topology Icons 3015">
+            <a:extLst>
+              <a:ext uri="{FF2B5EF4-FFF2-40B4-BE49-F238E27FC236}">
+                <a16:creationId xmlns:a16="http://schemas.microsoft.com/office/drawing/2014/main" id="{243991F1-37FF-5E62-C462-5CF3E443CB01}"/>
+              </a:ext>
+            </a:extLst>
+          </p:cNvPr>
+          <p:cNvPicPr>
+            <a:picLocks noChangeAspect="1" noChangeArrowheads="1"/>
+          </p:cNvPicPr>
+          <p:nvPr/>
+        </p:nvPicPr>
+        <p:blipFill>
+          <a:blip r:embed="rId3">
+            <a:extLst>
+              <a:ext uri="{28A0092B-C50C-407E-A947-70E740481C1C}">
+                <a14:useLocalDpi xmlns:a14="http://schemas.microsoft.com/office/drawing/2010/main" val="0"/>
+              </a:ext>
+            </a:extLst>
+          </a:blip>
+          <a:srcRect/>
+          <a:stretch>
+            <a:fillRect/>
+          </a:stretch>
+        </p:blipFill>
+        <p:spPr bwMode="auto">
+          <a:xfrm>
+            <a:off x="6683864" y="3991000"/>
+            <a:ext cx="379197" cy="259303"/>
+          </a:xfrm>
+          <a:prstGeom prst="rect">
+            <a:avLst/>
+          </a:prstGeom>
+          <a:noFill/>
+          <a:extLst>
+            <a:ext uri="{909E8E84-426E-40DD-AFC4-6F175D3DCCD1}">
+              <a14:hiddenFill xmlns:a14="http://schemas.microsoft.com/office/drawing/2010/main">
+                <a:solidFill>
+                  <a:srgbClr val="FFFFFF"/>
+                </a:solidFill>
+              </a14:hiddenFill>
+            </a:ext>
+          </a:extLst>
+        </p:spPr>
+      </p:pic>
+      <p:cxnSp>
+        <p:nvCxnSpPr>
+          <p:cNvPr id="112" name="Connector: Elbow 111">
+            <a:extLst>
+              <a:ext uri="{FF2B5EF4-FFF2-40B4-BE49-F238E27FC236}">
+                <a16:creationId xmlns:a16="http://schemas.microsoft.com/office/drawing/2014/main" id="{88D62EBB-B0DE-FB1B-3D06-6B529FE70CCB}"/>
+              </a:ext>
+            </a:extLst>
+          </p:cNvPr>
+          <p:cNvCxnSpPr>
+            <a:cxnSpLocks/>
+            <a:endCxn id="111" idx="0"/>
+          </p:cNvCxnSpPr>
+          <p:nvPr/>
+        </p:nvCxnSpPr>
+        <p:spPr>
+          <a:xfrm rot="16200000" flipH="1">
+            <a:off x="4615693" y="1733229"/>
+            <a:ext cx="618573" cy="3896968"/>
+          </a:xfrm>
+          <a:prstGeom prst="bentConnector3">
+            <a:avLst>
+              <a:gd name="adj1" fmla="val 17664"/>
+            </a:avLst>
+          </a:prstGeom>
+          <a:ln>
+            <a:solidFill>
+              <a:schemeClr val="tx1"/>
+            </a:solidFill>
+            <a:tailEnd type="triangle"/>
+          </a:ln>
+        </p:spPr>
+        <p:style>
+          <a:lnRef idx="1">
+            <a:schemeClr val="accent1"/>
+          </a:lnRef>
+          <a:fillRef idx="0">
+            <a:schemeClr val="accent1"/>
+          </a:fillRef>
+          <a:effectRef idx="0">
+            <a:schemeClr val="accent1"/>
+          </a:effectRef>
+          <a:fontRef idx="minor">
+            <a:schemeClr val="tx1"/>
+          </a:fontRef>
+        </p:style>
+      </p:cxnSp>
+      <p:sp>
+        <p:nvSpPr>
+          <p:cNvPr id="6" name="Rectangle 5">
+            <a:extLst>
+              <a:ext uri="{FF2B5EF4-FFF2-40B4-BE49-F238E27FC236}">
+                <a16:creationId xmlns:a16="http://schemas.microsoft.com/office/drawing/2014/main" id="{AC3AF215-98B6-A782-901F-7C858B4DCC83}"/>
+              </a:ext>
+            </a:extLst>
+          </p:cNvPr>
+          <p:cNvSpPr/>
+          <p:nvPr/>
+        </p:nvSpPr>
+        <p:spPr>
+          <a:xfrm>
+            <a:off x="1306059" y="3333104"/>
+            <a:ext cx="2324999" cy="396218"/>
+          </a:xfrm>
+          <a:prstGeom prst="rect">
+            <a:avLst/>
+          </a:prstGeom>
+          <a:ln>
+            <a:solidFill>
+              <a:schemeClr val="tx1"/>
+            </a:solidFill>
+          </a:ln>
+        </p:spPr>
+        <p:style>
+          <a:lnRef idx="2">
+            <a:schemeClr val="accent1">
+              <a:shade val="50000"/>
+            </a:schemeClr>
+          </a:lnRef>
+          <a:fillRef idx="1">
+            <a:schemeClr val="accent1"/>
+          </a:fillRef>
+          <a:effectRef idx="0">
+            <a:schemeClr val="accent1"/>
+          </a:effectRef>
+          <a:fontRef idx="minor">
+            <a:schemeClr val="lt1"/>
+          </a:fontRef>
+        </p:style>
+        <p:txBody>
+          <a:bodyPr rtlCol="0" anchor="ctr"/>
+          <a:lstStyle/>
+          <a:p>
+            <a:r>
+              <a:rPr lang="en-US" sz="1100" b="1" dirty="0"/>
+              <a:t>Electrical signal communication simulation module (10.0.10.100) </a:t>
+            </a:r>
+            <a:endParaRPr lang="en-SG" sz="1100" b="1" dirty="0"/>
+          </a:p>
+        </p:txBody>
+      </p:sp>
+      <p:sp>
+        <p:nvSpPr>
+          <p:cNvPr id="119" name="TextBox 118">
+            <a:extLst>
+              <a:ext uri="{FF2B5EF4-FFF2-40B4-BE49-F238E27FC236}">
+                <a16:creationId xmlns:a16="http://schemas.microsoft.com/office/drawing/2014/main" id="{37F5DB2D-9E80-68B7-C8DC-DA13BF7AFC5E}"/>
+              </a:ext>
+            </a:extLst>
+          </p:cNvPr>
+          <p:cNvSpPr txBox="1"/>
+          <p:nvPr/>
+        </p:nvSpPr>
+        <p:spPr>
+          <a:xfrm>
+            <a:off x="5656206" y="3505008"/>
+            <a:ext cx="1397573" cy="507831"/>
+          </a:xfrm>
+          <a:prstGeom prst="rect">
+            <a:avLst/>
+          </a:prstGeom>
+          <a:noFill/>
+        </p:spPr>
+        <p:txBody>
+          <a:bodyPr wrap="square" rtlCol="0">
+            <a:spAutoFit/>
+          </a:bodyPr>
+          <a:lstStyle/>
+          <a:p>
+            <a:r>
+              <a:rPr lang="en-US" sz="900" dirty="0"/>
+              <a:t>50 RTU input ( trains throttle, brake, voltage, current ,speed sensors) </a:t>
+            </a:r>
+            <a:endParaRPr lang="en-SG" sz="900" dirty="0"/>
+          </a:p>
+        </p:txBody>
+      </p:sp>
+      <p:cxnSp>
+        <p:nvCxnSpPr>
+          <p:cNvPr id="126" name="Straight Arrow Connector 125">
+            <a:extLst>
+              <a:ext uri="{FF2B5EF4-FFF2-40B4-BE49-F238E27FC236}">
+                <a16:creationId xmlns:a16="http://schemas.microsoft.com/office/drawing/2014/main" id="{8C27F744-19F4-3CA4-139A-07B5EC5305E8}"/>
+              </a:ext>
+            </a:extLst>
+          </p:cNvPr>
+          <p:cNvCxnSpPr>
+            <a:cxnSpLocks/>
+            <a:stCxn id="67" idx="3"/>
+            <a:endCxn id="95" idx="1"/>
+          </p:cNvCxnSpPr>
+          <p:nvPr/>
+        </p:nvCxnSpPr>
+        <p:spPr>
+          <a:xfrm>
+            <a:off x="5364181" y="4991778"/>
+            <a:ext cx="967536" cy="0"/>
+          </a:xfrm>
+          <a:prstGeom prst="straightConnector1">
+            <a:avLst/>
+          </a:prstGeom>
+          <a:ln w="19050">
+            <a:headEnd type="triangle"/>
+            <a:tailEnd type="triangle"/>
+          </a:ln>
+        </p:spPr>
+        <p:style>
+          <a:lnRef idx="1">
+            <a:schemeClr val="accent1"/>
+          </a:lnRef>
+          <a:fillRef idx="0">
+            <a:schemeClr val="accent1"/>
+          </a:fillRef>
+          <a:effectRef idx="0">
+            <a:schemeClr val="accent1"/>
+          </a:effectRef>
+          <a:fontRef idx="minor">
+            <a:schemeClr val="tx1"/>
+          </a:fontRef>
+        </p:style>
+      </p:cxnSp>
+      <p:sp>
+        <p:nvSpPr>
+          <p:cNvPr id="128" name="TextBox 127">
+            <a:extLst>
+              <a:ext uri="{FF2B5EF4-FFF2-40B4-BE49-F238E27FC236}">
+                <a16:creationId xmlns:a16="http://schemas.microsoft.com/office/drawing/2014/main" id="{17BF242A-1A88-4AA5-0B94-A1608C3DDF9F}"/>
+              </a:ext>
+            </a:extLst>
+          </p:cNvPr>
+          <p:cNvSpPr txBox="1"/>
+          <p:nvPr/>
+        </p:nvSpPr>
+        <p:spPr>
+          <a:xfrm>
+            <a:off x="5505748" y="4469709"/>
+            <a:ext cx="901390" cy="507831"/>
+          </a:xfrm>
+          <a:prstGeom prst="rect">
+            <a:avLst/>
+          </a:prstGeom>
+          <a:noFill/>
+        </p:spPr>
+        <p:txBody>
+          <a:bodyPr wrap="square" rtlCol="0">
+            <a:spAutoFit/>
+          </a:bodyPr>
+          <a:lstStyle/>
+          <a:p>
+            <a:r>
+              <a:rPr lang="en-US" sz="900" b="1" dirty="0"/>
+              <a:t>Serial Comm link between PLC and RTU</a:t>
+            </a:r>
+            <a:endParaRPr lang="en-SG" sz="900" b="1" dirty="0"/>
+          </a:p>
+        </p:txBody>
+      </p:sp>
+      <p:cxnSp>
+        <p:nvCxnSpPr>
+          <p:cNvPr id="129" name="Straight Connector 128">
+            <a:extLst>
+              <a:ext uri="{FF2B5EF4-FFF2-40B4-BE49-F238E27FC236}">
+                <a16:creationId xmlns:a16="http://schemas.microsoft.com/office/drawing/2014/main" id="{6F216130-BD2E-923B-3220-FB8E57C6B8DA}"/>
+              </a:ext>
+            </a:extLst>
+          </p:cNvPr>
+          <p:cNvCxnSpPr>
+            <a:cxnSpLocks/>
+          </p:cNvCxnSpPr>
+          <p:nvPr/>
+        </p:nvCxnSpPr>
+        <p:spPr>
+          <a:xfrm>
+            <a:off x="496324" y="6220068"/>
+            <a:ext cx="11105126" cy="0"/>
+          </a:xfrm>
+          <a:prstGeom prst="line">
+            <a:avLst/>
+          </a:prstGeom>
+          <a:ln w="38100">
+            <a:solidFill>
+              <a:srgbClr val="00B050"/>
+            </a:solidFill>
+          </a:ln>
+        </p:spPr>
+        <p:style>
+          <a:lnRef idx="1">
+            <a:schemeClr val="accent1"/>
+          </a:lnRef>
+          <a:fillRef idx="0">
+            <a:schemeClr val="accent1"/>
+          </a:fillRef>
+          <a:effectRef idx="0">
+            <a:schemeClr val="accent1"/>
+          </a:effectRef>
+          <a:fontRef idx="minor">
+            <a:schemeClr val="tx1"/>
+          </a:fontRef>
+        </p:style>
+      </p:cxnSp>
+      <p:cxnSp>
+        <p:nvCxnSpPr>
+          <p:cNvPr id="130" name="Straight Arrow Connector 129">
+            <a:extLst>
+              <a:ext uri="{FF2B5EF4-FFF2-40B4-BE49-F238E27FC236}">
+                <a16:creationId xmlns:a16="http://schemas.microsoft.com/office/drawing/2014/main" id="{46A2FCF1-5A71-6833-01B8-05DD339D4036}"/>
+              </a:ext>
+            </a:extLst>
+          </p:cNvPr>
+          <p:cNvCxnSpPr>
+            <a:cxnSpLocks/>
+          </p:cNvCxnSpPr>
+          <p:nvPr/>
+        </p:nvCxnSpPr>
+        <p:spPr>
+          <a:xfrm>
+            <a:off x="3758548" y="5599114"/>
+            <a:ext cx="0" cy="631899"/>
+          </a:xfrm>
+          <a:prstGeom prst="straightConnector1">
+            <a:avLst/>
+          </a:prstGeom>
+          <a:ln w="19050">
+            <a:solidFill>
+              <a:srgbClr val="00B050"/>
+            </a:solidFill>
+            <a:headEnd type="triangle"/>
+            <a:tailEnd type="triangle"/>
+          </a:ln>
+        </p:spPr>
+        <p:style>
+          <a:lnRef idx="1">
+            <a:schemeClr val="accent1"/>
+          </a:lnRef>
+          <a:fillRef idx="0">
+            <a:schemeClr val="accent1"/>
+          </a:fillRef>
+          <a:effectRef idx="0">
+            <a:schemeClr val="accent1"/>
+          </a:effectRef>
+          <a:fontRef idx="minor">
+            <a:schemeClr val="tx1"/>
+          </a:fontRef>
+        </p:style>
+      </p:cxnSp>
+      <p:sp>
+        <p:nvSpPr>
+          <p:cNvPr id="132" name="TextBox 131">
+            <a:extLst>
+              <a:ext uri="{FF2B5EF4-FFF2-40B4-BE49-F238E27FC236}">
+                <a16:creationId xmlns:a16="http://schemas.microsoft.com/office/drawing/2014/main" id="{1758140E-B240-9A7D-5CB6-3AFD49BAE92C}"/>
+              </a:ext>
+            </a:extLst>
+          </p:cNvPr>
+          <p:cNvSpPr txBox="1"/>
+          <p:nvPr/>
+        </p:nvSpPr>
+        <p:spPr>
+          <a:xfrm>
+            <a:off x="3790668" y="5604399"/>
+            <a:ext cx="1491717" cy="400110"/>
+          </a:xfrm>
+          <a:prstGeom prst="rect">
+            <a:avLst/>
+          </a:prstGeom>
+          <a:noFill/>
+        </p:spPr>
+        <p:txBody>
+          <a:bodyPr wrap="square" rtlCol="0">
+            <a:spAutoFit/>
+          </a:bodyPr>
+          <a:lstStyle/>
+          <a:p>
+            <a:r>
+              <a:rPr lang="en-US" sz="1000" dirty="0"/>
+              <a:t>Register read request  and Coils set request </a:t>
+            </a:r>
+            <a:endParaRPr lang="en-SG" sz="1000" dirty="0"/>
+          </a:p>
+        </p:txBody>
+      </p:sp>
+      <p:cxnSp>
+        <p:nvCxnSpPr>
+          <p:cNvPr id="133" name="Straight Connector 132">
+            <a:extLst>
+              <a:ext uri="{FF2B5EF4-FFF2-40B4-BE49-F238E27FC236}">
+                <a16:creationId xmlns:a16="http://schemas.microsoft.com/office/drawing/2014/main" id="{5801CB94-B91B-3BDF-CB00-C82B7F7E8EEB}"/>
+              </a:ext>
+            </a:extLst>
+          </p:cNvPr>
+          <p:cNvCxnSpPr>
+            <a:cxnSpLocks/>
+          </p:cNvCxnSpPr>
+          <p:nvPr/>
+        </p:nvCxnSpPr>
+        <p:spPr>
+          <a:xfrm>
+            <a:off x="474808" y="6485008"/>
+            <a:ext cx="8007657" cy="13783"/>
+          </a:xfrm>
+          <a:prstGeom prst="line">
+            <a:avLst/>
+          </a:prstGeom>
+          <a:ln w="38100">
+            <a:solidFill>
+              <a:srgbClr val="0070C0"/>
+            </a:solidFill>
+          </a:ln>
+        </p:spPr>
+        <p:style>
+          <a:lnRef idx="1">
+            <a:schemeClr val="accent1"/>
+          </a:lnRef>
+          <a:fillRef idx="0">
+            <a:schemeClr val="accent1"/>
+          </a:fillRef>
+          <a:effectRef idx="0">
+            <a:schemeClr val="accent1"/>
+          </a:effectRef>
+          <a:fontRef idx="minor">
+            <a:schemeClr val="tx1"/>
+          </a:fontRef>
+        </p:style>
+      </p:cxnSp>
+      <p:cxnSp>
+        <p:nvCxnSpPr>
+          <p:cNvPr id="135" name="Straight Arrow Connector 134">
+            <a:extLst>
+              <a:ext uri="{FF2B5EF4-FFF2-40B4-BE49-F238E27FC236}">
+                <a16:creationId xmlns:a16="http://schemas.microsoft.com/office/drawing/2014/main" id="{9B6061D1-F73B-BD3D-E801-0F2560F961F2}"/>
+              </a:ext>
+            </a:extLst>
+          </p:cNvPr>
+          <p:cNvCxnSpPr>
+            <a:cxnSpLocks/>
+          </p:cNvCxnSpPr>
+          <p:nvPr/>
+        </p:nvCxnSpPr>
+        <p:spPr>
+          <a:xfrm>
+            <a:off x="6239466" y="5567062"/>
+            <a:ext cx="0" cy="939462"/>
+          </a:xfrm>
+          <a:prstGeom prst="straightConnector1">
+            <a:avLst/>
+          </a:prstGeom>
+          <a:ln w="19050">
+            <a:solidFill>
+              <a:srgbClr val="0070C0"/>
+            </a:solidFill>
+            <a:headEnd type="triangle"/>
+            <a:tailEnd type="triangle"/>
+          </a:ln>
+        </p:spPr>
+        <p:style>
+          <a:lnRef idx="1">
+            <a:schemeClr val="accent1"/>
+          </a:lnRef>
+          <a:fillRef idx="0">
+            <a:schemeClr val="accent1"/>
+          </a:fillRef>
+          <a:effectRef idx="0">
+            <a:schemeClr val="accent1"/>
+          </a:effectRef>
+          <a:fontRef idx="minor">
+            <a:schemeClr val="tx1"/>
+          </a:fontRef>
+        </p:style>
+      </p:cxnSp>
+      <p:pic>
+        <p:nvPicPr>
+          <p:cNvPr id="141" name="Picture 140">
+            <a:extLst>
+              <a:ext uri="{FF2B5EF4-FFF2-40B4-BE49-F238E27FC236}">
+                <a16:creationId xmlns:a16="http://schemas.microsoft.com/office/drawing/2014/main" id="{E5BE1E9F-B388-F275-247E-6EF43C06CB87}"/>
+              </a:ext>
+            </a:extLst>
+          </p:cNvPr>
+          <p:cNvPicPr>
+            <a:picLocks noChangeAspect="1"/>
+          </p:cNvPicPr>
+          <p:nvPr/>
+        </p:nvPicPr>
+        <p:blipFill>
+          <a:blip r:embed="rId8"/>
+          <a:stretch>
+            <a:fillRect/>
+          </a:stretch>
+        </p:blipFill>
+        <p:spPr>
+          <a:xfrm>
+            <a:off x="6851998" y="466753"/>
+            <a:ext cx="4903967" cy="2639969"/>
+          </a:xfrm>
+          <a:prstGeom prst="rect">
+            <a:avLst/>
+          </a:prstGeom>
+          <a:ln w="9525">
+            <a:solidFill>
+              <a:schemeClr val="tx1"/>
+            </a:solidFill>
+          </a:ln>
+        </p:spPr>
+      </p:pic>
+      <p:cxnSp>
+        <p:nvCxnSpPr>
+          <p:cNvPr id="142" name="Straight Arrow Connector 141">
+            <a:extLst>
+              <a:ext uri="{FF2B5EF4-FFF2-40B4-BE49-F238E27FC236}">
+                <a16:creationId xmlns:a16="http://schemas.microsoft.com/office/drawing/2014/main" id="{E185D8D7-6E1B-8966-660E-B5F2274D8A06}"/>
+              </a:ext>
+            </a:extLst>
+          </p:cNvPr>
+          <p:cNvCxnSpPr>
+            <a:cxnSpLocks/>
+          </p:cNvCxnSpPr>
+          <p:nvPr/>
+        </p:nvCxnSpPr>
+        <p:spPr>
+          <a:xfrm flipH="1">
+            <a:off x="8382097" y="4646787"/>
+            <a:ext cx="0" cy="1859737"/>
+          </a:xfrm>
+          <a:prstGeom prst="straightConnector1">
+            <a:avLst/>
+          </a:prstGeom>
+          <a:ln w="19050">
+            <a:solidFill>
+              <a:srgbClr val="0070C0"/>
+            </a:solidFill>
+            <a:headEnd type="triangle"/>
+            <a:tailEnd type="triangle"/>
+          </a:ln>
+        </p:spPr>
+        <p:style>
+          <a:lnRef idx="1">
+            <a:schemeClr val="accent1"/>
+          </a:lnRef>
+          <a:fillRef idx="0">
+            <a:schemeClr val="accent1"/>
+          </a:fillRef>
+          <a:effectRef idx="0">
+            <a:schemeClr val="accent1"/>
+          </a:effectRef>
+          <a:fontRef idx="minor">
+            <a:schemeClr val="tx1"/>
+          </a:fontRef>
+        </p:style>
+      </p:cxnSp>
+      <p:cxnSp>
+        <p:nvCxnSpPr>
+          <p:cNvPr id="148" name="Straight Arrow Connector 147">
+            <a:extLst>
+              <a:ext uri="{FF2B5EF4-FFF2-40B4-BE49-F238E27FC236}">
+                <a16:creationId xmlns:a16="http://schemas.microsoft.com/office/drawing/2014/main" id="{386051B3-CB96-DA01-A111-7E8CDC91A5D4}"/>
+              </a:ext>
+            </a:extLst>
+          </p:cNvPr>
+          <p:cNvCxnSpPr>
+            <a:cxnSpLocks/>
+          </p:cNvCxnSpPr>
+          <p:nvPr/>
+        </p:nvCxnSpPr>
+        <p:spPr>
+          <a:xfrm>
+            <a:off x="9468080" y="5981686"/>
+            <a:ext cx="0" cy="238382"/>
+          </a:xfrm>
+          <a:prstGeom prst="straightConnector1">
+            <a:avLst/>
+          </a:prstGeom>
+          <a:ln w="19050">
+            <a:solidFill>
+              <a:srgbClr val="00B050"/>
+            </a:solidFill>
+            <a:headEnd type="triangle"/>
+            <a:tailEnd type="triangle"/>
+          </a:ln>
+        </p:spPr>
+        <p:style>
+          <a:lnRef idx="1">
+            <a:schemeClr val="accent1"/>
+          </a:lnRef>
+          <a:fillRef idx="0">
+            <a:schemeClr val="accent1"/>
+          </a:fillRef>
+          <a:effectRef idx="0">
+            <a:schemeClr val="accent1"/>
+          </a:effectRef>
+          <a:fontRef idx="minor">
+            <a:schemeClr val="tx1"/>
+          </a:fontRef>
+        </p:style>
+      </p:cxnSp>
+      <p:cxnSp>
+        <p:nvCxnSpPr>
+          <p:cNvPr id="150" name="Straight Arrow Connector 149">
+            <a:extLst>
+              <a:ext uri="{FF2B5EF4-FFF2-40B4-BE49-F238E27FC236}">
+                <a16:creationId xmlns:a16="http://schemas.microsoft.com/office/drawing/2014/main" id="{92081FFD-ADD2-0E61-EFA8-B58A59FE866F}"/>
+              </a:ext>
+            </a:extLst>
+          </p:cNvPr>
+          <p:cNvCxnSpPr>
+            <a:cxnSpLocks/>
+          </p:cNvCxnSpPr>
+          <p:nvPr/>
+        </p:nvCxnSpPr>
+        <p:spPr>
+          <a:xfrm>
+            <a:off x="9746974" y="5966274"/>
+            <a:ext cx="0" cy="735740"/>
+          </a:xfrm>
+          <a:prstGeom prst="straightConnector1">
+            <a:avLst/>
+          </a:prstGeom>
+          <a:ln w="19050">
+            <a:solidFill>
+              <a:srgbClr val="0070C0"/>
+            </a:solidFill>
+            <a:headEnd type="triangle"/>
+            <a:tailEnd type="triangle"/>
+          </a:ln>
+        </p:spPr>
+        <p:style>
+          <a:lnRef idx="1">
+            <a:schemeClr val="accent1"/>
+          </a:lnRef>
+          <a:fillRef idx="0">
+            <a:schemeClr val="accent1"/>
+          </a:fillRef>
+          <a:effectRef idx="0">
+            <a:schemeClr val="accent1"/>
+          </a:effectRef>
+          <a:fontRef idx="minor">
+            <a:schemeClr val="tx1"/>
+          </a:fontRef>
+        </p:style>
+      </p:cxnSp>
+      <p:sp>
+        <p:nvSpPr>
+          <p:cNvPr id="153" name="TextBox 152">
+            <a:extLst>
+              <a:ext uri="{FF2B5EF4-FFF2-40B4-BE49-F238E27FC236}">
+                <a16:creationId xmlns:a16="http://schemas.microsoft.com/office/drawing/2014/main" id="{B1778ACC-2317-4DAA-E765-6570913C8884}"/>
+              </a:ext>
+            </a:extLst>
+          </p:cNvPr>
+          <p:cNvSpPr txBox="1"/>
+          <p:nvPr/>
+        </p:nvSpPr>
+        <p:spPr>
+          <a:xfrm>
+            <a:off x="8620089" y="3104818"/>
+            <a:ext cx="3167682" cy="307777"/>
+          </a:xfrm>
+          <a:prstGeom prst="rect">
+            <a:avLst/>
+          </a:prstGeom>
+          <a:noFill/>
+        </p:spPr>
+        <p:txBody>
+          <a:bodyPr wrap="square" rtlCol="0">
+            <a:spAutoFit/>
+          </a:bodyPr>
+          <a:lstStyle/>
+          <a:p>
+            <a:r>
+              <a:rPr lang="en-US" sz="1400" b="1" dirty="0"/>
+              <a:t>Train driver consoles </a:t>
+            </a:r>
+            <a:endParaRPr lang="en-SG" sz="1400" b="1" dirty="0"/>
+          </a:p>
+        </p:txBody>
+      </p:sp>
+      <p:pic>
+        <p:nvPicPr>
+          <p:cNvPr id="154" name="Picture 153">
+            <a:extLst>
+              <a:ext uri="{FF2B5EF4-FFF2-40B4-BE49-F238E27FC236}">
+                <a16:creationId xmlns:a16="http://schemas.microsoft.com/office/drawing/2014/main" id="{DA1911A7-74BB-160C-9B3E-48ED2C80D5E4}"/>
+              </a:ext>
+            </a:extLst>
+          </p:cNvPr>
+          <p:cNvPicPr>
+            <a:picLocks noChangeAspect="1"/>
+          </p:cNvPicPr>
+          <p:nvPr/>
+        </p:nvPicPr>
+        <p:blipFill>
+          <a:blip r:embed="rId4"/>
+          <a:stretch>
+            <a:fillRect/>
+          </a:stretch>
+        </p:blipFill>
+        <p:spPr>
+          <a:xfrm>
+            <a:off x="11135067" y="4822050"/>
+            <a:ext cx="309914" cy="322311"/>
+          </a:xfrm>
+          <a:prstGeom prst="rect">
+            <a:avLst/>
+          </a:prstGeom>
+          <a:ln w="6350">
+            <a:solidFill>
+              <a:schemeClr val="tx1"/>
+            </a:solidFill>
+          </a:ln>
+        </p:spPr>
+      </p:pic>
+      <p:sp>
+        <p:nvSpPr>
+          <p:cNvPr id="155" name="Arrow: Right 154">
+            <a:extLst>
+              <a:ext uri="{FF2B5EF4-FFF2-40B4-BE49-F238E27FC236}">
+                <a16:creationId xmlns:a16="http://schemas.microsoft.com/office/drawing/2014/main" id="{FD05D8C8-E915-6C97-3241-22A843A34788}"/>
+              </a:ext>
+            </a:extLst>
+          </p:cNvPr>
+          <p:cNvSpPr/>
+          <p:nvPr/>
+        </p:nvSpPr>
+        <p:spPr>
+          <a:xfrm rot="16200000" flipV="1">
+            <a:off x="10131868" y="5626682"/>
+            <a:ext cx="190459" cy="166207"/>
+          </a:xfrm>
+          <a:prstGeom prst="rightArrow">
+            <a:avLst/>
+          </a:prstGeom>
+        </p:spPr>
+        <p:style>
+          <a:lnRef idx="2">
+            <a:schemeClr val="accent1">
+              <a:shade val="15000"/>
+            </a:schemeClr>
+          </a:lnRef>
+          <a:fillRef idx="1">
+            <a:schemeClr val="accent1"/>
+          </a:fillRef>
+          <a:effectRef idx="0">
+            <a:schemeClr val="accent1"/>
+          </a:effectRef>
+          <a:fontRef idx="minor">
+            <a:schemeClr val="lt1"/>
+          </a:fontRef>
+        </p:style>
+        <p:txBody>
+          <a:bodyPr rtlCol="0" anchor="ctr"/>
+          <a:lstStyle/>
+          <a:p>
+            <a:pPr algn="ctr"/>
+            <a:endParaRPr lang="en-SG" dirty="0"/>
+          </a:p>
+        </p:txBody>
+      </p:sp>
+      <p:sp>
+        <p:nvSpPr>
+          <p:cNvPr id="156" name="TextBox 155">
+            <a:extLst>
+              <a:ext uri="{FF2B5EF4-FFF2-40B4-BE49-F238E27FC236}">
+                <a16:creationId xmlns:a16="http://schemas.microsoft.com/office/drawing/2014/main" id="{00F824A3-2907-95F3-8FB1-8059745D1B00}"/>
+              </a:ext>
+            </a:extLst>
+          </p:cNvPr>
+          <p:cNvSpPr txBox="1"/>
+          <p:nvPr/>
+        </p:nvSpPr>
+        <p:spPr>
+          <a:xfrm>
+            <a:off x="10989003" y="4400256"/>
+            <a:ext cx="766962" cy="400110"/>
+          </a:xfrm>
+          <a:prstGeom prst="rect">
+            <a:avLst/>
+          </a:prstGeom>
+          <a:noFill/>
+        </p:spPr>
+        <p:txBody>
+          <a:bodyPr wrap="square">
+            <a:spAutoFit/>
+          </a:bodyPr>
+          <a:lstStyle/>
+          <a:p>
+            <a:r>
+              <a:rPr lang="en-US" sz="1000" b="1" dirty="0">
+                <a:solidFill>
+                  <a:schemeClr val="tx1">
+                    <a:lumMod val="75000"/>
+                    <a:lumOff val="25000"/>
+                  </a:schemeClr>
+                </a:solidFill>
+              </a:rPr>
+              <a:t>Train drivers </a:t>
+            </a:r>
+            <a:endParaRPr lang="en-SG" sz="1000" b="1" dirty="0">
+              <a:solidFill>
+                <a:schemeClr val="tx1">
+                  <a:lumMod val="75000"/>
+                  <a:lumOff val="25000"/>
+                </a:schemeClr>
+              </a:solidFill>
+            </a:endParaRPr>
+          </a:p>
+        </p:txBody>
+      </p:sp>
+      <p:sp>
+        <p:nvSpPr>
+          <p:cNvPr id="157" name="TextBox 156">
+            <a:extLst>
+              <a:ext uri="{FF2B5EF4-FFF2-40B4-BE49-F238E27FC236}">
+                <a16:creationId xmlns:a16="http://schemas.microsoft.com/office/drawing/2014/main" id="{5A95D82B-E8CF-AE44-6C8F-17A829E0AEDD}"/>
+              </a:ext>
+            </a:extLst>
+          </p:cNvPr>
+          <p:cNvSpPr txBox="1"/>
+          <p:nvPr/>
+        </p:nvSpPr>
+        <p:spPr>
+          <a:xfrm>
+            <a:off x="412628" y="5966274"/>
+            <a:ext cx="2675037" cy="276999"/>
+          </a:xfrm>
+          <a:prstGeom prst="rect">
+            <a:avLst/>
+          </a:prstGeom>
+          <a:noFill/>
+        </p:spPr>
+        <p:txBody>
+          <a:bodyPr wrap="square" rtlCol="0">
+            <a:spAutoFit/>
+          </a:bodyPr>
+          <a:lstStyle/>
+          <a:p>
+            <a:r>
+              <a:rPr lang="en-US" sz="1200" b="1" dirty="0">
+                <a:solidFill>
+                  <a:schemeClr val="accent6">
+                    <a:lumMod val="75000"/>
+                  </a:schemeClr>
+                </a:solidFill>
+              </a:rPr>
+              <a:t>Trains Modbus 192.168.101.0/24 </a:t>
+            </a:r>
+          </a:p>
+        </p:txBody>
+      </p:sp>
+      <p:sp>
+        <p:nvSpPr>
+          <p:cNvPr id="158" name="TextBox 157">
+            <a:extLst>
+              <a:ext uri="{FF2B5EF4-FFF2-40B4-BE49-F238E27FC236}">
+                <a16:creationId xmlns:a16="http://schemas.microsoft.com/office/drawing/2014/main" id="{173BFD7C-1AF8-829A-3908-7C4AEC8426D5}"/>
+              </a:ext>
+            </a:extLst>
+          </p:cNvPr>
+          <p:cNvSpPr txBox="1"/>
+          <p:nvPr/>
+        </p:nvSpPr>
+        <p:spPr>
+          <a:xfrm>
+            <a:off x="436035" y="6241753"/>
+            <a:ext cx="2950691" cy="276999"/>
+          </a:xfrm>
+          <a:prstGeom prst="rect">
+            <a:avLst/>
+          </a:prstGeom>
+          <a:noFill/>
+        </p:spPr>
+        <p:txBody>
+          <a:bodyPr wrap="square" rtlCol="0">
+            <a:spAutoFit/>
+          </a:bodyPr>
+          <a:lstStyle/>
+          <a:p>
+            <a:r>
+              <a:rPr lang="en-US" sz="1200" b="1" dirty="0">
+                <a:solidFill>
+                  <a:schemeClr val="accent1"/>
+                </a:solidFill>
+              </a:rPr>
+              <a:t>Railway S7Comm bus 192.168.102.0/24 </a:t>
+            </a:r>
+          </a:p>
+        </p:txBody>
+      </p:sp>
+      <p:sp>
+        <p:nvSpPr>
+          <p:cNvPr id="7" name="Oval 6">
+            <a:extLst>
+              <a:ext uri="{FF2B5EF4-FFF2-40B4-BE49-F238E27FC236}">
+                <a16:creationId xmlns:a16="http://schemas.microsoft.com/office/drawing/2014/main" id="{53A521E7-5919-6BBB-D225-3194697053FE}"/>
+              </a:ext>
+            </a:extLst>
+          </p:cNvPr>
+          <p:cNvSpPr/>
+          <p:nvPr/>
+        </p:nvSpPr>
+        <p:spPr>
+          <a:xfrm>
+            <a:off x="2858395" y="3816625"/>
+            <a:ext cx="198642" cy="214127"/>
+          </a:xfrm>
+          <a:prstGeom prst="ellipse">
+            <a:avLst/>
+          </a:prstGeom>
+          <a:solidFill>
+            <a:srgbClr val="FFC000"/>
+          </a:solidFill>
+        </p:spPr>
+        <p:style>
+          <a:lnRef idx="2">
+            <a:schemeClr val="accent1">
+              <a:shade val="15000"/>
+            </a:schemeClr>
+          </a:lnRef>
+          <a:fillRef idx="1">
+            <a:schemeClr val="accent1"/>
+          </a:fillRef>
+          <a:effectRef idx="0">
+            <a:schemeClr val="accent1"/>
+          </a:effectRef>
+          <a:fontRef idx="minor">
+            <a:schemeClr val="lt1"/>
+          </a:fontRef>
+        </p:style>
+        <p:txBody>
+          <a:bodyPr rtlCol="0" anchor="ctr"/>
+          <a:lstStyle/>
+          <a:p>
+            <a:pPr algn="ctr"/>
+            <a:r>
+              <a:rPr lang="en-US" sz="1600" b="1" dirty="0">
+                <a:solidFill>
+                  <a:srgbClr val="C00000"/>
+                </a:solidFill>
+              </a:rPr>
+              <a:t>0</a:t>
+            </a:r>
+            <a:endParaRPr lang="en-SG" sz="1600" b="1" dirty="0">
+              <a:solidFill>
+                <a:srgbClr val="C00000"/>
+              </a:solidFill>
+            </a:endParaRPr>
+          </a:p>
+        </p:txBody>
+      </p:sp>
+      <p:sp>
+        <p:nvSpPr>
+          <p:cNvPr id="9" name="Oval 8">
+            <a:extLst>
+              <a:ext uri="{FF2B5EF4-FFF2-40B4-BE49-F238E27FC236}">
+                <a16:creationId xmlns:a16="http://schemas.microsoft.com/office/drawing/2014/main" id="{EAB4FAFA-C817-3513-6022-582706CB1588}"/>
+              </a:ext>
+            </a:extLst>
+          </p:cNvPr>
+          <p:cNvSpPr/>
+          <p:nvPr/>
+        </p:nvSpPr>
+        <p:spPr>
+          <a:xfrm>
+            <a:off x="1278857" y="2534174"/>
+            <a:ext cx="198642" cy="214127"/>
+          </a:xfrm>
+          <a:prstGeom prst="ellipse">
+            <a:avLst/>
+          </a:prstGeom>
+          <a:solidFill>
+            <a:srgbClr val="FFC000"/>
+          </a:solidFill>
+        </p:spPr>
+        <p:style>
+          <a:lnRef idx="2">
+            <a:schemeClr val="accent1">
+              <a:shade val="15000"/>
+            </a:schemeClr>
+          </a:lnRef>
+          <a:fillRef idx="1">
+            <a:schemeClr val="accent1"/>
+          </a:fillRef>
+          <a:effectRef idx="0">
+            <a:schemeClr val="accent1"/>
+          </a:effectRef>
+          <a:fontRef idx="minor">
+            <a:schemeClr val="lt1"/>
+          </a:fontRef>
+        </p:style>
+        <p:txBody>
+          <a:bodyPr rtlCol="0" anchor="ctr"/>
+          <a:lstStyle/>
+          <a:p>
+            <a:pPr algn="ctr"/>
+            <a:r>
+              <a:rPr lang="en-SG" sz="1600" b="1" dirty="0">
+                <a:solidFill>
+                  <a:srgbClr val="C00000"/>
+                </a:solidFill>
+              </a:rPr>
+              <a:t>1</a:t>
+            </a:r>
+          </a:p>
+        </p:txBody>
+      </p:sp>
+      <p:sp>
+        <p:nvSpPr>
+          <p:cNvPr id="11" name="Oval 10">
+            <a:extLst>
+              <a:ext uri="{FF2B5EF4-FFF2-40B4-BE49-F238E27FC236}">
+                <a16:creationId xmlns:a16="http://schemas.microsoft.com/office/drawing/2014/main" id="{6D99B554-EE27-2246-59FD-7C6B178E9B11}"/>
+              </a:ext>
+            </a:extLst>
+          </p:cNvPr>
+          <p:cNvSpPr/>
+          <p:nvPr/>
+        </p:nvSpPr>
+        <p:spPr>
+          <a:xfrm>
+            <a:off x="2445902" y="4444840"/>
+            <a:ext cx="198642" cy="214127"/>
+          </a:xfrm>
+          <a:prstGeom prst="ellipse">
+            <a:avLst/>
+          </a:prstGeom>
+          <a:solidFill>
+            <a:srgbClr val="FFC000"/>
+          </a:solidFill>
+        </p:spPr>
+        <p:style>
+          <a:lnRef idx="2">
+            <a:schemeClr val="accent1">
+              <a:shade val="15000"/>
+            </a:schemeClr>
+          </a:lnRef>
+          <a:fillRef idx="1">
+            <a:schemeClr val="accent1"/>
+          </a:fillRef>
+          <a:effectRef idx="0">
+            <a:schemeClr val="accent1"/>
+          </a:effectRef>
+          <a:fontRef idx="minor">
+            <a:schemeClr val="lt1"/>
+          </a:fontRef>
+        </p:style>
+        <p:txBody>
+          <a:bodyPr rtlCol="0" anchor="ctr"/>
+          <a:lstStyle/>
+          <a:p>
+            <a:pPr algn="ctr"/>
+            <a:r>
+              <a:rPr lang="en-US" sz="1600" b="1" dirty="0">
+                <a:solidFill>
+                  <a:srgbClr val="C00000"/>
+                </a:solidFill>
+              </a:rPr>
+              <a:t>2</a:t>
+            </a:r>
+            <a:endParaRPr lang="en-SG" sz="1600" b="1" dirty="0">
+              <a:solidFill>
+                <a:srgbClr val="C00000"/>
+              </a:solidFill>
+            </a:endParaRPr>
+          </a:p>
+        </p:txBody>
+      </p:sp>
+      <p:sp>
+        <p:nvSpPr>
+          <p:cNvPr id="12" name="Oval 11">
+            <a:extLst>
+              <a:ext uri="{FF2B5EF4-FFF2-40B4-BE49-F238E27FC236}">
+                <a16:creationId xmlns:a16="http://schemas.microsoft.com/office/drawing/2014/main" id="{8452BA3C-439B-3C7C-46A9-CF56460D6475}"/>
+              </a:ext>
+            </a:extLst>
+          </p:cNvPr>
+          <p:cNvSpPr/>
+          <p:nvPr/>
+        </p:nvSpPr>
+        <p:spPr>
+          <a:xfrm>
+            <a:off x="3791588" y="1492815"/>
+            <a:ext cx="198642" cy="214127"/>
+          </a:xfrm>
+          <a:prstGeom prst="ellipse">
+            <a:avLst/>
+          </a:prstGeom>
+          <a:solidFill>
+            <a:srgbClr val="FFC000"/>
+          </a:solidFill>
+        </p:spPr>
+        <p:style>
+          <a:lnRef idx="2">
+            <a:schemeClr val="accent1">
+              <a:shade val="15000"/>
+            </a:schemeClr>
+          </a:lnRef>
+          <a:fillRef idx="1">
+            <a:schemeClr val="accent1"/>
+          </a:fillRef>
+          <a:effectRef idx="0">
+            <a:schemeClr val="accent1"/>
+          </a:effectRef>
+          <a:fontRef idx="minor">
+            <a:schemeClr val="lt1"/>
+          </a:fontRef>
+        </p:style>
+        <p:txBody>
+          <a:bodyPr rtlCol="0" anchor="ctr"/>
+          <a:lstStyle/>
+          <a:p>
+            <a:pPr algn="ctr"/>
+            <a:r>
+              <a:rPr lang="en-US" sz="1600" b="1" dirty="0">
+                <a:solidFill>
+                  <a:srgbClr val="C00000"/>
+                </a:solidFill>
+              </a:rPr>
+              <a:t>3</a:t>
+            </a:r>
+            <a:endParaRPr lang="en-SG" sz="1600" b="1" dirty="0">
+              <a:solidFill>
+                <a:srgbClr val="C00000"/>
+              </a:solidFill>
+            </a:endParaRPr>
+          </a:p>
+        </p:txBody>
+      </p:sp>
+      <p:sp>
+        <p:nvSpPr>
+          <p:cNvPr id="13" name="Oval 12">
+            <a:extLst>
+              <a:ext uri="{FF2B5EF4-FFF2-40B4-BE49-F238E27FC236}">
+                <a16:creationId xmlns:a16="http://schemas.microsoft.com/office/drawing/2014/main" id="{F9C64924-CA69-4B02-8078-E272C41E18D7}"/>
+              </a:ext>
+            </a:extLst>
+          </p:cNvPr>
+          <p:cNvSpPr/>
+          <p:nvPr/>
+        </p:nvSpPr>
+        <p:spPr>
+          <a:xfrm>
+            <a:off x="3768304" y="1187610"/>
+            <a:ext cx="198642" cy="214127"/>
+          </a:xfrm>
+          <a:prstGeom prst="ellipse">
+            <a:avLst/>
+          </a:prstGeom>
+          <a:solidFill>
+            <a:srgbClr val="FFC000"/>
+          </a:solidFill>
+        </p:spPr>
+        <p:style>
+          <a:lnRef idx="2">
+            <a:schemeClr val="accent1">
+              <a:shade val="15000"/>
+            </a:schemeClr>
+          </a:lnRef>
+          <a:fillRef idx="1">
+            <a:schemeClr val="accent1"/>
+          </a:fillRef>
+          <a:effectRef idx="0">
+            <a:schemeClr val="accent1"/>
+          </a:effectRef>
+          <a:fontRef idx="minor">
+            <a:schemeClr val="lt1"/>
+          </a:fontRef>
+        </p:style>
+        <p:txBody>
+          <a:bodyPr rtlCol="0" anchor="ctr"/>
+          <a:lstStyle/>
+          <a:p>
+            <a:pPr algn="ctr"/>
+            <a:r>
+              <a:rPr lang="en-US" sz="1600" b="1" dirty="0">
+                <a:solidFill>
+                  <a:srgbClr val="C00000"/>
+                </a:solidFill>
+              </a:rPr>
+              <a:t>4</a:t>
+            </a:r>
+            <a:endParaRPr lang="en-SG" sz="1600" b="1" dirty="0">
+              <a:solidFill>
+                <a:srgbClr val="C00000"/>
+              </a:solidFill>
+            </a:endParaRPr>
+          </a:p>
+        </p:txBody>
+      </p:sp>
+      <p:sp>
+        <p:nvSpPr>
+          <p:cNvPr id="14" name="Oval 13">
+            <a:extLst>
+              <a:ext uri="{FF2B5EF4-FFF2-40B4-BE49-F238E27FC236}">
+                <a16:creationId xmlns:a16="http://schemas.microsoft.com/office/drawing/2014/main" id="{2E85E3AA-C988-BBCD-59F7-1EE1D2A56489}"/>
+              </a:ext>
+            </a:extLst>
+          </p:cNvPr>
+          <p:cNvSpPr/>
+          <p:nvPr/>
+        </p:nvSpPr>
+        <p:spPr>
+          <a:xfrm>
+            <a:off x="4012421" y="1325919"/>
+            <a:ext cx="198642" cy="214127"/>
+          </a:xfrm>
+          <a:prstGeom prst="ellipse">
+            <a:avLst/>
+          </a:prstGeom>
+          <a:solidFill>
+            <a:srgbClr val="FFC000"/>
+          </a:solidFill>
+        </p:spPr>
+        <p:style>
+          <a:lnRef idx="2">
+            <a:schemeClr val="accent1">
+              <a:shade val="15000"/>
+            </a:schemeClr>
+          </a:lnRef>
+          <a:fillRef idx="1">
+            <a:schemeClr val="accent1"/>
+          </a:fillRef>
+          <a:effectRef idx="0">
+            <a:schemeClr val="accent1"/>
+          </a:effectRef>
+          <a:fontRef idx="minor">
+            <a:schemeClr val="lt1"/>
+          </a:fontRef>
+        </p:style>
+        <p:txBody>
+          <a:bodyPr rtlCol="0" anchor="ctr"/>
+          <a:lstStyle/>
+          <a:p>
+            <a:pPr algn="ctr"/>
+            <a:r>
+              <a:rPr lang="en-US" sz="1600" b="1" dirty="0">
+                <a:solidFill>
+                  <a:srgbClr val="C00000"/>
+                </a:solidFill>
+              </a:rPr>
+              <a:t>5</a:t>
+            </a:r>
+            <a:endParaRPr lang="en-SG" sz="1600" b="1" dirty="0">
+              <a:solidFill>
+                <a:srgbClr val="C00000"/>
+              </a:solidFill>
+            </a:endParaRPr>
+          </a:p>
+        </p:txBody>
+      </p:sp>
+      <p:sp>
+        <p:nvSpPr>
+          <p:cNvPr id="17" name="Oval 16">
+            <a:extLst>
+              <a:ext uri="{FF2B5EF4-FFF2-40B4-BE49-F238E27FC236}">
+                <a16:creationId xmlns:a16="http://schemas.microsoft.com/office/drawing/2014/main" id="{D4715DE2-E2FC-979C-FC15-232D49D9D293}"/>
+              </a:ext>
+            </a:extLst>
+          </p:cNvPr>
+          <p:cNvSpPr/>
+          <p:nvPr/>
+        </p:nvSpPr>
+        <p:spPr>
+          <a:xfrm>
+            <a:off x="5278187" y="4319521"/>
+            <a:ext cx="198642" cy="214127"/>
+          </a:xfrm>
+          <a:prstGeom prst="ellipse">
+            <a:avLst/>
+          </a:prstGeom>
+          <a:solidFill>
+            <a:srgbClr val="FFC000"/>
+          </a:solidFill>
+        </p:spPr>
+        <p:style>
+          <a:lnRef idx="2">
+            <a:schemeClr val="accent1">
+              <a:shade val="15000"/>
+            </a:schemeClr>
+          </a:lnRef>
+          <a:fillRef idx="1">
+            <a:schemeClr val="accent1"/>
+          </a:fillRef>
+          <a:effectRef idx="0">
+            <a:schemeClr val="accent1"/>
+          </a:effectRef>
+          <a:fontRef idx="minor">
+            <a:schemeClr val="lt1"/>
+          </a:fontRef>
+        </p:style>
+        <p:txBody>
+          <a:bodyPr rtlCol="0" anchor="ctr"/>
+          <a:lstStyle/>
+          <a:p>
+            <a:pPr algn="ctr"/>
+            <a:r>
+              <a:rPr lang="en-US" sz="1600" b="1" dirty="0">
+                <a:solidFill>
+                  <a:srgbClr val="C00000"/>
+                </a:solidFill>
+              </a:rPr>
+              <a:t>6</a:t>
+            </a:r>
+            <a:endParaRPr lang="en-SG" sz="1600" b="1" dirty="0">
+              <a:solidFill>
+                <a:srgbClr val="C00000"/>
+              </a:solidFill>
+            </a:endParaRPr>
+          </a:p>
+        </p:txBody>
+      </p:sp>
+      <p:sp>
+        <p:nvSpPr>
+          <p:cNvPr id="18" name="Oval 17">
+            <a:extLst>
+              <a:ext uri="{FF2B5EF4-FFF2-40B4-BE49-F238E27FC236}">
+                <a16:creationId xmlns:a16="http://schemas.microsoft.com/office/drawing/2014/main" id="{E513855B-9095-5469-E092-EA49555EC9EF}"/>
+              </a:ext>
+            </a:extLst>
+          </p:cNvPr>
+          <p:cNvSpPr/>
+          <p:nvPr/>
+        </p:nvSpPr>
+        <p:spPr>
+          <a:xfrm>
+            <a:off x="7476553" y="4272629"/>
+            <a:ext cx="198642" cy="214127"/>
+          </a:xfrm>
+          <a:prstGeom prst="ellipse">
+            <a:avLst/>
+          </a:prstGeom>
+          <a:solidFill>
+            <a:srgbClr val="FFC000"/>
+          </a:solidFill>
+        </p:spPr>
+        <p:style>
+          <a:lnRef idx="2">
+            <a:schemeClr val="accent1">
+              <a:shade val="15000"/>
+            </a:schemeClr>
+          </a:lnRef>
+          <a:fillRef idx="1">
+            <a:schemeClr val="accent1"/>
+          </a:fillRef>
+          <a:effectRef idx="0">
+            <a:schemeClr val="accent1"/>
+          </a:effectRef>
+          <a:fontRef idx="minor">
+            <a:schemeClr val="lt1"/>
+          </a:fontRef>
+        </p:style>
+        <p:txBody>
+          <a:bodyPr rtlCol="0" anchor="ctr"/>
+          <a:lstStyle/>
+          <a:p>
+            <a:pPr algn="ctr"/>
+            <a:r>
+              <a:rPr lang="en-US" sz="1600" b="1" dirty="0">
+                <a:solidFill>
+                  <a:srgbClr val="C00000"/>
+                </a:solidFill>
+              </a:rPr>
+              <a:t>7</a:t>
+            </a:r>
+            <a:endParaRPr lang="en-SG" sz="1600" b="1" dirty="0">
+              <a:solidFill>
+                <a:srgbClr val="C00000"/>
+              </a:solidFill>
+            </a:endParaRPr>
+          </a:p>
+        </p:txBody>
+      </p:sp>
+      <p:sp>
+        <p:nvSpPr>
+          <p:cNvPr id="20" name="Oval 19">
+            <a:extLst>
+              <a:ext uri="{FF2B5EF4-FFF2-40B4-BE49-F238E27FC236}">
+                <a16:creationId xmlns:a16="http://schemas.microsoft.com/office/drawing/2014/main" id="{DF9EE594-72AF-2A22-6F1C-E697F7D5A8FD}"/>
+              </a:ext>
+            </a:extLst>
+          </p:cNvPr>
+          <p:cNvSpPr/>
+          <p:nvPr/>
+        </p:nvSpPr>
+        <p:spPr>
+          <a:xfrm>
+            <a:off x="11411007" y="2544594"/>
+            <a:ext cx="198642" cy="214127"/>
+          </a:xfrm>
+          <a:prstGeom prst="ellipse">
+            <a:avLst/>
+          </a:prstGeom>
+          <a:solidFill>
+            <a:srgbClr val="FFC000"/>
+          </a:solidFill>
+        </p:spPr>
+        <p:style>
+          <a:lnRef idx="2">
+            <a:schemeClr val="accent1">
+              <a:shade val="15000"/>
+            </a:schemeClr>
+          </a:lnRef>
+          <a:fillRef idx="1">
+            <a:schemeClr val="accent1"/>
+          </a:fillRef>
+          <a:effectRef idx="0">
+            <a:schemeClr val="accent1"/>
+          </a:effectRef>
+          <a:fontRef idx="minor">
+            <a:schemeClr val="lt1"/>
+          </a:fontRef>
+        </p:style>
+        <p:txBody>
+          <a:bodyPr rtlCol="0" anchor="ctr"/>
+          <a:lstStyle/>
+          <a:p>
+            <a:pPr algn="ctr"/>
+            <a:r>
+              <a:rPr lang="en-US" sz="1600" b="1" dirty="0">
+                <a:solidFill>
+                  <a:srgbClr val="C00000"/>
+                </a:solidFill>
+              </a:rPr>
+              <a:t>9</a:t>
+            </a:r>
+            <a:endParaRPr lang="en-SG" sz="1600" b="1" dirty="0">
+              <a:solidFill>
+                <a:srgbClr val="C00000"/>
+              </a:solidFill>
+            </a:endParaRPr>
+          </a:p>
+        </p:txBody>
+      </p:sp>
+      <p:pic>
+        <p:nvPicPr>
+          <p:cNvPr id="22" name="Picture 21" descr="A computer screen shot of a computer scheme&#10;&#10;AI-generated content may be incorrect.">
+            <a:extLst>
+              <a:ext uri="{FF2B5EF4-FFF2-40B4-BE49-F238E27FC236}">
+                <a16:creationId xmlns:a16="http://schemas.microsoft.com/office/drawing/2014/main" id="{69ED0CC6-D98C-6DFD-4ACF-DF0130DC361E}"/>
+              </a:ext>
+            </a:extLst>
+          </p:cNvPr>
+          <p:cNvPicPr>
+            <a:picLocks noChangeAspect="1"/>
+          </p:cNvPicPr>
+          <p:nvPr/>
+        </p:nvPicPr>
+        <p:blipFill>
+          <a:blip r:embed="rId9">
+            <a:extLst>
+              <a:ext uri="{28A0092B-C50C-407E-A947-70E740481C1C}">
+                <a14:useLocalDpi xmlns:a14="http://schemas.microsoft.com/office/drawing/2010/main" val="0"/>
+              </a:ext>
+            </a:extLst>
+          </a:blip>
+          <a:stretch>
+            <a:fillRect/>
+          </a:stretch>
+        </p:blipFill>
+        <p:spPr>
+          <a:xfrm>
+            <a:off x="337980" y="425717"/>
+            <a:ext cx="5393811" cy="2899174"/>
+          </a:xfrm>
+          <a:prstGeom prst="rect">
+            <a:avLst/>
+          </a:prstGeom>
+          <a:ln w="12700">
+            <a:solidFill>
+              <a:schemeClr val="tx1"/>
+            </a:solidFill>
+          </a:ln>
+        </p:spPr>
+      </p:pic>
+      <p:pic>
+        <p:nvPicPr>
+          <p:cNvPr id="23" name="Picture 22" descr="A screenshot of a computer&#10;&#10;AI-generated content may be incorrect.">
+            <a:extLst>
+              <a:ext uri="{FF2B5EF4-FFF2-40B4-BE49-F238E27FC236}">
+                <a16:creationId xmlns:a16="http://schemas.microsoft.com/office/drawing/2014/main" id="{6FC5F9E1-A913-DC15-0490-A26EC7314571}"/>
+              </a:ext>
+            </a:extLst>
+          </p:cNvPr>
+          <p:cNvPicPr>
+            <a:picLocks noChangeAspect="1"/>
+          </p:cNvPicPr>
+          <p:nvPr/>
+        </p:nvPicPr>
+        <p:blipFill>
+          <a:blip r:embed="rId10">
+            <a:extLst>
+              <a:ext uri="{28A0092B-C50C-407E-A947-70E740481C1C}">
+                <a14:useLocalDpi xmlns:a14="http://schemas.microsoft.com/office/drawing/2010/main" val="0"/>
+              </a:ext>
+            </a:extLst>
+          </a:blip>
+          <a:stretch>
+            <a:fillRect/>
+          </a:stretch>
+        </p:blipFill>
+        <p:spPr>
+          <a:xfrm>
+            <a:off x="8867887" y="3391536"/>
+            <a:ext cx="2054266" cy="2553306"/>
+          </a:xfrm>
+          <a:prstGeom prst="rect">
+            <a:avLst/>
+          </a:prstGeom>
+          <a:ln w="12700">
+            <a:solidFill>
+              <a:schemeClr val="tx1"/>
+            </a:solidFill>
+          </a:ln>
+        </p:spPr>
+      </p:pic>
+      <p:cxnSp>
+        <p:nvCxnSpPr>
+          <p:cNvPr id="28" name="Straight Connector 27">
+            <a:extLst>
+              <a:ext uri="{FF2B5EF4-FFF2-40B4-BE49-F238E27FC236}">
+                <a16:creationId xmlns:a16="http://schemas.microsoft.com/office/drawing/2014/main" id="{6851577D-07B7-6876-A089-70D6FD8473B0}"/>
+              </a:ext>
+            </a:extLst>
+          </p:cNvPr>
+          <p:cNvCxnSpPr>
+            <a:cxnSpLocks/>
+          </p:cNvCxnSpPr>
+          <p:nvPr/>
+        </p:nvCxnSpPr>
+        <p:spPr>
+          <a:xfrm>
+            <a:off x="457551" y="6719195"/>
+            <a:ext cx="11165415" cy="0"/>
+          </a:xfrm>
+          <a:prstGeom prst="line">
+            <a:avLst/>
+          </a:prstGeom>
+          <a:ln w="38100">
+            <a:solidFill>
+              <a:srgbClr val="0070C0"/>
+            </a:solidFill>
+          </a:ln>
+        </p:spPr>
+        <p:style>
+          <a:lnRef idx="1">
+            <a:schemeClr val="accent1"/>
+          </a:lnRef>
+          <a:fillRef idx="0">
+            <a:schemeClr val="accent1"/>
+          </a:fillRef>
+          <a:effectRef idx="0">
+            <a:schemeClr val="accent1"/>
+          </a:effectRef>
+          <a:fontRef idx="minor">
+            <a:schemeClr val="tx1"/>
+          </a:fontRef>
+        </p:style>
+      </p:cxnSp>
+      <p:cxnSp>
+        <p:nvCxnSpPr>
+          <p:cNvPr id="32" name="Straight Arrow Connector 31">
+            <a:extLst>
+              <a:ext uri="{FF2B5EF4-FFF2-40B4-BE49-F238E27FC236}">
+                <a16:creationId xmlns:a16="http://schemas.microsoft.com/office/drawing/2014/main" id="{16E0416F-4683-9DF4-D6ED-BEB53EE171A3}"/>
+              </a:ext>
+            </a:extLst>
+          </p:cNvPr>
+          <p:cNvCxnSpPr>
+            <a:cxnSpLocks/>
+          </p:cNvCxnSpPr>
+          <p:nvPr/>
+        </p:nvCxnSpPr>
+        <p:spPr>
+          <a:xfrm>
+            <a:off x="7476947" y="5559329"/>
+            <a:ext cx="0" cy="1142685"/>
+          </a:xfrm>
+          <a:prstGeom prst="straightConnector1">
+            <a:avLst/>
+          </a:prstGeom>
+          <a:ln w="19050">
+            <a:solidFill>
+              <a:srgbClr val="0070C0"/>
+            </a:solidFill>
+            <a:headEnd type="triangle"/>
+            <a:tailEnd type="triangle"/>
+          </a:ln>
+        </p:spPr>
+        <p:style>
+          <a:lnRef idx="1">
+            <a:schemeClr val="accent1"/>
+          </a:lnRef>
+          <a:fillRef idx="0">
+            <a:schemeClr val="accent1"/>
+          </a:fillRef>
+          <a:effectRef idx="0">
+            <a:schemeClr val="accent1"/>
+          </a:effectRef>
+          <a:fontRef idx="minor">
+            <a:schemeClr val="tx1"/>
+          </a:fontRef>
+        </p:style>
+      </p:cxnSp>
+      <p:sp>
+        <p:nvSpPr>
+          <p:cNvPr id="38" name="TextBox 37">
+            <a:extLst>
+              <a:ext uri="{FF2B5EF4-FFF2-40B4-BE49-F238E27FC236}">
+                <a16:creationId xmlns:a16="http://schemas.microsoft.com/office/drawing/2014/main" id="{35EC6B8A-A3D9-D55D-7AB0-EF6FE8E0BDEE}"/>
+              </a:ext>
+            </a:extLst>
+          </p:cNvPr>
+          <p:cNvSpPr txBox="1"/>
+          <p:nvPr/>
+        </p:nvSpPr>
+        <p:spPr>
+          <a:xfrm>
+            <a:off x="10025868" y="6275691"/>
+            <a:ext cx="1691321" cy="461665"/>
+          </a:xfrm>
+          <a:prstGeom prst="rect">
+            <a:avLst/>
+          </a:prstGeom>
+          <a:noFill/>
+        </p:spPr>
+        <p:txBody>
+          <a:bodyPr wrap="square" rtlCol="0">
+            <a:spAutoFit/>
+          </a:bodyPr>
+          <a:lstStyle/>
+          <a:p>
+            <a:r>
+              <a:rPr lang="en-US" sz="1200" b="1" dirty="0">
+                <a:solidFill>
+                  <a:schemeClr val="accent1"/>
+                </a:solidFill>
+              </a:rPr>
+              <a:t>Train S7Comm bus 192.168.101.0/24 </a:t>
+            </a:r>
+          </a:p>
+        </p:txBody>
+      </p:sp>
     </p:spTree>
     <p:extLst>
       <p:ext uri="{BB962C8B-B14F-4D97-AF65-F5344CB8AC3E}">
-        <p14:creationId xmlns:p14="http://schemas.microsoft.com/office/powerpoint/2010/main" val="603654040"/>
+        <p14:creationId xmlns:p14="http://schemas.microsoft.com/office/powerpoint/2010/main" val="2361759009"/>
       </p:ext>
     </p:extLst>
   </p:cSld>
@@ -10152,4 +14296,319 @@
     </a:ext>
   </a:extLst>
 </a:theme>
+</file>
+
+<file path=ppt/theme/theme2.xml><?xml version="1.0" encoding="utf-8"?>
+<a:theme xmlns:a="http://schemas.openxmlformats.org/drawingml/2006/main" name="Office Theme">
+  <a:themeElements>
+    <a:clrScheme name="Office">
+      <a:dk1>
+        <a:sysClr val="windowText" lastClr="000000"/>
+      </a:dk1>
+      <a:lt1>
+        <a:sysClr val="window" lastClr="FFFFFF"/>
+      </a:lt1>
+      <a:dk2>
+        <a:srgbClr val="0E2841"/>
+      </a:dk2>
+      <a:lt2>
+        <a:srgbClr val="E8E8E8"/>
+      </a:lt2>
+      <a:accent1>
+        <a:srgbClr val="156082"/>
+      </a:accent1>
+      <a:accent2>
+        <a:srgbClr val="E97132"/>
+      </a:accent2>
+      <a:accent3>
+        <a:srgbClr val="196B24"/>
+      </a:accent3>
+      <a:accent4>
+        <a:srgbClr val="0F9ED5"/>
+      </a:accent4>
+      <a:accent5>
+        <a:srgbClr val="A02B93"/>
+      </a:accent5>
+      <a:accent6>
+        <a:srgbClr val="4EA72E"/>
+      </a:accent6>
+      <a:hlink>
+        <a:srgbClr val="467886"/>
+      </a:hlink>
+      <a:folHlink>
+        <a:srgbClr val="96607D"/>
+      </a:folHlink>
+    </a:clrScheme>
+    <a:fontScheme name="Office">
+      <a:majorFont>
+        <a:latin typeface="Aptos Display" panose="02110004020202020204"/>
+        <a:ea typeface=""/>
+        <a:cs typeface=""/>
+        <a:font script="Jpan" typeface="游ゴシック Light"/>
+        <a:font script="Hang" typeface="맑은 고딕"/>
+        <a:font script="Hans" typeface="等线 Light"/>
+        <a:font script="Hant" typeface="新細明體"/>
+        <a:font script="Arab" typeface="Times New Roman"/>
+        <a:font script="Hebr" typeface="Times New Roman"/>
+        <a:font script="Thai" typeface="Angsana New"/>
+        <a:font script="Ethi" typeface="Nyala"/>
+        <a:font script="Beng" typeface="Vrinda"/>
+        <a:font script="Gujr" typeface="Shruti"/>
+        <a:font script="Khmr" typeface="MoolBoran"/>
+        <a:font script="Knda" typeface="Tunga"/>
+        <a:font script="Guru" typeface="Raavi"/>
+        <a:font script="Cans" typeface="Euphemia"/>
+        <a:font script="Cher" typeface="Plantagenet Cherokee"/>
+        <a:font script="Yiii" typeface="Microsoft Yi Baiti"/>
+        <a:font script="Tibt" typeface="Microsoft Himalaya"/>
+        <a:font script="Thaa" typeface="MV Boli"/>
+        <a:font script="Deva" typeface="Mangal"/>
+        <a:font script="Telu" typeface="Gautami"/>
+        <a:font script="Taml" typeface="Latha"/>
+        <a:font script="Syrc" typeface="Estrangelo Edessa"/>
+        <a:font script="Orya" typeface="Kalinga"/>
+        <a:font script="Mlym" typeface="Kartika"/>
+        <a:font script="Laoo" typeface="DokChampa"/>
+        <a:font script="Sinh" typeface="Iskoola Pota"/>
+        <a:font script="Mong" typeface="Mongolian Baiti"/>
+        <a:font script="Viet" typeface="Times New Roman"/>
+        <a:font script="Uigh" typeface="Microsoft Uighur"/>
+        <a:font script="Geor" typeface="Sylfaen"/>
+        <a:font script="Armn" typeface="Arial"/>
+        <a:font script="Bugi" typeface="Leelawadee UI"/>
+        <a:font script="Bopo" typeface="Microsoft JhengHei"/>
+        <a:font script="Java" typeface="Javanese Text"/>
+        <a:font script="Lisu" typeface="Segoe UI"/>
+        <a:font script="Mymr" typeface="Myanmar Text"/>
+        <a:font script="Nkoo" typeface="Ebrima"/>
+        <a:font script="Olck" typeface="Nirmala UI"/>
+        <a:font script="Osma" typeface="Ebrima"/>
+        <a:font script="Phag" typeface="Phagspa"/>
+        <a:font script="Syrn" typeface="Estrangelo Edessa"/>
+        <a:font script="Syrj" typeface="Estrangelo Edessa"/>
+        <a:font script="Syre" typeface="Estrangelo Edessa"/>
+        <a:font script="Sora" typeface="Nirmala UI"/>
+        <a:font script="Tale" typeface="Microsoft Tai Le"/>
+        <a:font script="Talu" typeface="Microsoft New Tai Lue"/>
+        <a:font script="Tfng" typeface="Ebrima"/>
+      </a:majorFont>
+      <a:minorFont>
+        <a:latin typeface="Aptos" panose="02110004020202020204"/>
+        <a:ea typeface=""/>
+        <a:cs typeface=""/>
+        <a:font script="Jpan" typeface="游ゴシック"/>
+        <a:font script="Hang" typeface="맑은 고딕"/>
+        <a:font script="Hans" typeface="等线"/>
+        <a:font script="Hant" typeface="新細明體"/>
+        <a:font script="Arab" typeface="Arial"/>
+        <a:font script="Hebr" typeface="Arial"/>
+        <a:font script="Thai" typeface="Cordia New"/>
+        <a:font script="Ethi" typeface="Nyala"/>
+        <a:font script="Beng" typeface="Vrinda"/>
+        <a:font script="Gujr" typeface="Shruti"/>
+        <a:font script="Khmr" typeface="DaunPenh"/>
+        <a:font script="Knda" typeface="Tunga"/>
+        <a:font script="Guru" typeface="Raavi"/>
+        <a:font script="Cans" typeface="Euphemia"/>
+        <a:font script="Cher" typeface="Plantagenet Cherokee"/>
+        <a:font script="Yiii" typeface="Microsoft Yi Baiti"/>
+        <a:font script="Tibt" typeface="Microsoft Himalaya"/>
+        <a:font script="Thaa" typeface="MV Boli"/>
+        <a:font script="Deva" typeface="Mangal"/>
+        <a:font script="Telu" typeface="Gautami"/>
+        <a:font script="Taml" typeface="Latha"/>
+        <a:font script="Syrc" typeface="Estrangelo Edessa"/>
+        <a:font script="Orya" typeface="Kalinga"/>
+        <a:font script="Mlym" typeface="Kartika"/>
+        <a:font script="Laoo" typeface="DokChampa"/>
+        <a:font script="Sinh" typeface="Iskoola Pota"/>
+        <a:font script="Mong" typeface="Mongolian Baiti"/>
+        <a:font script="Viet" typeface="Arial"/>
+        <a:font script="Uigh" typeface="Microsoft Uighur"/>
+        <a:font script="Geor" typeface="Sylfaen"/>
+        <a:font script="Armn" typeface="Arial"/>
+        <a:font script="Bugi" typeface="Leelawadee UI"/>
+        <a:font script="Bopo" typeface="Microsoft JhengHei"/>
+        <a:font script="Java" typeface="Javanese Text"/>
+        <a:font script="Lisu" typeface="Segoe UI"/>
+        <a:font script="Mymr" typeface="Myanmar Text"/>
+        <a:font script="Nkoo" typeface="Ebrima"/>
+        <a:font script="Olck" typeface="Nirmala UI"/>
+        <a:font script="Osma" typeface="Ebrima"/>
+        <a:font script="Phag" typeface="Phagspa"/>
+        <a:font script="Syrn" typeface="Estrangelo Edessa"/>
+        <a:font script="Syrj" typeface="Estrangelo Edessa"/>
+        <a:font script="Syre" typeface="Estrangelo Edessa"/>
+        <a:font script="Sora" typeface="Nirmala UI"/>
+        <a:font script="Tale" typeface="Microsoft Tai Le"/>
+        <a:font script="Talu" typeface="Microsoft New Tai Lue"/>
+        <a:font script="Tfng" typeface="Ebrima"/>
+      </a:minorFont>
+    </a:fontScheme>
+    <a:fmtScheme name="Office">
+      <a:fillStyleLst>
+        <a:solidFill>
+          <a:schemeClr val="phClr"/>
+        </a:solidFill>
+        <a:gradFill rotWithShape="1">
+          <a:gsLst>
+            <a:gs pos="0">
+              <a:schemeClr val="phClr">
+                <a:lumMod val="110000"/>
+                <a:satMod val="105000"/>
+                <a:tint val="67000"/>
+              </a:schemeClr>
+            </a:gs>
+            <a:gs pos="50000">
+              <a:schemeClr val="phClr">
+                <a:lumMod val="105000"/>
+                <a:satMod val="103000"/>
+                <a:tint val="73000"/>
+              </a:schemeClr>
+            </a:gs>
+            <a:gs pos="100000">
+              <a:schemeClr val="phClr">
+                <a:lumMod val="105000"/>
+                <a:satMod val="109000"/>
+                <a:tint val="81000"/>
+              </a:schemeClr>
+            </a:gs>
+          </a:gsLst>
+          <a:lin ang="5400000" scaled="0"/>
+        </a:gradFill>
+        <a:gradFill rotWithShape="1">
+          <a:gsLst>
+            <a:gs pos="0">
+              <a:schemeClr val="phClr">
+                <a:satMod val="103000"/>
+                <a:lumMod val="102000"/>
+                <a:tint val="94000"/>
+              </a:schemeClr>
+            </a:gs>
+            <a:gs pos="50000">
+              <a:schemeClr val="phClr">
+                <a:satMod val="110000"/>
+                <a:lumMod val="100000"/>
+                <a:shade val="100000"/>
+              </a:schemeClr>
+            </a:gs>
+            <a:gs pos="100000">
+              <a:schemeClr val="phClr">
+                <a:lumMod val="99000"/>
+                <a:satMod val="120000"/>
+                <a:shade val="78000"/>
+              </a:schemeClr>
+            </a:gs>
+          </a:gsLst>
+          <a:lin ang="5400000" scaled="0"/>
+        </a:gradFill>
+      </a:fillStyleLst>
+      <a:lnStyleLst>
+        <a:ln w="12700" cap="flat" cmpd="sng" algn="ctr">
+          <a:solidFill>
+            <a:schemeClr val="phClr"/>
+          </a:solidFill>
+          <a:prstDash val="solid"/>
+          <a:miter lim="800000"/>
+        </a:ln>
+        <a:ln w="19050" cap="flat" cmpd="sng" algn="ctr">
+          <a:solidFill>
+            <a:schemeClr val="phClr"/>
+          </a:solidFill>
+          <a:prstDash val="solid"/>
+          <a:miter lim="800000"/>
+        </a:ln>
+        <a:ln w="25400" cap="flat" cmpd="sng" algn="ctr">
+          <a:solidFill>
+            <a:schemeClr val="phClr"/>
+          </a:solidFill>
+          <a:prstDash val="solid"/>
+          <a:miter lim="800000"/>
+        </a:ln>
+      </a:lnStyleLst>
+      <a:effectStyleLst>
+        <a:effectStyle>
+          <a:effectLst/>
+        </a:effectStyle>
+        <a:effectStyle>
+          <a:effectLst/>
+        </a:effectStyle>
+        <a:effectStyle>
+          <a:effectLst>
+            <a:outerShdw blurRad="57150" dist="19050" dir="5400000" algn="ctr" rotWithShape="0">
+              <a:srgbClr val="000000">
+                <a:alpha val="63000"/>
+              </a:srgbClr>
+            </a:outerShdw>
+          </a:effectLst>
+        </a:effectStyle>
+      </a:effectStyleLst>
+      <a:bgFillStyleLst>
+        <a:solidFill>
+          <a:schemeClr val="phClr"/>
+        </a:solidFill>
+        <a:solidFill>
+          <a:schemeClr val="phClr">
+            <a:tint val="95000"/>
+            <a:satMod val="170000"/>
+          </a:schemeClr>
+        </a:solidFill>
+        <a:gradFill rotWithShape="1">
+          <a:gsLst>
+            <a:gs pos="0">
+              <a:schemeClr val="phClr">
+                <a:tint val="93000"/>
+                <a:satMod val="150000"/>
+                <a:shade val="98000"/>
+                <a:lumMod val="102000"/>
+              </a:schemeClr>
+            </a:gs>
+            <a:gs pos="50000">
+              <a:schemeClr val="phClr">
+                <a:tint val="98000"/>
+                <a:satMod val="130000"/>
+                <a:shade val="90000"/>
+                <a:lumMod val="103000"/>
+              </a:schemeClr>
+            </a:gs>
+            <a:gs pos="100000">
+              <a:schemeClr val="phClr">
+                <a:shade val="63000"/>
+                <a:satMod val="120000"/>
+              </a:schemeClr>
+            </a:gs>
+          </a:gsLst>
+          <a:lin ang="5400000" scaled="0"/>
+        </a:gradFill>
+      </a:bgFillStyleLst>
+    </a:fmtScheme>
+  </a:themeElements>
+  <a:objectDefaults>
+    <a:lnDef>
+      <a:spPr/>
+      <a:bodyPr/>
+      <a:lstStyle/>
+      <a:style>
+        <a:lnRef idx="2">
+          <a:schemeClr val="accent1"/>
+        </a:lnRef>
+        <a:fillRef idx="0">
+          <a:schemeClr val="accent1"/>
+        </a:fillRef>
+        <a:effectRef idx="1">
+          <a:schemeClr val="accent1"/>
+        </a:effectRef>
+        <a:fontRef idx="minor">
+          <a:schemeClr val="tx1"/>
+        </a:fontRef>
+      </a:style>
+    </a:lnDef>
+  </a:objectDefaults>
+  <a:extraClrSchemeLst/>
+  <a:extLst>
+    <a:ext uri="{05A4C25C-085E-4340-85A3-A5531E510DB2}">
+      <thm15:themeFamily xmlns:thm15="http://schemas.microsoft.com/office/thememl/2012/main" name="Office Theme" id="{2E142A2C-CD16-42D6-873A-C26D2A0506FA}" vid="{1BDDFF52-6CD6-40A5-AB3C-68EB2F1E4D0A}"/>
+    </a:ext>
+  </a:extLst>
+</a:theme>
 </file>
</xml_diff>

<commit_message>
update the network session.
</commit_message>
<xml_diff>
--- a/OT_System_Attack_Case_Study/Railway_Train_Control/img/designDoc.pptx
+++ b/OT_System_Attack_Case_Study/Railway_Train_Control/img/designDoc.pptx
@@ -5,7 +5,7 @@
     <p:sldMasterId id="2147483648" r:id="rId1"/>
   </p:sldMasterIdLst>
   <p:notesMasterIdLst>
-    <p:notesMasterId r:id="rId7"/>
+    <p:notesMasterId r:id="rId8"/>
   </p:notesMasterIdLst>
   <p:sldIdLst>
     <p:sldId id="256" r:id="rId2"/>
@@ -13,6 +13,7 @@
     <p:sldId id="257" r:id="rId4"/>
     <p:sldId id="259" r:id="rId5"/>
     <p:sldId id="292" r:id="rId6"/>
+    <p:sldId id="293" r:id="rId7"/>
   </p:sldIdLst>
   <p:sldSz cx="12192000" cy="6858000"/>
   <p:notesSz cx="6858000" cy="9144000"/>
@@ -13974,6 +13975,243 @@
     <p:extLst>
       <p:ext uri="{BB962C8B-B14F-4D97-AF65-F5344CB8AC3E}">
         <p14:creationId xmlns:p14="http://schemas.microsoft.com/office/powerpoint/2010/main" val="2361759009"/>
+      </p:ext>
+    </p:extLst>
+  </p:cSld>
+  <p:clrMapOvr>
+    <a:masterClrMapping/>
+  </p:clrMapOvr>
+</p:sld>
+</file>
+
+<file path=ppt/slides/slide6.xml><?xml version="1.0" encoding="utf-8"?>
+<p:sld xmlns:a="http://schemas.openxmlformats.org/drawingml/2006/main" xmlns:r="http://schemas.openxmlformats.org/officeDocument/2006/relationships" xmlns:p="http://schemas.openxmlformats.org/presentationml/2006/main">
+  <p:cSld>
+    <p:spTree>
+      <p:nvGrpSpPr>
+        <p:cNvPr id="1" name=""/>
+        <p:cNvGrpSpPr/>
+        <p:nvPr/>
+      </p:nvGrpSpPr>
+      <p:grpSpPr>
+        <a:xfrm>
+          <a:off x="0" y="0"/>
+          <a:ext cx="0" cy="0"/>
+          <a:chOff x="0" y="0"/>
+          <a:chExt cx="0" cy="0"/>
+        </a:xfrm>
+      </p:grpSpPr>
+      <p:pic>
+        <p:nvPicPr>
+          <p:cNvPr id="5" name="Picture 4" descr="A computer screen shot of a computer scheme&#10;&#10;AI-generated content may be incorrect.">
+            <a:extLst>
+              <a:ext uri="{FF2B5EF4-FFF2-40B4-BE49-F238E27FC236}">
+                <a16:creationId xmlns:a16="http://schemas.microsoft.com/office/drawing/2014/main" id="{26E2E6E9-7EA0-E97B-F6E0-2B53C75B98DA}"/>
+              </a:ext>
+            </a:extLst>
+          </p:cNvPr>
+          <p:cNvPicPr>
+            <a:picLocks noChangeAspect="1"/>
+          </p:cNvPicPr>
+          <p:nvPr/>
+        </p:nvPicPr>
+        <p:blipFill>
+          <a:blip r:embed="rId2">
+            <a:extLst>
+              <a:ext uri="{28A0092B-C50C-407E-A947-70E740481C1C}">
+                <a14:useLocalDpi xmlns:a14="http://schemas.microsoft.com/office/drawing/2010/main" val="0"/>
+              </a:ext>
+            </a:extLst>
+          </a:blip>
+          <a:stretch>
+            <a:fillRect/>
+          </a:stretch>
+        </p:blipFill>
+        <p:spPr>
+          <a:xfrm>
+            <a:off x="1440493" y="518055"/>
+            <a:ext cx="10346499" cy="5561243"/>
+          </a:xfrm>
+          <a:prstGeom prst="rect">
+            <a:avLst/>
+          </a:prstGeom>
+        </p:spPr>
+      </p:pic>
+      <p:sp>
+        <p:nvSpPr>
+          <p:cNvPr id="9" name="Freeform: Shape 8">
+            <a:extLst>
+              <a:ext uri="{FF2B5EF4-FFF2-40B4-BE49-F238E27FC236}">
+                <a16:creationId xmlns:a16="http://schemas.microsoft.com/office/drawing/2014/main" id="{6BE1C764-E555-2405-9EBE-FC095F519742}"/>
+              </a:ext>
+            </a:extLst>
+          </p:cNvPr>
+          <p:cNvSpPr/>
+          <p:nvPr/>
+        </p:nvSpPr>
+        <p:spPr>
+          <a:xfrm>
+            <a:off x="978945" y="518055"/>
+            <a:ext cx="10972800" cy="5710623"/>
+          </a:xfrm>
+          <a:custGeom>
+            <a:avLst/>
+            <a:gdLst>
+              <a:gd name="connsiteX0" fmla="*/ 365759 w 10972800"/>
+              <a:gd name="connsiteY0" fmla="*/ 460891 h 5710623"/>
+              <a:gd name="connsiteX1" fmla="*/ 365759 w 10972800"/>
+              <a:gd name="connsiteY1" fmla="*/ 5355620 h 5710623"/>
+              <a:gd name="connsiteX2" fmla="*/ 1388472 w 10972800"/>
+              <a:gd name="connsiteY2" fmla="*/ 5355620 h 5710623"/>
+              <a:gd name="connsiteX3" fmla="*/ 1388472 w 10972800"/>
+              <a:gd name="connsiteY3" fmla="*/ 460891 h 5710623"/>
+              <a:gd name="connsiteX4" fmla="*/ 0 w 10972800"/>
+              <a:gd name="connsiteY4" fmla="*/ 0 h 5710623"/>
+              <a:gd name="connsiteX5" fmla="*/ 10972800 w 10972800"/>
+              <a:gd name="connsiteY5" fmla="*/ 0 h 5710623"/>
+              <a:gd name="connsiteX6" fmla="*/ 10972800 w 10972800"/>
+              <a:gd name="connsiteY6" fmla="*/ 5710623 h 5710623"/>
+              <a:gd name="connsiteX7" fmla="*/ 0 w 10972800"/>
+              <a:gd name="connsiteY7" fmla="*/ 5710623 h 5710623"/>
+            </a:gdLst>
+            <a:ahLst/>
+            <a:cxnLst>
+              <a:cxn ang="0">
+                <a:pos x="connsiteX0" y="connsiteY0"/>
+              </a:cxn>
+              <a:cxn ang="0">
+                <a:pos x="connsiteX1" y="connsiteY1"/>
+              </a:cxn>
+              <a:cxn ang="0">
+                <a:pos x="connsiteX2" y="connsiteY2"/>
+              </a:cxn>
+              <a:cxn ang="0">
+                <a:pos x="connsiteX3" y="connsiteY3"/>
+              </a:cxn>
+              <a:cxn ang="0">
+                <a:pos x="connsiteX4" y="connsiteY4"/>
+              </a:cxn>
+              <a:cxn ang="0">
+                <a:pos x="connsiteX5" y="connsiteY5"/>
+              </a:cxn>
+              <a:cxn ang="0">
+                <a:pos x="connsiteX6" y="connsiteY6"/>
+              </a:cxn>
+              <a:cxn ang="0">
+                <a:pos x="connsiteX7" y="connsiteY7"/>
+              </a:cxn>
+            </a:cxnLst>
+            <a:rect l="l" t="t" r="r" b="b"/>
+            <a:pathLst>
+              <a:path w="10972800" h="5710623">
+                <a:moveTo>
+                  <a:pt x="365759" y="460891"/>
+                </a:moveTo>
+                <a:lnTo>
+                  <a:pt x="365759" y="5355620"/>
+                </a:lnTo>
+                <a:lnTo>
+                  <a:pt x="1388472" y="5355620"/>
+                </a:lnTo>
+                <a:lnTo>
+                  <a:pt x="1388472" y="460891"/>
+                </a:lnTo>
+                <a:close/>
+                <a:moveTo>
+                  <a:pt x="0" y="0"/>
+                </a:moveTo>
+                <a:lnTo>
+                  <a:pt x="10972800" y="0"/>
+                </a:lnTo>
+                <a:lnTo>
+                  <a:pt x="10972800" y="5710623"/>
+                </a:lnTo>
+                <a:lnTo>
+                  <a:pt x="0" y="5710623"/>
+                </a:lnTo>
+                <a:close/>
+              </a:path>
+            </a:pathLst>
+          </a:custGeom>
+          <a:solidFill>
+            <a:schemeClr val="tx1">
+              <a:alpha val="54000"/>
+            </a:schemeClr>
+          </a:solidFill>
+        </p:spPr>
+        <p:style>
+          <a:lnRef idx="2">
+            <a:schemeClr val="accent1">
+              <a:shade val="15000"/>
+            </a:schemeClr>
+          </a:lnRef>
+          <a:fillRef idx="1">
+            <a:schemeClr val="accent1"/>
+          </a:fillRef>
+          <a:effectRef idx="0">
+            <a:schemeClr val="accent1"/>
+          </a:effectRef>
+          <a:fontRef idx="minor">
+            <a:schemeClr val="lt1"/>
+          </a:fontRef>
+        </p:style>
+        <p:txBody>
+          <a:bodyPr wrap="square" rtlCol="0" anchor="ctr">
+            <a:noAutofit/>
+          </a:bodyPr>
+          <a:lstStyle/>
+          <a:p>
+            <a:pPr algn="ctr"/>
+            <a:endParaRPr lang="en-SG" dirty="0"/>
+          </a:p>
+        </p:txBody>
+      </p:sp>
+      <p:cxnSp>
+        <p:nvCxnSpPr>
+          <p:cNvPr id="11" name="Straight Arrow Connector 10">
+            <a:extLst>
+              <a:ext uri="{FF2B5EF4-FFF2-40B4-BE49-F238E27FC236}">
+                <a16:creationId xmlns:a16="http://schemas.microsoft.com/office/drawing/2014/main" id="{F4BB6A48-E924-5586-8D05-92D3743BC112}"/>
+              </a:ext>
+            </a:extLst>
+          </p:cNvPr>
+          <p:cNvCxnSpPr/>
+          <p:nvPr/>
+        </p:nvCxnSpPr>
+        <p:spPr>
+          <a:xfrm flipH="1">
+            <a:off x="2239108" y="1418492"/>
+            <a:ext cx="539261" cy="128954"/>
+          </a:xfrm>
+          <a:prstGeom prst="straightConnector1">
+            <a:avLst/>
+          </a:prstGeom>
+          <a:ln>
+            <a:solidFill>
+              <a:srgbClr val="FF0000"/>
+            </a:solidFill>
+            <a:tailEnd type="triangle"/>
+          </a:ln>
+        </p:spPr>
+        <p:style>
+          <a:lnRef idx="2">
+            <a:schemeClr val="accent1"/>
+          </a:lnRef>
+          <a:fillRef idx="0">
+            <a:schemeClr val="accent1"/>
+          </a:fillRef>
+          <a:effectRef idx="1">
+            <a:schemeClr val="accent1"/>
+          </a:effectRef>
+          <a:fontRef idx="minor">
+            <a:schemeClr val="tx1"/>
+          </a:fontRef>
+        </p:style>
+      </p:cxnSp>
+    </p:spTree>
+    <p:extLst>
+      <p:ext uri="{BB962C8B-B14F-4D97-AF65-F5344CB8AC3E}">
+        <p14:creationId xmlns:p14="http://schemas.microsoft.com/office/powerpoint/2010/main" val="3451157203"/>
       </p:ext>
     </p:extLst>
   </p:cSld>

</xml_diff>

<commit_message>
update the train control interface section.
</commit_message>
<xml_diff>
--- a/OT_System_Attack_Case_Study/Railway_Train_Control/img/designDoc.pptx
+++ b/OT_System_Attack_Case_Study/Railway_Train_Control/img/designDoc.pptx
@@ -5,7 +5,7 @@
     <p:sldMasterId id="2147483648" r:id="rId1"/>
   </p:sldMasterIdLst>
   <p:notesMasterIdLst>
-    <p:notesMasterId r:id="rId8"/>
+    <p:notesMasterId r:id="rId10"/>
   </p:notesMasterIdLst>
   <p:sldIdLst>
     <p:sldId id="256" r:id="rId2"/>
@@ -13,7 +13,9 @@
     <p:sldId id="257" r:id="rId4"/>
     <p:sldId id="259" r:id="rId5"/>
     <p:sldId id="292" r:id="rId6"/>
-    <p:sldId id="293" r:id="rId7"/>
+    <p:sldId id="295" r:id="rId7"/>
+    <p:sldId id="293" r:id="rId8"/>
+    <p:sldId id="294" r:id="rId9"/>
   </p:sldIdLst>
   <p:sldSz cx="12192000" cy="6858000"/>
   <p:notesSz cx="6858000" cy="9144000"/>
@@ -14003,6 +14005,1725 @@
       </p:grpSpPr>
       <p:pic>
         <p:nvPicPr>
+          <p:cNvPr id="4" name="Picture 3" descr="A green squares with black lines&#10;&#10;Description automatically generated">
+            <a:extLst>
+              <a:ext uri="{FF2B5EF4-FFF2-40B4-BE49-F238E27FC236}">
+                <a16:creationId xmlns:a16="http://schemas.microsoft.com/office/drawing/2014/main" id="{1A621FD9-9389-06C9-8A2F-C8D0F6DA9637}"/>
+              </a:ext>
+            </a:extLst>
+          </p:cNvPr>
+          <p:cNvPicPr>
+            <a:picLocks noChangeAspect="1"/>
+          </p:cNvPicPr>
+          <p:nvPr/>
+        </p:nvPicPr>
+        <p:blipFill>
+          <a:blip r:embed="rId2">
+            <a:extLst>
+              <a:ext uri="{28A0092B-C50C-407E-A947-70E740481C1C}">
+                <a14:useLocalDpi xmlns:a14="http://schemas.microsoft.com/office/drawing/2010/main" val="0"/>
+              </a:ext>
+            </a:extLst>
+          </a:blip>
+          <a:stretch>
+            <a:fillRect/>
+          </a:stretch>
+        </p:blipFill>
+        <p:spPr>
+          <a:xfrm>
+            <a:off x="3066369" y="939041"/>
+            <a:ext cx="1935629" cy="1137431"/>
+          </a:xfrm>
+          <a:prstGeom prst="rect">
+            <a:avLst/>
+          </a:prstGeom>
+        </p:spPr>
+      </p:pic>
+      <p:sp>
+        <p:nvSpPr>
+          <p:cNvPr id="5" name="Isosceles Triangle 4">
+            <a:extLst>
+              <a:ext uri="{FF2B5EF4-FFF2-40B4-BE49-F238E27FC236}">
+                <a16:creationId xmlns:a16="http://schemas.microsoft.com/office/drawing/2014/main" id="{C9DCCF56-B71C-1AFE-6866-8391AC38EAEF}"/>
+              </a:ext>
+            </a:extLst>
+          </p:cNvPr>
+          <p:cNvSpPr/>
+          <p:nvPr/>
+        </p:nvSpPr>
+        <p:spPr>
+          <a:xfrm rot="16200000">
+            <a:off x="4507060" y="1025241"/>
+            <a:ext cx="847725" cy="1016544"/>
+          </a:xfrm>
+          <a:prstGeom prst="triangle">
+            <a:avLst/>
+          </a:prstGeom>
+          <a:solidFill>
+            <a:schemeClr val="accent2">
+              <a:alpha val="50000"/>
+            </a:schemeClr>
+          </a:solidFill>
+          <a:ln>
+            <a:noFill/>
+          </a:ln>
+        </p:spPr>
+        <p:style>
+          <a:lnRef idx="0">
+            <a:scrgbClr r="0" g="0" b="0"/>
+          </a:lnRef>
+          <a:fillRef idx="0">
+            <a:scrgbClr r="0" g="0" b="0"/>
+          </a:fillRef>
+          <a:effectRef idx="0">
+            <a:scrgbClr r="0" g="0" b="0"/>
+          </a:effectRef>
+          <a:fontRef idx="minor">
+            <a:schemeClr val="lt1"/>
+          </a:fontRef>
+        </p:style>
+        <p:txBody>
+          <a:bodyPr rtlCol="0" anchor="ctr"/>
+          <a:lstStyle/>
+          <a:p>
+            <a:pPr algn="ctr"/>
+            <a:endParaRPr lang="en-SG" dirty="0"/>
+          </a:p>
+        </p:txBody>
+      </p:sp>
+      <p:cxnSp>
+        <p:nvCxnSpPr>
+          <p:cNvPr id="6" name="Straight Arrow Connector 5">
+            <a:extLst>
+              <a:ext uri="{FF2B5EF4-FFF2-40B4-BE49-F238E27FC236}">
+                <a16:creationId xmlns:a16="http://schemas.microsoft.com/office/drawing/2014/main" id="{CBBEF8EA-CEEB-4F22-42CE-0625F62D5A0D}"/>
+              </a:ext>
+            </a:extLst>
+          </p:cNvPr>
+          <p:cNvCxnSpPr>
+            <a:cxnSpLocks/>
+          </p:cNvCxnSpPr>
+          <p:nvPr/>
+        </p:nvCxnSpPr>
+        <p:spPr>
+          <a:xfrm flipH="1">
+            <a:off x="5516475" y="1063157"/>
+            <a:ext cx="581022" cy="151687"/>
+          </a:xfrm>
+          <a:prstGeom prst="straightConnector1">
+            <a:avLst/>
+          </a:prstGeom>
+          <a:ln>
+            <a:tailEnd type="triangle"/>
+          </a:ln>
+        </p:spPr>
+        <p:style>
+          <a:lnRef idx="1">
+            <a:schemeClr val="accent1"/>
+          </a:lnRef>
+          <a:fillRef idx="0">
+            <a:schemeClr val="accent1"/>
+          </a:fillRef>
+          <a:effectRef idx="0">
+            <a:schemeClr val="accent1"/>
+          </a:effectRef>
+          <a:fontRef idx="minor">
+            <a:schemeClr val="tx1"/>
+          </a:fontRef>
+        </p:style>
+      </p:cxnSp>
+      <p:sp>
+        <p:nvSpPr>
+          <p:cNvPr id="7" name="TextBox 6">
+            <a:extLst>
+              <a:ext uri="{FF2B5EF4-FFF2-40B4-BE49-F238E27FC236}">
+                <a16:creationId xmlns:a16="http://schemas.microsoft.com/office/drawing/2014/main" id="{6A16B3C6-5957-4860-FA3C-DE3DD68FC4FA}"/>
+              </a:ext>
+            </a:extLst>
+          </p:cNvPr>
+          <p:cNvSpPr txBox="1"/>
+          <p:nvPr/>
+        </p:nvSpPr>
+        <p:spPr>
+          <a:xfrm>
+            <a:off x="6148399" y="723622"/>
+            <a:ext cx="1585365" cy="461665"/>
+          </a:xfrm>
+          <a:prstGeom prst="rect">
+            <a:avLst/>
+          </a:prstGeom>
+          <a:noFill/>
+        </p:spPr>
+        <p:txBody>
+          <a:bodyPr wrap="square">
+            <a:spAutoFit/>
+          </a:bodyPr>
+          <a:lstStyle/>
+          <a:p>
+            <a:r>
+              <a:rPr lang="en-US" sz="1200" b="1" dirty="0">
+                <a:solidFill>
+                  <a:schemeClr val="tx1">
+                    <a:lumMod val="75000"/>
+                    <a:lumOff val="25000"/>
+                  </a:schemeClr>
+                </a:solidFill>
+              </a:rPr>
+              <a:t>Front radar detection area</a:t>
+            </a:r>
+            <a:endParaRPr lang="en-SG" sz="1200" b="1" dirty="0">
+              <a:solidFill>
+                <a:schemeClr val="tx1">
+                  <a:lumMod val="75000"/>
+                  <a:lumOff val="25000"/>
+                </a:schemeClr>
+              </a:solidFill>
+            </a:endParaRPr>
+          </a:p>
+        </p:txBody>
+      </p:sp>
+      <p:cxnSp>
+        <p:nvCxnSpPr>
+          <p:cNvPr id="8" name="Straight Arrow Connector 7">
+            <a:extLst>
+              <a:ext uri="{FF2B5EF4-FFF2-40B4-BE49-F238E27FC236}">
+                <a16:creationId xmlns:a16="http://schemas.microsoft.com/office/drawing/2014/main" id="{AC306257-487E-F2D2-D54D-C60B05AC763A}"/>
+              </a:ext>
+            </a:extLst>
+          </p:cNvPr>
+          <p:cNvCxnSpPr>
+            <a:cxnSpLocks/>
+          </p:cNvCxnSpPr>
+          <p:nvPr/>
+        </p:nvCxnSpPr>
+        <p:spPr>
+          <a:xfrm flipH="1">
+            <a:off x="4344710" y="857485"/>
+            <a:ext cx="10386" cy="555539"/>
+          </a:xfrm>
+          <a:prstGeom prst="straightConnector1">
+            <a:avLst/>
+          </a:prstGeom>
+          <a:ln>
+            <a:tailEnd type="triangle"/>
+          </a:ln>
+        </p:spPr>
+        <p:style>
+          <a:lnRef idx="1">
+            <a:schemeClr val="accent1"/>
+          </a:lnRef>
+          <a:fillRef idx="0">
+            <a:schemeClr val="accent1"/>
+          </a:fillRef>
+          <a:effectRef idx="0">
+            <a:schemeClr val="accent1"/>
+          </a:effectRef>
+          <a:fontRef idx="minor">
+            <a:schemeClr val="tx1"/>
+          </a:fontRef>
+        </p:style>
+      </p:cxnSp>
+      <p:sp>
+        <p:nvSpPr>
+          <p:cNvPr id="9" name="TextBox 8">
+            <a:extLst>
+              <a:ext uri="{FF2B5EF4-FFF2-40B4-BE49-F238E27FC236}">
+                <a16:creationId xmlns:a16="http://schemas.microsoft.com/office/drawing/2014/main" id="{911A80AF-14C5-23A7-38B3-4294F1100446}"/>
+              </a:ext>
+            </a:extLst>
+          </p:cNvPr>
+          <p:cNvSpPr txBox="1"/>
+          <p:nvPr/>
+        </p:nvSpPr>
+        <p:spPr>
+          <a:xfrm>
+            <a:off x="4111958" y="599889"/>
+            <a:ext cx="1787913" cy="276999"/>
+          </a:xfrm>
+          <a:prstGeom prst="rect">
+            <a:avLst/>
+          </a:prstGeom>
+          <a:noFill/>
+        </p:spPr>
+        <p:txBody>
+          <a:bodyPr wrap="square">
+            <a:spAutoFit/>
+          </a:bodyPr>
+          <a:lstStyle/>
+          <a:p>
+            <a:r>
+              <a:rPr lang="en-US" sz="1200" b="1" dirty="0">
+                <a:solidFill>
+                  <a:schemeClr val="tx1">
+                    <a:lumMod val="75000"/>
+                    <a:lumOff val="25000"/>
+                  </a:schemeClr>
+                </a:solidFill>
+              </a:rPr>
+              <a:t>Front detection sensor</a:t>
+            </a:r>
+            <a:endParaRPr lang="en-SG" sz="1200" b="1" dirty="0">
+              <a:solidFill>
+                <a:schemeClr val="tx1">
+                  <a:lumMod val="75000"/>
+                  <a:lumOff val="25000"/>
+                </a:schemeClr>
+              </a:solidFill>
+            </a:endParaRPr>
+          </a:p>
+        </p:txBody>
+      </p:sp>
+      <p:cxnSp>
+        <p:nvCxnSpPr>
+          <p:cNvPr id="10" name="Straight Arrow Connector 9">
+            <a:extLst>
+              <a:ext uri="{FF2B5EF4-FFF2-40B4-BE49-F238E27FC236}">
+                <a16:creationId xmlns:a16="http://schemas.microsoft.com/office/drawing/2014/main" id="{217D75F6-D57A-BE23-171C-43FA9D9B0460}"/>
+              </a:ext>
+            </a:extLst>
+          </p:cNvPr>
+          <p:cNvCxnSpPr>
+            <a:cxnSpLocks/>
+          </p:cNvCxnSpPr>
+          <p:nvPr/>
+        </p:nvCxnSpPr>
+        <p:spPr>
+          <a:xfrm>
+            <a:off x="4143480" y="650727"/>
+            <a:ext cx="0" cy="762297"/>
+          </a:xfrm>
+          <a:prstGeom prst="straightConnector1">
+            <a:avLst/>
+          </a:prstGeom>
+          <a:ln>
+            <a:tailEnd type="triangle"/>
+          </a:ln>
+        </p:spPr>
+        <p:style>
+          <a:lnRef idx="1">
+            <a:schemeClr val="accent1"/>
+          </a:lnRef>
+          <a:fillRef idx="0">
+            <a:schemeClr val="accent1"/>
+          </a:fillRef>
+          <a:effectRef idx="0">
+            <a:schemeClr val="accent1"/>
+          </a:effectRef>
+          <a:fontRef idx="minor">
+            <a:schemeClr val="tx1"/>
+          </a:fontRef>
+        </p:style>
+      </p:cxnSp>
+      <p:sp>
+        <p:nvSpPr>
+          <p:cNvPr id="11" name="TextBox 10">
+            <a:extLst>
+              <a:ext uri="{FF2B5EF4-FFF2-40B4-BE49-F238E27FC236}">
+                <a16:creationId xmlns:a16="http://schemas.microsoft.com/office/drawing/2014/main" id="{63245965-D600-1168-5884-7B631F95A2C6}"/>
+              </a:ext>
+            </a:extLst>
+          </p:cNvPr>
+          <p:cNvSpPr txBox="1"/>
+          <p:nvPr/>
+        </p:nvSpPr>
+        <p:spPr>
+          <a:xfrm>
+            <a:off x="3853828" y="440995"/>
+            <a:ext cx="1585365" cy="276999"/>
+          </a:xfrm>
+          <a:prstGeom prst="rect">
+            <a:avLst/>
+          </a:prstGeom>
+          <a:noFill/>
+        </p:spPr>
+        <p:txBody>
+          <a:bodyPr wrap="square">
+            <a:spAutoFit/>
+          </a:bodyPr>
+          <a:lstStyle/>
+          <a:p>
+            <a:r>
+              <a:rPr lang="en-US" sz="1200" b="1" dirty="0">
+                <a:solidFill>
+                  <a:schemeClr val="tx1">
+                    <a:lumMod val="75000"/>
+                    <a:lumOff val="25000"/>
+                  </a:schemeClr>
+                </a:solidFill>
+              </a:rPr>
+              <a:t>Speed sensor  </a:t>
+            </a:r>
+            <a:endParaRPr lang="en-SG" sz="1200" b="1" dirty="0">
+              <a:solidFill>
+                <a:schemeClr val="tx1">
+                  <a:lumMod val="75000"/>
+                  <a:lumOff val="25000"/>
+                </a:schemeClr>
+              </a:solidFill>
+            </a:endParaRPr>
+          </a:p>
+        </p:txBody>
+      </p:sp>
+      <p:cxnSp>
+        <p:nvCxnSpPr>
+          <p:cNvPr id="12" name="Straight Arrow Connector 11">
+            <a:extLst>
+              <a:ext uri="{FF2B5EF4-FFF2-40B4-BE49-F238E27FC236}">
+                <a16:creationId xmlns:a16="http://schemas.microsoft.com/office/drawing/2014/main" id="{5C3B8603-5CA7-C7C0-50E9-26A46D21E514}"/>
+              </a:ext>
+            </a:extLst>
+          </p:cNvPr>
+          <p:cNvCxnSpPr>
+            <a:cxnSpLocks/>
+          </p:cNvCxnSpPr>
+          <p:nvPr/>
+        </p:nvCxnSpPr>
+        <p:spPr>
+          <a:xfrm>
+            <a:off x="3558413" y="717994"/>
+            <a:ext cx="432667" cy="706011"/>
+          </a:xfrm>
+          <a:prstGeom prst="straightConnector1">
+            <a:avLst/>
+          </a:prstGeom>
+          <a:ln>
+            <a:tailEnd type="triangle"/>
+          </a:ln>
+        </p:spPr>
+        <p:style>
+          <a:lnRef idx="1">
+            <a:schemeClr val="accent1"/>
+          </a:lnRef>
+          <a:fillRef idx="0">
+            <a:schemeClr val="accent1"/>
+          </a:fillRef>
+          <a:effectRef idx="0">
+            <a:schemeClr val="accent1"/>
+          </a:effectRef>
+          <a:fontRef idx="minor">
+            <a:schemeClr val="tx1"/>
+          </a:fontRef>
+        </p:style>
+      </p:cxnSp>
+      <p:sp>
+        <p:nvSpPr>
+          <p:cNvPr id="13" name="TextBox 12">
+            <a:extLst>
+              <a:ext uri="{FF2B5EF4-FFF2-40B4-BE49-F238E27FC236}">
+                <a16:creationId xmlns:a16="http://schemas.microsoft.com/office/drawing/2014/main" id="{03B39A4C-5985-A0FA-3923-26D1D90477AF}"/>
+              </a:ext>
+            </a:extLst>
+          </p:cNvPr>
+          <p:cNvSpPr txBox="1"/>
+          <p:nvPr/>
+        </p:nvSpPr>
+        <p:spPr>
+          <a:xfrm>
+            <a:off x="2660539" y="486809"/>
+            <a:ext cx="1585365" cy="276999"/>
+          </a:xfrm>
+          <a:prstGeom prst="rect">
+            <a:avLst/>
+          </a:prstGeom>
+          <a:noFill/>
+        </p:spPr>
+        <p:txBody>
+          <a:bodyPr wrap="square">
+            <a:spAutoFit/>
+          </a:bodyPr>
+          <a:lstStyle/>
+          <a:p>
+            <a:r>
+              <a:rPr lang="en-US" sz="1200" b="1" dirty="0">
+                <a:solidFill>
+                  <a:schemeClr val="tx1">
+                    <a:lumMod val="75000"/>
+                    <a:lumOff val="25000"/>
+                  </a:schemeClr>
+                </a:solidFill>
+              </a:rPr>
+              <a:t>Throttle &amp; break</a:t>
+            </a:r>
+            <a:endParaRPr lang="en-SG" sz="1200" b="1" dirty="0">
+              <a:solidFill>
+                <a:schemeClr val="tx1">
+                  <a:lumMod val="75000"/>
+                  <a:lumOff val="25000"/>
+                </a:schemeClr>
+              </a:solidFill>
+            </a:endParaRPr>
+          </a:p>
+        </p:txBody>
+      </p:sp>
+      <p:sp>
+        <p:nvSpPr>
+          <p:cNvPr id="14" name="Rectangle 13">
+            <a:extLst>
+              <a:ext uri="{FF2B5EF4-FFF2-40B4-BE49-F238E27FC236}">
+                <a16:creationId xmlns:a16="http://schemas.microsoft.com/office/drawing/2014/main" id="{14E8A6CA-EF3F-85B2-376D-59CB3FE67AED}"/>
+              </a:ext>
+            </a:extLst>
+          </p:cNvPr>
+          <p:cNvSpPr/>
+          <p:nvPr/>
+        </p:nvSpPr>
+        <p:spPr>
+          <a:xfrm>
+            <a:off x="2535570" y="2847722"/>
+            <a:ext cx="3152775" cy="1758110"/>
+          </a:xfrm>
+          <a:prstGeom prst="rect">
+            <a:avLst/>
+          </a:prstGeom>
+        </p:spPr>
+        <p:style>
+          <a:lnRef idx="2">
+            <a:schemeClr val="dk1"/>
+          </a:lnRef>
+          <a:fillRef idx="1">
+            <a:schemeClr val="lt1"/>
+          </a:fillRef>
+          <a:effectRef idx="0">
+            <a:schemeClr val="dk1"/>
+          </a:effectRef>
+          <a:fontRef idx="minor">
+            <a:schemeClr val="dk1"/>
+          </a:fontRef>
+        </p:style>
+        <p:txBody>
+          <a:bodyPr rtlCol="0" anchor="ctr"/>
+          <a:lstStyle/>
+          <a:p>
+            <a:pPr algn="ctr"/>
+            <a:endParaRPr lang="en-SG" dirty="0"/>
+          </a:p>
+        </p:txBody>
+      </p:sp>
+      <p:pic>
+        <p:nvPicPr>
+          <p:cNvPr id="15" name="Picture 14">
+            <a:extLst>
+              <a:ext uri="{FF2B5EF4-FFF2-40B4-BE49-F238E27FC236}">
+                <a16:creationId xmlns:a16="http://schemas.microsoft.com/office/drawing/2014/main" id="{8AF675FE-FF92-791C-40C5-EDC1E42C1923}"/>
+              </a:ext>
+            </a:extLst>
+          </p:cNvPr>
+          <p:cNvPicPr>
+            <a:picLocks noChangeAspect="1"/>
+          </p:cNvPicPr>
+          <p:nvPr/>
+        </p:nvPicPr>
+        <p:blipFill>
+          <a:blip r:embed="rId3"/>
+          <a:stretch>
+            <a:fillRect/>
+          </a:stretch>
+        </p:blipFill>
+        <p:spPr>
+          <a:xfrm>
+            <a:off x="5203854" y="4272849"/>
+            <a:ext cx="421420" cy="248638"/>
+          </a:xfrm>
+          <a:prstGeom prst="rect">
+            <a:avLst/>
+          </a:prstGeom>
+          <a:ln>
+            <a:solidFill>
+              <a:schemeClr val="tx1"/>
+            </a:solidFill>
+          </a:ln>
+        </p:spPr>
+      </p:pic>
+      <p:sp>
+        <p:nvSpPr>
+          <p:cNvPr id="16" name="TextBox 15">
+            <a:extLst>
+              <a:ext uri="{FF2B5EF4-FFF2-40B4-BE49-F238E27FC236}">
+                <a16:creationId xmlns:a16="http://schemas.microsoft.com/office/drawing/2014/main" id="{4E73D253-2888-1502-6BBF-667ADE4D5ED5}"/>
+              </a:ext>
+            </a:extLst>
+          </p:cNvPr>
+          <p:cNvSpPr txBox="1"/>
+          <p:nvPr/>
+        </p:nvSpPr>
+        <p:spPr>
+          <a:xfrm>
+            <a:off x="4604756" y="2964507"/>
+            <a:ext cx="599768" cy="369332"/>
+          </a:xfrm>
+          <a:prstGeom prst="rect">
+            <a:avLst/>
+          </a:prstGeom>
+          <a:solidFill>
+            <a:schemeClr val="accent1"/>
+          </a:solidFill>
+        </p:spPr>
+        <p:txBody>
+          <a:bodyPr wrap="square" rtlCol="0">
+            <a:spAutoFit/>
+          </a:bodyPr>
+          <a:lstStyle/>
+          <a:p>
+            <a:r>
+              <a:rPr lang="en-US" dirty="0">
+                <a:solidFill>
+                  <a:schemeClr val="bg1"/>
+                </a:solidFill>
+              </a:rPr>
+              <a:t>HR0</a:t>
+            </a:r>
+            <a:endParaRPr lang="en-SG" dirty="0">
+              <a:solidFill>
+                <a:schemeClr val="bg1"/>
+              </a:solidFill>
+            </a:endParaRPr>
+          </a:p>
+        </p:txBody>
+      </p:sp>
+      <p:cxnSp>
+        <p:nvCxnSpPr>
+          <p:cNvPr id="17" name="Connector: Elbow 16">
+            <a:extLst>
+              <a:ext uri="{FF2B5EF4-FFF2-40B4-BE49-F238E27FC236}">
+                <a16:creationId xmlns:a16="http://schemas.microsoft.com/office/drawing/2014/main" id="{0485A666-13C7-34F7-250C-910B6EA3B28F}"/>
+              </a:ext>
+            </a:extLst>
+          </p:cNvPr>
+          <p:cNvCxnSpPr>
+            <a:endCxn id="16" idx="3"/>
+          </p:cNvCxnSpPr>
+          <p:nvPr/>
+        </p:nvCxnSpPr>
+        <p:spPr>
+          <a:xfrm rot="16200000" flipH="1">
+            <a:off x="4028872" y="1973520"/>
+            <a:ext cx="1501877" cy="849428"/>
+          </a:xfrm>
+          <a:prstGeom prst="bentConnector4">
+            <a:avLst>
+              <a:gd name="adj1" fmla="val 43852"/>
+              <a:gd name="adj2" fmla="val 126912"/>
+            </a:avLst>
+          </a:prstGeom>
+          <a:ln w="28575">
+            <a:solidFill>
+              <a:srgbClr val="7030A0"/>
+            </a:solidFill>
+          </a:ln>
+        </p:spPr>
+        <p:style>
+          <a:lnRef idx="1">
+            <a:schemeClr val="accent1"/>
+          </a:lnRef>
+          <a:fillRef idx="0">
+            <a:schemeClr val="accent1"/>
+          </a:fillRef>
+          <a:effectRef idx="0">
+            <a:schemeClr val="accent1"/>
+          </a:effectRef>
+          <a:fontRef idx="minor">
+            <a:schemeClr val="tx1"/>
+          </a:fontRef>
+        </p:style>
+      </p:cxnSp>
+      <p:sp>
+        <p:nvSpPr>
+          <p:cNvPr id="18" name="TextBox 17">
+            <a:extLst>
+              <a:ext uri="{FF2B5EF4-FFF2-40B4-BE49-F238E27FC236}">
+                <a16:creationId xmlns:a16="http://schemas.microsoft.com/office/drawing/2014/main" id="{14CF9F4C-5143-E533-50E1-808FA24534DE}"/>
+              </a:ext>
+            </a:extLst>
+          </p:cNvPr>
+          <p:cNvSpPr txBox="1"/>
+          <p:nvPr/>
+        </p:nvSpPr>
+        <p:spPr>
+          <a:xfrm>
+            <a:off x="2641654" y="3612525"/>
+            <a:ext cx="849429" cy="369332"/>
+          </a:xfrm>
+          <a:prstGeom prst="rect">
+            <a:avLst/>
+          </a:prstGeom>
+          <a:solidFill>
+            <a:schemeClr val="accent1"/>
+          </a:solidFill>
+        </p:spPr>
+        <p:txBody>
+          <a:bodyPr wrap="square" rtlCol="0">
+            <a:spAutoFit/>
+          </a:bodyPr>
+          <a:lstStyle/>
+          <a:p>
+            <a:r>
+              <a:rPr lang="en-US" dirty="0">
+                <a:solidFill>
+                  <a:schemeClr val="bg1"/>
+                </a:solidFill>
+              </a:rPr>
+              <a:t>Coil00</a:t>
+            </a:r>
+            <a:endParaRPr lang="en-SG" dirty="0">
+              <a:solidFill>
+                <a:schemeClr val="bg1"/>
+              </a:solidFill>
+            </a:endParaRPr>
+          </a:p>
+        </p:txBody>
+      </p:sp>
+      <p:sp>
+        <p:nvSpPr>
+          <p:cNvPr id="19" name="TextBox 18">
+            <a:extLst>
+              <a:ext uri="{FF2B5EF4-FFF2-40B4-BE49-F238E27FC236}">
+                <a16:creationId xmlns:a16="http://schemas.microsoft.com/office/drawing/2014/main" id="{02451848-29E4-828E-E830-44D344F24A83}"/>
+              </a:ext>
+            </a:extLst>
+          </p:cNvPr>
+          <p:cNvSpPr txBox="1"/>
+          <p:nvPr/>
+        </p:nvSpPr>
+        <p:spPr>
+          <a:xfrm>
+            <a:off x="2660539" y="4109178"/>
+            <a:ext cx="825321" cy="369332"/>
+          </a:xfrm>
+          <a:prstGeom prst="rect">
+            <a:avLst/>
+          </a:prstGeom>
+          <a:solidFill>
+            <a:schemeClr val="accent1"/>
+          </a:solidFill>
+        </p:spPr>
+        <p:txBody>
+          <a:bodyPr wrap="square" rtlCol="0">
+            <a:spAutoFit/>
+          </a:bodyPr>
+          <a:lstStyle/>
+          <a:p>
+            <a:r>
+              <a:rPr lang="en-US" dirty="0">
+                <a:solidFill>
+                  <a:schemeClr val="bg1"/>
+                </a:solidFill>
+              </a:rPr>
+              <a:t>Coil01</a:t>
+            </a:r>
+            <a:endParaRPr lang="en-SG" dirty="0">
+              <a:solidFill>
+                <a:schemeClr val="bg1"/>
+              </a:solidFill>
+            </a:endParaRPr>
+          </a:p>
+        </p:txBody>
+      </p:sp>
+      <p:cxnSp>
+        <p:nvCxnSpPr>
+          <p:cNvPr id="20" name="Straight Arrow Connector 19">
+            <a:extLst>
+              <a:ext uri="{FF2B5EF4-FFF2-40B4-BE49-F238E27FC236}">
+                <a16:creationId xmlns:a16="http://schemas.microsoft.com/office/drawing/2014/main" id="{B0FF459A-EBB9-3097-6A23-CD8CE4B31CD6}"/>
+              </a:ext>
+            </a:extLst>
+          </p:cNvPr>
+          <p:cNvCxnSpPr>
+            <a:cxnSpLocks/>
+          </p:cNvCxnSpPr>
+          <p:nvPr/>
+        </p:nvCxnSpPr>
+        <p:spPr>
+          <a:xfrm>
+            <a:off x="2730562" y="1109650"/>
+            <a:ext cx="986378" cy="314355"/>
+          </a:xfrm>
+          <a:prstGeom prst="straightConnector1">
+            <a:avLst/>
+          </a:prstGeom>
+          <a:ln>
+            <a:tailEnd type="triangle"/>
+          </a:ln>
+        </p:spPr>
+        <p:style>
+          <a:lnRef idx="1">
+            <a:schemeClr val="accent1"/>
+          </a:lnRef>
+          <a:fillRef idx="0">
+            <a:schemeClr val="accent1"/>
+          </a:fillRef>
+          <a:effectRef idx="0">
+            <a:schemeClr val="accent1"/>
+          </a:effectRef>
+          <a:fontRef idx="minor">
+            <a:schemeClr val="tx1"/>
+          </a:fontRef>
+        </p:style>
+      </p:cxnSp>
+      <p:sp>
+        <p:nvSpPr>
+          <p:cNvPr id="21" name="TextBox 20">
+            <a:extLst>
+              <a:ext uri="{FF2B5EF4-FFF2-40B4-BE49-F238E27FC236}">
+                <a16:creationId xmlns:a16="http://schemas.microsoft.com/office/drawing/2014/main" id="{AD9F177E-3618-8CF3-BC7D-B83D45862ED9}"/>
+              </a:ext>
+            </a:extLst>
+          </p:cNvPr>
+          <p:cNvSpPr txBox="1"/>
+          <p:nvPr/>
+        </p:nvSpPr>
+        <p:spPr>
+          <a:xfrm>
+            <a:off x="2122356" y="744972"/>
+            <a:ext cx="986378" cy="461665"/>
+          </a:xfrm>
+          <a:prstGeom prst="rect">
+            <a:avLst/>
+          </a:prstGeom>
+          <a:noFill/>
+        </p:spPr>
+        <p:txBody>
+          <a:bodyPr wrap="square">
+            <a:spAutoFit/>
+          </a:bodyPr>
+          <a:lstStyle/>
+          <a:p>
+            <a:r>
+              <a:rPr lang="en-US" sz="1200" b="1" dirty="0">
+                <a:solidFill>
+                  <a:schemeClr val="tx1">
+                    <a:lumMod val="75000"/>
+                    <a:lumOff val="25000"/>
+                  </a:schemeClr>
+                </a:solidFill>
+              </a:rPr>
+              <a:t>Overall train </a:t>
+            </a:r>
+          </a:p>
+          <a:p>
+            <a:r>
+              <a:rPr lang="en-US" sz="1200" b="1" dirty="0">
+                <a:solidFill>
+                  <a:schemeClr val="tx1">
+                    <a:lumMod val="75000"/>
+                    <a:lumOff val="25000"/>
+                  </a:schemeClr>
+                </a:solidFill>
+              </a:rPr>
+              <a:t>power</a:t>
+            </a:r>
+            <a:endParaRPr lang="en-SG" sz="1200" b="1" dirty="0">
+              <a:solidFill>
+                <a:schemeClr val="tx1">
+                  <a:lumMod val="75000"/>
+                  <a:lumOff val="25000"/>
+                </a:schemeClr>
+              </a:solidFill>
+            </a:endParaRPr>
+          </a:p>
+        </p:txBody>
+      </p:sp>
+      <p:sp>
+        <p:nvSpPr>
+          <p:cNvPr id="22" name="TextBox 21">
+            <a:extLst>
+              <a:ext uri="{FF2B5EF4-FFF2-40B4-BE49-F238E27FC236}">
+                <a16:creationId xmlns:a16="http://schemas.microsoft.com/office/drawing/2014/main" id="{BA1F1290-05C5-2EDA-C9AB-D158161423D7}"/>
+              </a:ext>
+            </a:extLst>
+          </p:cNvPr>
+          <p:cNvSpPr txBox="1"/>
+          <p:nvPr/>
+        </p:nvSpPr>
+        <p:spPr>
+          <a:xfrm>
+            <a:off x="4702114" y="3600503"/>
+            <a:ext cx="599768" cy="369332"/>
+          </a:xfrm>
+          <a:prstGeom prst="rect">
+            <a:avLst/>
+          </a:prstGeom>
+          <a:solidFill>
+            <a:schemeClr val="accent1"/>
+          </a:solidFill>
+        </p:spPr>
+        <p:txBody>
+          <a:bodyPr wrap="square" rtlCol="0">
+            <a:spAutoFit/>
+          </a:bodyPr>
+          <a:lstStyle/>
+          <a:p>
+            <a:r>
+              <a:rPr lang="en-US" dirty="0">
+                <a:solidFill>
+                  <a:schemeClr val="bg1"/>
+                </a:solidFill>
+              </a:rPr>
+              <a:t>HR1</a:t>
+            </a:r>
+            <a:endParaRPr lang="en-SG" dirty="0">
+              <a:solidFill>
+                <a:schemeClr val="bg1"/>
+              </a:solidFill>
+            </a:endParaRPr>
+          </a:p>
+        </p:txBody>
+      </p:sp>
+      <p:cxnSp>
+        <p:nvCxnSpPr>
+          <p:cNvPr id="23" name="Connector: Elbow 22">
+            <a:extLst>
+              <a:ext uri="{FF2B5EF4-FFF2-40B4-BE49-F238E27FC236}">
+                <a16:creationId xmlns:a16="http://schemas.microsoft.com/office/drawing/2014/main" id="{EC272F40-7EC9-B992-5CE0-30B40B54B638}"/>
+              </a:ext>
+            </a:extLst>
+          </p:cNvPr>
+          <p:cNvCxnSpPr>
+            <a:cxnSpLocks/>
+          </p:cNvCxnSpPr>
+          <p:nvPr/>
+        </p:nvCxnSpPr>
+        <p:spPr>
+          <a:xfrm rot="16200000" flipH="1">
+            <a:off x="3505417" y="2286204"/>
+            <a:ext cx="1959956" cy="683827"/>
+          </a:xfrm>
+          <a:prstGeom prst="bentConnector3">
+            <a:avLst>
+              <a:gd name="adj1" fmla="val 90132"/>
+            </a:avLst>
+          </a:prstGeom>
+          <a:ln w="28575">
+            <a:solidFill>
+              <a:srgbClr val="7030A0"/>
+            </a:solidFill>
+          </a:ln>
+        </p:spPr>
+        <p:style>
+          <a:lnRef idx="1">
+            <a:schemeClr val="accent1"/>
+          </a:lnRef>
+          <a:fillRef idx="0">
+            <a:schemeClr val="accent1"/>
+          </a:fillRef>
+          <a:effectRef idx="0">
+            <a:schemeClr val="accent1"/>
+          </a:effectRef>
+          <a:fontRef idx="minor">
+            <a:schemeClr val="tx1"/>
+          </a:fontRef>
+        </p:style>
+      </p:cxnSp>
+      <p:cxnSp>
+        <p:nvCxnSpPr>
+          <p:cNvPr id="24" name="Straight Arrow Connector 23">
+            <a:extLst>
+              <a:ext uri="{FF2B5EF4-FFF2-40B4-BE49-F238E27FC236}">
+                <a16:creationId xmlns:a16="http://schemas.microsoft.com/office/drawing/2014/main" id="{6B9C1E14-0BD0-C4D9-E98E-FA35F31BB969}"/>
+              </a:ext>
+            </a:extLst>
+          </p:cNvPr>
+          <p:cNvCxnSpPr>
+            <a:cxnSpLocks/>
+          </p:cNvCxnSpPr>
+          <p:nvPr/>
+        </p:nvCxnSpPr>
+        <p:spPr>
+          <a:xfrm flipH="1">
+            <a:off x="4300500" y="3214773"/>
+            <a:ext cx="304255" cy="550412"/>
+          </a:xfrm>
+          <a:prstGeom prst="straightConnector1">
+            <a:avLst/>
+          </a:prstGeom>
+          <a:ln w="19050">
+            <a:prstDash val="sysDash"/>
+            <a:tailEnd type="triangle"/>
+          </a:ln>
+        </p:spPr>
+        <p:style>
+          <a:lnRef idx="1">
+            <a:schemeClr val="dk1"/>
+          </a:lnRef>
+          <a:fillRef idx="0">
+            <a:schemeClr val="dk1"/>
+          </a:fillRef>
+          <a:effectRef idx="0">
+            <a:schemeClr val="dk1"/>
+          </a:effectRef>
+          <a:fontRef idx="minor">
+            <a:schemeClr val="tx1"/>
+          </a:fontRef>
+        </p:style>
+      </p:cxnSp>
+      <p:pic>
+        <p:nvPicPr>
+          <p:cNvPr id="25" name="Picture 24">
+            <a:extLst>
+              <a:ext uri="{FF2B5EF4-FFF2-40B4-BE49-F238E27FC236}">
+                <a16:creationId xmlns:a16="http://schemas.microsoft.com/office/drawing/2014/main" id="{AA5B95FC-1DB2-CA2A-D4EA-CF4B7926B26A}"/>
+              </a:ext>
+            </a:extLst>
+          </p:cNvPr>
+          <p:cNvPicPr>
+            <a:picLocks noChangeAspect="1"/>
+          </p:cNvPicPr>
+          <p:nvPr/>
+        </p:nvPicPr>
+        <p:blipFill>
+          <a:blip r:embed="rId4"/>
+          <a:stretch>
+            <a:fillRect/>
+          </a:stretch>
+        </p:blipFill>
+        <p:spPr>
+          <a:xfrm>
+            <a:off x="3700336" y="3524812"/>
+            <a:ext cx="610493" cy="520714"/>
+          </a:xfrm>
+          <a:prstGeom prst="rect">
+            <a:avLst/>
+          </a:prstGeom>
+        </p:spPr>
+      </p:pic>
+      <p:cxnSp>
+        <p:nvCxnSpPr>
+          <p:cNvPr id="26" name="Straight Arrow Connector 25">
+            <a:extLst>
+              <a:ext uri="{FF2B5EF4-FFF2-40B4-BE49-F238E27FC236}">
+                <a16:creationId xmlns:a16="http://schemas.microsoft.com/office/drawing/2014/main" id="{42A8BEDA-1A4B-D616-B952-764BDEB113BA}"/>
+              </a:ext>
+            </a:extLst>
+          </p:cNvPr>
+          <p:cNvCxnSpPr>
+            <a:cxnSpLocks/>
+            <a:stCxn id="25" idx="1"/>
+            <a:endCxn id="18" idx="3"/>
+          </p:cNvCxnSpPr>
+          <p:nvPr/>
+        </p:nvCxnSpPr>
+        <p:spPr>
+          <a:xfrm flipH="1">
+            <a:off x="3491083" y="3785169"/>
+            <a:ext cx="209253" cy="12022"/>
+          </a:xfrm>
+          <a:prstGeom prst="straightConnector1">
+            <a:avLst/>
+          </a:prstGeom>
+          <a:ln w="19050">
+            <a:prstDash val="sysDash"/>
+            <a:tailEnd type="triangle"/>
+          </a:ln>
+        </p:spPr>
+        <p:style>
+          <a:lnRef idx="1">
+            <a:schemeClr val="dk1"/>
+          </a:lnRef>
+          <a:fillRef idx="0">
+            <a:schemeClr val="dk1"/>
+          </a:fillRef>
+          <a:effectRef idx="0">
+            <a:schemeClr val="dk1"/>
+          </a:effectRef>
+          <a:fontRef idx="minor">
+            <a:schemeClr val="tx1"/>
+          </a:fontRef>
+        </p:style>
+      </p:cxnSp>
+      <p:cxnSp>
+        <p:nvCxnSpPr>
+          <p:cNvPr id="27" name="Connector: Elbow 26">
+            <a:extLst>
+              <a:ext uri="{FF2B5EF4-FFF2-40B4-BE49-F238E27FC236}">
+                <a16:creationId xmlns:a16="http://schemas.microsoft.com/office/drawing/2014/main" id="{7032DF8D-C684-B687-0551-FD73565EBFE3}"/>
+              </a:ext>
+            </a:extLst>
+          </p:cNvPr>
+          <p:cNvCxnSpPr>
+            <a:cxnSpLocks/>
+            <a:endCxn id="18" idx="0"/>
+          </p:cNvCxnSpPr>
+          <p:nvPr/>
+        </p:nvCxnSpPr>
+        <p:spPr>
+          <a:xfrm rot="5400000">
+            <a:off x="2544326" y="2192688"/>
+            <a:ext cx="1941881" cy="897793"/>
+          </a:xfrm>
+          <a:prstGeom prst="bentConnector3">
+            <a:avLst>
+              <a:gd name="adj1" fmla="val 50000"/>
+            </a:avLst>
+          </a:prstGeom>
+          <a:ln w="28575">
+            <a:solidFill>
+              <a:srgbClr val="7030A0"/>
+            </a:solidFill>
+          </a:ln>
+        </p:spPr>
+        <p:style>
+          <a:lnRef idx="1">
+            <a:schemeClr val="accent1"/>
+          </a:lnRef>
+          <a:fillRef idx="0">
+            <a:schemeClr val="accent1"/>
+          </a:fillRef>
+          <a:effectRef idx="0">
+            <a:schemeClr val="accent1"/>
+          </a:effectRef>
+          <a:fontRef idx="minor">
+            <a:schemeClr val="tx1"/>
+          </a:fontRef>
+        </p:style>
+      </p:cxnSp>
+      <p:cxnSp>
+        <p:nvCxnSpPr>
+          <p:cNvPr id="28" name="Connector: Elbow 27">
+            <a:extLst>
+              <a:ext uri="{FF2B5EF4-FFF2-40B4-BE49-F238E27FC236}">
+                <a16:creationId xmlns:a16="http://schemas.microsoft.com/office/drawing/2014/main" id="{F7B69DA1-AB40-EBCA-AA37-5E8CAE0A52D3}"/>
+              </a:ext>
+            </a:extLst>
+          </p:cNvPr>
+          <p:cNvCxnSpPr>
+            <a:cxnSpLocks/>
+            <a:endCxn id="19" idx="1"/>
+          </p:cNvCxnSpPr>
+          <p:nvPr/>
+        </p:nvCxnSpPr>
+        <p:spPr>
+          <a:xfrm rot="5400000">
+            <a:off x="1891025" y="2387589"/>
+            <a:ext cx="2675769" cy="1136740"/>
+          </a:xfrm>
+          <a:prstGeom prst="bentConnector4">
+            <a:avLst>
+              <a:gd name="adj1" fmla="val 27682"/>
+              <a:gd name="adj2" fmla="val 120110"/>
+            </a:avLst>
+          </a:prstGeom>
+          <a:ln w="28575">
+            <a:solidFill>
+              <a:srgbClr val="7030A0"/>
+            </a:solidFill>
+          </a:ln>
+        </p:spPr>
+        <p:style>
+          <a:lnRef idx="1">
+            <a:schemeClr val="accent1"/>
+          </a:lnRef>
+          <a:fillRef idx="0">
+            <a:schemeClr val="accent1"/>
+          </a:fillRef>
+          <a:effectRef idx="0">
+            <a:schemeClr val="accent1"/>
+          </a:effectRef>
+          <a:fontRef idx="minor">
+            <a:schemeClr val="tx1"/>
+          </a:fontRef>
+        </p:style>
+      </p:cxnSp>
+      <p:sp>
+        <p:nvSpPr>
+          <p:cNvPr id="29" name="TextBox 28">
+            <a:extLst>
+              <a:ext uri="{FF2B5EF4-FFF2-40B4-BE49-F238E27FC236}">
+                <a16:creationId xmlns:a16="http://schemas.microsoft.com/office/drawing/2014/main" id="{EE1B702E-1BF6-E813-8345-6E8717EABEA8}"/>
+              </a:ext>
+            </a:extLst>
+          </p:cNvPr>
+          <p:cNvSpPr txBox="1"/>
+          <p:nvPr/>
+        </p:nvSpPr>
+        <p:spPr>
+          <a:xfrm>
+            <a:off x="4315005" y="2637860"/>
+            <a:ext cx="1346628" cy="400110"/>
+          </a:xfrm>
+          <a:prstGeom prst="rect">
+            <a:avLst/>
+          </a:prstGeom>
+          <a:noFill/>
+        </p:spPr>
+        <p:txBody>
+          <a:bodyPr wrap="square">
+            <a:spAutoFit/>
+          </a:bodyPr>
+          <a:lstStyle/>
+          <a:p>
+            <a:r>
+              <a:rPr lang="en-US" sz="1000" b="1" dirty="0">
+                <a:solidFill>
+                  <a:schemeClr val="tx1">
+                    <a:lumMod val="75000"/>
+                    <a:lumOff val="25000"/>
+                  </a:schemeClr>
+                </a:solidFill>
+              </a:rPr>
+              <a:t>Front sensor state holding register </a:t>
+            </a:r>
+            <a:endParaRPr lang="en-SG" sz="1000" b="1" dirty="0">
+              <a:solidFill>
+                <a:schemeClr val="tx1">
+                  <a:lumMod val="75000"/>
+                  <a:lumOff val="25000"/>
+                </a:schemeClr>
+              </a:solidFill>
+            </a:endParaRPr>
+          </a:p>
+        </p:txBody>
+      </p:sp>
+      <p:sp>
+        <p:nvSpPr>
+          <p:cNvPr id="30" name="TextBox 29">
+            <a:extLst>
+              <a:ext uri="{FF2B5EF4-FFF2-40B4-BE49-F238E27FC236}">
+                <a16:creationId xmlns:a16="http://schemas.microsoft.com/office/drawing/2014/main" id="{9E1C2C0F-A033-F323-4C34-14F42984FCC6}"/>
+              </a:ext>
+            </a:extLst>
+          </p:cNvPr>
+          <p:cNvSpPr txBox="1"/>
+          <p:nvPr/>
+        </p:nvSpPr>
+        <p:spPr>
+          <a:xfrm>
+            <a:off x="5253814" y="3467834"/>
+            <a:ext cx="975941" cy="553998"/>
+          </a:xfrm>
+          <a:prstGeom prst="rect">
+            <a:avLst/>
+          </a:prstGeom>
+          <a:noFill/>
+        </p:spPr>
+        <p:txBody>
+          <a:bodyPr wrap="square">
+            <a:spAutoFit/>
+          </a:bodyPr>
+          <a:lstStyle/>
+          <a:p>
+            <a:r>
+              <a:rPr lang="en-US" sz="1000" b="1" dirty="0">
+                <a:solidFill>
+                  <a:schemeClr val="tx1">
+                    <a:lumMod val="75000"/>
+                    <a:lumOff val="25000"/>
+                  </a:schemeClr>
+                </a:solidFill>
+              </a:rPr>
+              <a:t>Speed sensor state holding register </a:t>
+            </a:r>
+            <a:endParaRPr lang="en-SG" sz="1000" b="1" dirty="0">
+              <a:solidFill>
+                <a:schemeClr val="tx1">
+                  <a:lumMod val="75000"/>
+                  <a:lumOff val="25000"/>
+                </a:schemeClr>
+              </a:solidFill>
+            </a:endParaRPr>
+          </a:p>
+        </p:txBody>
+      </p:sp>
+      <p:sp>
+        <p:nvSpPr>
+          <p:cNvPr id="31" name="TextBox 30">
+            <a:extLst>
+              <a:ext uri="{FF2B5EF4-FFF2-40B4-BE49-F238E27FC236}">
+                <a16:creationId xmlns:a16="http://schemas.microsoft.com/office/drawing/2014/main" id="{688C0086-159B-1B39-AAB7-B58CBB063488}"/>
+              </a:ext>
+            </a:extLst>
+          </p:cNvPr>
+          <p:cNvSpPr txBox="1"/>
+          <p:nvPr/>
+        </p:nvSpPr>
+        <p:spPr>
+          <a:xfrm>
+            <a:off x="2569565" y="3234735"/>
+            <a:ext cx="1117949" cy="400110"/>
+          </a:xfrm>
+          <a:prstGeom prst="rect">
+            <a:avLst/>
+          </a:prstGeom>
+          <a:noFill/>
+        </p:spPr>
+        <p:txBody>
+          <a:bodyPr wrap="square">
+            <a:spAutoFit/>
+          </a:bodyPr>
+          <a:lstStyle/>
+          <a:p>
+            <a:r>
+              <a:rPr lang="en-US" sz="1000" b="1" dirty="0">
+                <a:solidFill>
+                  <a:schemeClr val="tx1">
+                    <a:lumMod val="75000"/>
+                    <a:lumOff val="25000"/>
+                  </a:schemeClr>
+                </a:solidFill>
+              </a:rPr>
+              <a:t>Coil output to throttle </a:t>
+            </a:r>
+            <a:endParaRPr lang="en-SG" sz="1000" b="1" dirty="0">
+              <a:solidFill>
+                <a:schemeClr val="tx1">
+                  <a:lumMod val="75000"/>
+                  <a:lumOff val="25000"/>
+                </a:schemeClr>
+              </a:solidFill>
+            </a:endParaRPr>
+          </a:p>
+        </p:txBody>
+      </p:sp>
+      <p:sp>
+        <p:nvSpPr>
+          <p:cNvPr id="32" name="TextBox 31">
+            <a:extLst>
+              <a:ext uri="{FF2B5EF4-FFF2-40B4-BE49-F238E27FC236}">
+                <a16:creationId xmlns:a16="http://schemas.microsoft.com/office/drawing/2014/main" id="{BBFCAB5C-1414-18DE-AE6F-D520515593F2}"/>
+              </a:ext>
+            </a:extLst>
+          </p:cNvPr>
+          <p:cNvSpPr txBox="1"/>
+          <p:nvPr/>
+        </p:nvSpPr>
+        <p:spPr>
+          <a:xfrm>
+            <a:off x="3432105" y="4095936"/>
+            <a:ext cx="1117949" cy="400110"/>
+          </a:xfrm>
+          <a:prstGeom prst="rect">
+            <a:avLst/>
+          </a:prstGeom>
+          <a:noFill/>
+        </p:spPr>
+        <p:txBody>
+          <a:bodyPr wrap="square">
+            <a:spAutoFit/>
+          </a:bodyPr>
+          <a:lstStyle/>
+          <a:p>
+            <a:r>
+              <a:rPr lang="en-US" sz="1000" b="1" dirty="0">
+                <a:solidFill>
+                  <a:schemeClr val="tx1">
+                    <a:lumMod val="75000"/>
+                    <a:lumOff val="25000"/>
+                  </a:schemeClr>
+                </a:solidFill>
+              </a:rPr>
+              <a:t>Coil output to train brake</a:t>
+            </a:r>
+            <a:endParaRPr lang="en-SG" sz="1000" b="1" dirty="0">
+              <a:solidFill>
+                <a:schemeClr val="tx1">
+                  <a:lumMod val="75000"/>
+                  <a:lumOff val="25000"/>
+                </a:schemeClr>
+              </a:solidFill>
+            </a:endParaRPr>
+          </a:p>
+        </p:txBody>
+      </p:sp>
+      <p:sp>
+        <p:nvSpPr>
+          <p:cNvPr id="34" name="TextBox 33">
+            <a:extLst>
+              <a:ext uri="{FF2B5EF4-FFF2-40B4-BE49-F238E27FC236}">
+                <a16:creationId xmlns:a16="http://schemas.microsoft.com/office/drawing/2014/main" id="{27096413-BFCE-38A4-9766-5D784C275261}"/>
+              </a:ext>
+            </a:extLst>
+          </p:cNvPr>
+          <p:cNvSpPr txBox="1"/>
+          <p:nvPr/>
+        </p:nvSpPr>
+        <p:spPr>
+          <a:xfrm>
+            <a:off x="6358279" y="1162848"/>
+            <a:ext cx="2293638" cy="276999"/>
+          </a:xfrm>
+          <a:prstGeom prst="rect">
+            <a:avLst/>
+          </a:prstGeom>
+          <a:noFill/>
+        </p:spPr>
+        <p:txBody>
+          <a:bodyPr wrap="square">
+            <a:spAutoFit/>
+          </a:bodyPr>
+          <a:lstStyle/>
+          <a:p>
+            <a:r>
+              <a:rPr lang="en-US" sz="1200" b="1" dirty="0">
+                <a:solidFill>
+                  <a:schemeClr val="tx1">
+                    <a:lumMod val="75000"/>
+                    <a:lumOff val="25000"/>
+                  </a:schemeClr>
+                </a:solidFill>
+              </a:rPr>
+              <a:t>Train HMI control panel</a:t>
+            </a:r>
+            <a:endParaRPr lang="en-SG" sz="1200" b="1" dirty="0">
+              <a:solidFill>
+                <a:schemeClr val="tx1">
+                  <a:lumMod val="75000"/>
+                  <a:lumOff val="25000"/>
+                </a:schemeClr>
+              </a:solidFill>
+            </a:endParaRPr>
+          </a:p>
+        </p:txBody>
+      </p:sp>
+      <p:cxnSp>
+        <p:nvCxnSpPr>
+          <p:cNvPr id="35" name="Connector: Elbow 34">
+            <a:extLst>
+              <a:ext uri="{FF2B5EF4-FFF2-40B4-BE49-F238E27FC236}">
+                <a16:creationId xmlns:a16="http://schemas.microsoft.com/office/drawing/2014/main" id="{F7E04294-FD97-F76E-F95E-9E790B0B2BE1}"/>
+              </a:ext>
+            </a:extLst>
+          </p:cNvPr>
+          <p:cNvCxnSpPr>
+            <a:stCxn id="22" idx="2"/>
+          </p:cNvCxnSpPr>
+          <p:nvPr/>
+        </p:nvCxnSpPr>
+        <p:spPr>
+          <a:xfrm rot="16200000" flipH="1">
+            <a:off x="5650238" y="3321594"/>
+            <a:ext cx="139343" cy="1435823"/>
+          </a:xfrm>
+          <a:prstGeom prst="bentConnector2">
+            <a:avLst/>
+          </a:prstGeom>
+          <a:ln w="19050">
+            <a:solidFill>
+              <a:srgbClr val="00B050"/>
+            </a:solidFill>
+            <a:tailEnd type="triangle"/>
+          </a:ln>
+        </p:spPr>
+        <p:style>
+          <a:lnRef idx="1">
+            <a:schemeClr val="accent1"/>
+          </a:lnRef>
+          <a:fillRef idx="0">
+            <a:schemeClr val="accent1"/>
+          </a:fillRef>
+          <a:effectRef idx="0">
+            <a:schemeClr val="accent1"/>
+          </a:effectRef>
+          <a:fontRef idx="minor">
+            <a:schemeClr val="tx1"/>
+          </a:fontRef>
+        </p:style>
+      </p:cxnSp>
+      <p:sp>
+        <p:nvSpPr>
+          <p:cNvPr id="36" name="TextBox 35">
+            <a:extLst>
+              <a:ext uri="{FF2B5EF4-FFF2-40B4-BE49-F238E27FC236}">
+                <a16:creationId xmlns:a16="http://schemas.microsoft.com/office/drawing/2014/main" id="{7002B978-8B12-5686-B3C5-8045FA700392}"/>
+              </a:ext>
+            </a:extLst>
+          </p:cNvPr>
+          <p:cNvSpPr txBox="1"/>
+          <p:nvPr/>
+        </p:nvSpPr>
+        <p:spPr>
+          <a:xfrm>
+            <a:off x="4702114" y="4614185"/>
+            <a:ext cx="1872949" cy="276999"/>
+          </a:xfrm>
+          <a:prstGeom prst="rect">
+            <a:avLst/>
+          </a:prstGeom>
+          <a:noFill/>
+        </p:spPr>
+        <p:txBody>
+          <a:bodyPr wrap="square">
+            <a:spAutoFit/>
+          </a:bodyPr>
+          <a:lstStyle/>
+          <a:p>
+            <a:r>
+              <a:rPr lang="en-US" sz="1200" b="1" dirty="0">
+                <a:solidFill>
+                  <a:schemeClr val="accent6">
+                    <a:lumMod val="75000"/>
+                  </a:schemeClr>
+                </a:solidFill>
+              </a:rPr>
+              <a:t>Modbus command </a:t>
+            </a:r>
+            <a:endParaRPr lang="en-SG" sz="1200" b="1" dirty="0">
+              <a:solidFill>
+                <a:schemeClr val="accent6">
+                  <a:lumMod val="75000"/>
+                </a:schemeClr>
+              </a:solidFill>
+            </a:endParaRPr>
+          </a:p>
+        </p:txBody>
+      </p:sp>
+      <p:cxnSp>
+        <p:nvCxnSpPr>
+          <p:cNvPr id="37" name="Connector: Elbow 36">
+            <a:extLst>
+              <a:ext uri="{FF2B5EF4-FFF2-40B4-BE49-F238E27FC236}">
+                <a16:creationId xmlns:a16="http://schemas.microsoft.com/office/drawing/2014/main" id="{70A55E17-5A91-CC7E-9081-92D442E3E2A8}"/>
+              </a:ext>
+            </a:extLst>
+          </p:cNvPr>
+          <p:cNvCxnSpPr>
+            <a:cxnSpLocks/>
+            <a:endCxn id="19" idx="2"/>
+          </p:cNvCxnSpPr>
+          <p:nvPr/>
+        </p:nvCxnSpPr>
+        <p:spPr>
+          <a:xfrm rot="5400000" flipH="1">
+            <a:off x="5174687" y="2377024"/>
+            <a:ext cx="127322" cy="4330295"/>
+          </a:xfrm>
+          <a:prstGeom prst="bentConnector3">
+            <a:avLst>
+              <a:gd name="adj1" fmla="val -179545"/>
+            </a:avLst>
+          </a:prstGeom>
+          <a:ln w="19050">
+            <a:solidFill>
+              <a:srgbClr val="00B050"/>
+            </a:solidFill>
+            <a:tailEnd type="triangle"/>
+          </a:ln>
+        </p:spPr>
+        <p:style>
+          <a:lnRef idx="1">
+            <a:schemeClr val="accent1"/>
+          </a:lnRef>
+          <a:fillRef idx="0">
+            <a:schemeClr val="accent1"/>
+          </a:fillRef>
+          <a:effectRef idx="0">
+            <a:schemeClr val="accent1"/>
+          </a:effectRef>
+          <a:fontRef idx="minor">
+            <a:schemeClr val="tx1"/>
+          </a:fontRef>
+        </p:style>
+      </p:cxnSp>
+      <p:sp>
+        <p:nvSpPr>
+          <p:cNvPr id="41" name="TextBox 40">
+            <a:extLst>
+              <a:ext uri="{FF2B5EF4-FFF2-40B4-BE49-F238E27FC236}">
+                <a16:creationId xmlns:a16="http://schemas.microsoft.com/office/drawing/2014/main" id="{F4B1F88A-0BD8-9118-94C4-2F9C858CCF90}"/>
+              </a:ext>
+            </a:extLst>
+          </p:cNvPr>
+          <p:cNvSpPr txBox="1"/>
+          <p:nvPr/>
+        </p:nvSpPr>
+        <p:spPr>
+          <a:xfrm>
+            <a:off x="3575437" y="3162776"/>
+            <a:ext cx="1309163" cy="461665"/>
+          </a:xfrm>
+          <a:prstGeom prst="rect">
+            <a:avLst/>
+          </a:prstGeom>
+          <a:noFill/>
+        </p:spPr>
+        <p:txBody>
+          <a:bodyPr wrap="square">
+            <a:spAutoFit/>
+          </a:bodyPr>
+          <a:lstStyle/>
+          <a:p>
+            <a:r>
+              <a:rPr lang="en-US" sz="1200" b="1" dirty="0">
+                <a:solidFill>
+                  <a:schemeClr val="tx1">
+                    <a:lumMod val="75000"/>
+                    <a:lumOff val="25000"/>
+                  </a:schemeClr>
+                </a:solidFill>
+              </a:rPr>
+              <a:t>Train Auto control logic </a:t>
+            </a:r>
+            <a:endParaRPr lang="en-SG" sz="1200" b="1" dirty="0">
+              <a:solidFill>
+                <a:schemeClr val="tx1">
+                  <a:lumMod val="75000"/>
+                  <a:lumOff val="25000"/>
+                </a:schemeClr>
+              </a:solidFill>
+            </a:endParaRPr>
+          </a:p>
+        </p:txBody>
+      </p:sp>
+      <p:sp>
+        <p:nvSpPr>
+          <p:cNvPr id="42" name="TextBox 41">
+            <a:extLst>
+              <a:ext uri="{FF2B5EF4-FFF2-40B4-BE49-F238E27FC236}">
+                <a16:creationId xmlns:a16="http://schemas.microsoft.com/office/drawing/2014/main" id="{F811C794-D4F5-6867-39E3-201CC0C1ED55}"/>
+              </a:ext>
+            </a:extLst>
+          </p:cNvPr>
+          <p:cNvSpPr txBox="1"/>
+          <p:nvPr/>
+        </p:nvSpPr>
+        <p:spPr>
+          <a:xfrm>
+            <a:off x="5681918" y="3879632"/>
+            <a:ext cx="777558" cy="461665"/>
+          </a:xfrm>
+          <a:prstGeom prst="rect">
+            <a:avLst/>
+          </a:prstGeom>
+          <a:noFill/>
+        </p:spPr>
+        <p:txBody>
+          <a:bodyPr wrap="square">
+            <a:spAutoFit/>
+          </a:bodyPr>
+          <a:lstStyle/>
+          <a:p>
+            <a:r>
+              <a:rPr lang="en-US" sz="1200" b="1" dirty="0">
+                <a:solidFill>
+                  <a:schemeClr val="accent6">
+                    <a:lumMod val="75000"/>
+                  </a:schemeClr>
+                </a:solidFill>
+              </a:rPr>
+              <a:t>Modbus data</a:t>
+            </a:r>
+            <a:endParaRPr lang="en-SG" sz="1200" b="1" dirty="0">
+              <a:solidFill>
+                <a:schemeClr val="accent6">
+                  <a:lumMod val="75000"/>
+                </a:schemeClr>
+              </a:solidFill>
+            </a:endParaRPr>
+          </a:p>
+        </p:txBody>
+      </p:sp>
+      <p:pic>
+        <p:nvPicPr>
+          <p:cNvPr id="43" name="Picture 42" descr="A screenshot of a computer&#10;&#10;AI-generated content may be incorrect.">
+            <a:extLst>
+              <a:ext uri="{FF2B5EF4-FFF2-40B4-BE49-F238E27FC236}">
+                <a16:creationId xmlns:a16="http://schemas.microsoft.com/office/drawing/2014/main" id="{E7C5C00A-B5FF-E8BF-A8D4-F3F94548CB9C}"/>
+              </a:ext>
+            </a:extLst>
+          </p:cNvPr>
+          <p:cNvPicPr>
+            <a:picLocks noChangeAspect="1"/>
+          </p:cNvPicPr>
+          <p:nvPr/>
+        </p:nvPicPr>
+        <p:blipFill>
+          <a:blip r:embed="rId5">
+            <a:extLst>
+              <a:ext uri="{28A0092B-C50C-407E-A947-70E740481C1C}">
+                <a14:useLocalDpi xmlns:a14="http://schemas.microsoft.com/office/drawing/2010/main" val="0"/>
+              </a:ext>
+            </a:extLst>
+          </a:blip>
+          <a:stretch>
+            <a:fillRect/>
+          </a:stretch>
+        </p:blipFill>
+        <p:spPr>
+          <a:xfrm>
+            <a:off x="6431071" y="1555746"/>
+            <a:ext cx="2475185" cy="3076479"/>
+          </a:xfrm>
+          <a:prstGeom prst="rect">
+            <a:avLst/>
+          </a:prstGeom>
+          <a:ln w="12700">
+            <a:solidFill>
+              <a:schemeClr val="tx1"/>
+            </a:solidFill>
+          </a:ln>
+        </p:spPr>
+      </p:pic>
+      <p:cxnSp>
+        <p:nvCxnSpPr>
+          <p:cNvPr id="2" name="Straight Arrow Connector 1">
+            <a:extLst>
+              <a:ext uri="{FF2B5EF4-FFF2-40B4-BE49-F238E27FC236}">
+                <a16:creationId xmlns:a16="http://schemas.microsoft.com/office/drawing/2014/main" id="{46C2DD53-7D15-211C-E49F-F439ACA92C68}"/>
+              </a:ext>
+            </a:extLst>
+          </p:cNvPr>
+          <p:cNvCxnSpPr>
+            <a:cxnSpLocks/>
+          </p:cNvCxnSpPr>
+          <p:nvPr/>
+        </p:nvCxnSpPr>
+        <p:spPr>
+          <a:xfrm flipH="1">
+            <a:off x="3533452" y="4046282"/>
+            <a:ext cx="154062" cy="81660"/>
+          </a:xfrm>
+          <a:prstGeom prst="straightConnector1">
+            <a:avLst/>
+          </a:prstGeom>
+          <a:ln w="19050">
+            <a:prstDash val="sysDash"/>
+            <a:tailEnd type="triangle"/>
+          </a:ln>
+        </p:spPr>
+        <p:style>
+          <a:lnRef idx="1">
+            <a:schemeClr val="dk1"/>
+          </a:lnRef>
+          <a:fillRef idx="0">
+            <a:schemeClr val="dk1"/>
+          </a:fillRef>
+          <a:effectRef idx="0">
+            <a:schemeClr val="dk1"/>
+          </a:effectRef>
+          <a:fontRef idx="minor">
+            <a:schemeClr val="tx1"/>
+          </a:fontRef>
+        </p:style>
+      </p:cxnSp>
+    </p:spTree>
+    <p:extLst>
+      <p:ext uri="{BB962C8B-B14F-4D97-AF65-F5344CB8AC3E}">
+        <p14:creationId xmlns:p14="http://schemas.microsoft.com/office/powerpoint/2010/main" val="499504016"/>
+      </p:ext>
+    </p:extLst>
+  </p:cSld>
+  <p:clrMapOvr>
+    <a:masterClrMapping/>
+  </p:clrMapOvr>
+</p:sld>
+</file>
+
+<file path=ppt/slides/slide7.xml><?xml version="1.0" encoding="utf-8"?>
+<p:sld xmlns:a="http://schemas.openxmlformats.org/drawingml/2006/main" xmlns:r="http://schemas.openxmlformats.org/officeDocument/2006/relationships" xmlns:p="http://schemas.openxmlformats.org/presentationml/2006/main">
+  <p:cSld>
+    <p:spTree>
+      <p:nvGrpSpPr>
+        <p:cNvPr id="1" name=""/>
+        <p:cNvGrpSpPr/>
+        <p:nvPr/>
+      </p:nvGrpSpPr>
+      <p:grpSpPr>
+        <a:xfrm>
+          <a:off x="0" y="0"/>
+          <a:ext cx="0" cy="0"/>
+          <a:chOff x="0" y="0"/>
+          <a:chExt cx="0" cy="0"/>
+        </a:xfrm>
+      </p:grpSpPr>
+      <p:pic>
+        <p:nvPicPr>
           <p:cNvPr id="5" name="Picture 4" descr="A computer screen shot of a computer scheme&#10;&#10;AI-generated content may be incorrect.">
             <a:extLst>
               <a:ext uri="{FF2B5EF4-FFF2-40B4-BE49-F238E27FC236}">
@@ -14212,6 +15933,2193 @@
     <p:extLst>
       <p:ext uri="{BB962C8B-B14F-4D97-AF65-F5344CB8AC3E}">
         <p14:creationId xmlns:p14="http://schemas.microsoft.com/office/powerpoint/2010/main" val="3451157203"/>
+      </p:ext>
+    </p:extLst>
+  </p:cSld>
+  <p:clrMapOvr>
+    <a:masterClrMapping/>
+  </p:clrMapOvr>
+</p:sld>
+</file>
+
+<file path=ppt/slides/slide8.xml><?xml version="1.0" encoding="utf-8"?>
+<p:sld xmlns:a="http://schemas.openxmlformats.org/drawingml/2006/main" xmlns:r="http://schemas.openxmlformats.org/officeDocument/2006/relationships" xmlns:p="http://schemas.openxmlformats.org/presentationml/2006/main">
+  <p:cSld>
+    <p:spTree>
+      <p:nvGrpSpPr>
+        <p:cNvPr id="1" name=""/>
+        <p:cNvGrpSpPr/>
+        <p:nvPr/>
+      </p:nvGrpSpPr>
+      <p:grpSpPr>
+        <a:xfrm>
+          <a:off x="0" y="0"/>
+          <a:ext cx="0" cy="0"/>
+          <a:chOff x="0" y="0"/>
+          <a:chExt cx="0" cy="0"/>
+        </a:xfrm>
+      </p:grpSpPr>
+      <p:pic>
+        <p:nvPicPr>
+          <p:cNvPr id="5" name="Picture 4" descr="A screenshot of a computer&#10;&#10;AI-generated content may be incorrect.">
+            <a:extLst>
+              <a:ext uri="{FF2B5EF4-FFF2-40B4-BE49-F238E27FC236}">
+                <a16:creationId xmlns:a16="http://schemas.microsoft.com/office/drawing/2014/main" id="{6B427720-8109-F038-BA32-4ED3813188A9}"/>
+              </a:ext>
+            </a:extLst>
+          </p:cNvPr>
+          <p:cNvPicPr>
+            <a:picLocks noChangeAspect="1"/>
+          </p:cNvPicPr>
+          <p:nvPr/>
+        </p:nvPicPr>
+        <p:blipFill>
+          <a:blip r:embed="rId2">
+            <a:extLst>
+              <a:ext uri="{28A0092B-C50C-407E-A947-70E740481C1C}">
+                <a14:useLocalDpi xmlns:a14="http://schemas.microsoft.com/office/drawing/2010/main" val="0"/>
+              </a:ext>
+            </a:extLst>
+          </a:blip>
+          <a:stretch>
+            <a:fillRect/>
+          </a:stretch>
+        </p:blipFill>
+        <p:spPr>
+          <a:xfrm>
+            <a:off x="3414194" y="433075"/>
+            <a:ext cx="4705677" cy="5848821"/>
+          </a:xfrm>
+          <a:prstGeom prst="rect">
+            <a:avLst/>
+          </a:prstGeom>
+          <a:ln w="6350">
+            <a:solidFill>
+              <a:schemeClr val="tx1"/>
+            </a:solidFill>
+          </a:ln>
+        </p:spPr>
+      </p:pic>
+      <p:cxnSp>
+        <p:nvCxnSpPr>
+          <p:cNvPr id="6" name="Straight Arrow Connector 5">
+            <a:extLst>
+              <a:ext uri="{FF2B5EF4-FFF2-40B4-BE49-F238E27FC236}">
+                <a16:creationId xmlns:a16="http://schemas.microsoft.com/office/drawing/2014/main" id="{D09A7DC6-D33D-48B7-44F7-7CBFD5B72F99}"/>
+              </a:ext>
+            </a:extLst>
+          </p:cNvPr>
+          <p:cNvCxnSpPr>
+            <a:cxnSpLocks/>
+          </p:cNvCxnSpPr>
+          <p:nvPr/>
+        </p:nvCxnSpPr>
+        <p:spPr>
+          <a:xfrm>
+            <a:off x="2785082" y="719587"/>
+            <a:ext cx="543334" cy="0"/>
+          </a:xfrm>
+          <a:prstGeom prst="straightConnector1">
+            <a:avLst/>
+          </a:prstGeom>
+          <a:ln w="19050">
+            <a:solidFill>
+              <a:schemeClr val="tx2">
+                <a:lumMod val="50000"/>
+                <a:lumOff val="50000"/>
+              </a:schemeClr>
+            </a:solidFill>
+            <a:prstDash val="sysDash"/>
+            <a:tailEnd type="triangle"/>
+          </a:ln>
+        </p:spPr>
+        <p:style>
+          <a:lnRef idx="1">
+            <a:schemeClr val="accent5"/>
+          </a:lnRef>
+          <a:fillRef idx="0">
+            <a:schemeClr val="accent5"/>
+          </a:fillRef>
+          <a:effectRef idx="0">
+            <a:schemeClr val="accent5"/>
+          </a:effectRef>
+          <a:fontRef idx="minor">
+            <a:schemeClr val="tx1"/>
+          </a:fontRef>
+        </p:style>
+      </p:cxnSp>
+      <p:sp>
+        <p:nvSpPr>
+          <p:cNvPr id="7" name="TextBox 6">
+            <a:extLst>
+              <a:ext uri="{FF2B5EF4-FFF2-40B4-BE49-F238E27FC236}">
+                <a16:creationId xmlns:a16="http://schemas.microsoft.com/office/drawing/2014/main" id="{E8CF6D50-3C05-C6C6-F67C-630E5CFF1DD0}"/>
+              </a:ext>
+            </a:extLst>
+          </p:cNvPr>
+          <p:cNvSpPr txBox="1"/>
+          <p:nvPr/>
+        </p:nvSpPr>
+        <p:spPr>
+          <a:xfrm>
+            <a:off x="2069708" y="588782"/>
+            <a:ext cx="672485" cy="261610"/>
+          </a:xfrm>
+          <a:prstGeom prst="rect">
+            <a:avLst/>
+          </a:prstGeom>
+          <a:noFill/>
+        </p:spPr>
+        <p:txBody>
+          <a:bodyPr wrap="square" rtlCol="0">
+            <a:spAutoFit/>
+          </a:bodyPr>
+          <a:lstStyle/>
+          <a:p>
+            <a:r>
+              <a:rPr lang="en-SG" sz="1100" b="1" dirty="0"/>
+              <a:t>Train ID</a:t>
+            </a:r>
+          </a:p>
+        </p:txBody>
+      </p:sp>
+      <p:sp>
+        <p:nvSpPr>
+          <p:cNvPr id="9" name="TextBox 8">
+            <a:extLst>
+              <a:ext uri="{FF2B5EF4-FFF2-40B4-BE49-F238E27FC236}">
+                <a16:creationId xmlns:a16="http://schemas.microsoft.com/office/drawing/2014/main" id="{A479EC13-B57C-BE9D-095A-30AFCD4FA914}"/>
+              </a:ext>
+            </a:extLst>
+          </p:cNvPr>
+          <p:cNvSpPr txBox="1"/>
+          <p:nvPr/>
+        </p:nvSpPr>
+        <p:spPr>
+          <a:xfrm>
+            <a:off x="1806455" y="995577"/>
+            <a:ext cx="1198990" cy="430887"/>
+          </a:xfrm>
+          <a:prstGeom prst="rect">
+            <a:avLst/>
+          </a:prstGeom>
+          <a:noFill/>
+        </p:spPr>
+        <p:txBody>
+          <a:bodyPr wrap="square" rtlCol="0">
+            <a:spAutoFit/>
+          </a:bodyPr>
+          <a:lstStyle/>
+          <a:p>
+            <a:r>
+              <a:rPr lang="en-SG" sz="1100" b="1" dirty="0"/>
+              <a:t>Train current speed gauge </a:t>
+            </a:r>
+          </a:p>
+        </p:txBody>
+      </p:sp>
+      <p:cxnSp>
+        <p:nvCxnSpPr>
+          <p:cNvPr id="10" name="Straight Arrow Connector 9">
+            <a:extLst>
+              <a:ext uri="{FF2B5EF4-FFF2-40B4-BE49-F238E27FC236}">
+                <a16:creationId xmlns:a16="http://schemas.microsoft.com/office/drawing/2014/main" id="{D72183D0-3262-5FF6-590D-B00F0776A17E}"/>
+              </a:ext>
+            </a:extLst>
+          </p:cNvPr>
+          <p:cNvCxnSpPr>
+            <a:cxnSpLocks/>
+          </p:cNvCxnSpPr>
+          <p:nvPr/>
+        </p:nvCxnSpPr>
+        <p:spPr>
+          <a:xfrm>
+            <a:off x="2798014" y="1284172"/>
+            <a:ext cx="737705" cy="0"/>
+          </a:xfrm>
+          <a:prstGeom prst="straightConnector1">
+            <a:avLst/>
+          </a:prstGeom>
+          <a:ln w="19050">
+            <a:solidFill>
+              <a:schemeClr val="tx2">
+                <a:lumMod val="50000"/>
+                <a:lumOff val="50000"/>
+              </a:schemeClr>
+            </a:solidFill>
+            <a:prstDash val="sysDash"/>
+            <a:tailEnd type="triangle"/>
+          </a:ln>
+        </p:spPr>
+        <p:style>
+          <a:lnRef idx="1">
+            <a:schemeClr val="accent5"/>
+          </a:lnRef>
+          <a:fillRef idx="0">
+            <a:schemeClr val="accent5"/>
+          </a:fillRef>
+          <a:effectRef idx="0">
+            <a:schemeClr val="accent5"/>
+          </a:effectRef>
+          <a:fontRef idx="minor">
+            <a:schemeClr val="tx1"/>
+          </a:fontRef>
+        </p:style>
+      </p:cxnSp>
+      <p:sp>
+        <p:nvSpPr>
+          <p:cNvPr id="12" name="TextBox 11">
+            <a:extLst>
+              <a:ext uri="{FF2B5EF4-FFF2-40B4-BE49-F238E27FC236}">
+                <a16:creationId xmlns:a16="http://schemas.microsoft.com/office/drawing/2014/main" id="{4A4A6FFE-B0D2-6C51-2AF6-B2298B5CE843}"/>
+              </a:ext>
+            </a:extLst>
+          </p:cNvPr>
+          <p:cNvSpPr txBox="1"/>
+          <p:nvPr/>
+        </p:nvSpPr>
+        <p:spPr>
+          <a:xfrm>
+            <a:off x="1806455" y="1856154"/>
+            <a:ext cx="1198990" cy="430887"/>
+          </a:xfrm>
+          <a:prstGeom prst="rect">
+            <a:avLst/>
+          </a:prstGeom>
+          <a:noFill/>
+        </p:spPr>
+        <p:txBody>
+          <a:bodyPr wrap="square" rtlCol="0">
+            <a:spAutoFit/>
+          </a:bodyPr>
+          <a:lstStyle/>
+          <a:p>
+            <a:r>
+              <a:rPr lang="en-SG" sz="1100" b="1" dirty="0"/>
+              <a:t>Train average speed display </a:t>
+            </a:r>
+          </a:p>
+        </p:txBody>
+      </p:sp>
+      <p:cxnSp>
+        <p:nvCxnSpPr>
+          <p:cNvPr id="15" name="Connector: Elbow 14">
+            <a:extLst>
+              <a:ext uri="{FF2B5EF4-FFF2-40B4-BE49-F238E27FC236}">
+                <a16:creationId xmlns:a16="http://schemas.microsoft.com/office/drawing/2014/main" id="{EFD91176-31AF-77EC-21DE-A1CDD276853C}"/>
+              </a:ext>
+            </a:extLst>
+          </p:cNvPr>
+          <p:cNvCxnSpPr>
+            <a:cxnSpLocks/>
+            <a:stCxn id="12" idx="3"/>
+          </p:cNvCxnSpPr>
+          <p:nvPr/>
+        </p:nvCxnSpPr>
+        <p:spPr>
+          <a:xfrm>
+            <a:off x="3005445" y="2071598"/>
+            <a:ext cx="880755" cy="691783"/>
+          </a:xfrm>
+          <a:prstGeom prst="bentConnector3">
+            <a:avLst>
+              <a:gd name="adj1" fmla="val 57268"/>
+            </a:avLst>
+          </a:prstGeom>
+          <a:ln>
+            <a:solidFill>
+              <a:schemeClr val="tx2">
+                <a:lumMod val="50000"/>
+                <a:lumOff val="50000"/>
+              </a:schemeClr>
+            </a:solidFill>
+            <a:prstDash val="sysDash"/>
+            <a:tailEnd type="triangle"/>
+          </a:ln>
+        </p:spPr>
+        <p:style>
+          <a:lnRef idx="2">
+            <a:schemeClr val="accent1"/>
+          </a:lnRef>
+          <a:fillRef idx="0">
+            <a:schemeClr val="accent1"/>
+          </a:fillRef>
+          <a:effectRef idx="1">
+            <a:schemeClr val="accent1"/>
+          </a:effectRef>
+          <a:fontRef idx="minor">
+            <a:schemeClr val="tx1"/>
+          </a:fontRef>
+        </p:style>
+      </p:cxnSp>
+      <p:sp>
+        <p:nvSpPr>
+          <p:cNvPr id="19" name="TextBox 18">
+            <a:extLst>
+              <a:ext uri="{FF2B5EF4-FFF2-40B4-BE49-F238E27FC236}">
+                <a16:creationId xmlns:a16="http://schemas.microsoft.com/office/drawing/2014/main" id="{4EA0D41C-0939-93E6-27D0-A53458CCFAC4}"/>
+              </a:ext>
+            </a:extLst>
+          </p:cNvPr>
+          <p:cNvSpPr txBox="1"/>
+          <p:nvPr/>
+        </p:nvSpPr>
+        <p:spPr>
+          <a:xfrm>
+            <a:off x="1806455" y="2547937"/>
+            <a:ext cx="1198990" cy="430887"/>
+          </a:xfrm>
+          <a:prstGeom prst="rect">
+            <a:avLst/>
+          </a:prstGeom>
+          <a:noFill/>
+        </p:spPr>
+        <p:txBody>
+          <a:bodyPr wrap="square" rtlCol="0">
+            <a:spAutoFit/>
+          </a:bodyPr>
+          <a:lstStyle/>
+          <a:p>
+            <a:r>
+              <a:rPr lang="en-US" sz="1100" b="1" dirty="0"/>
+              <a:t>Current throttle state indicator</a:t>
+            </a:r>
+            <a:endParaRPr lang="en-SG" sz="1100" b="1" dirty="0"/>
+          </a:p>
+        </p:txBody>
+      </p:sp>
+      <p:cxnSp>
+        <p:nvCxnSpPr>
+          <p:cNvPr id="20" name="Connector: Elbow 19">
+            <a:extLst>
+              <a:ext uri="{FF2B5EF4-FFF2-40B4-BE49-F238E27FC236}">
+                <a16:creationId xmlns:a16="http://schemas.microsoft.com/office/drawing/2014/main" id="{83FF69DD-FAAF-A201-CF52-E46B530BD335}"/>
+              </a:ext>
+            </a:extLst>
+          </p:cNvPr>
+          <p:cNvCxnSpPr>
+            <a:cxnSpLocks/>
+            <a:stCxn id="19" idx="3"/>
+          </p:cNvCxnSpPr>
+          <p:nvPr/>
+        </p:nvCxnSpPr>
+        <p:spPr>
+          <a:xfrm>
+            <a:off x="3005445" y="2763381"/>
+            <a:ext cx="672001" cy="476339"/>
+          </a:xfrm>
+          <a:prstGeom prst="bentConnector3">
+            <a:avLst>
+              <a:gd name="adj1" fmla="val 50000"/>
+            </a:avLst>
+          </a:prstGeom>
+          <a:ln>
+            <a:solidFill>
+              <a:schemeClr val="tx2">
+                <a:lumMod val="50000"/>
+                <a:lumOff val="50000"/>
+              </a:schemeClr>
+            </a:solidFill>
+            <a:prstDash val="sysDash"/>
+            <a:tailEnd type="triangle"/>
+          </a:ln>
+        </p:spPr>
+        <p:style>
+          <a:lnRef idx="2">
+            <a:schemeClr val="accent1"/>
+          </a:lnRef>
+          <a:fillRef idx="0">
+            <a:schemeClr val="accent1"/>
+          </a:fillRef>
+          <a:effectRef idx="1">
+            <a:schemeClr val="accent1"/>
+          </a:effectRef>
+          <a:fontRef idx="minor">
+            <a:schemeClr val="tx1"/>
+          </a:fontRef>
+        </p:style>
+      </p:cxnSp>
+      <p:sp>
+        <p:nvSpPr>
+          <p:cNvPr id="24" name="TextBox 23">
+            <a:extLst>
+              <a:ext uri="{FF2B5EF4-FFF2-40B4-BE49-F238E27FC236}">
+                <a16:creationId xmlns:a16="http://schemas.microsoft.com/office/drawing/2014/main" id="{BB584330-169A-369D-3CE2-2DC70BD50A95}"/>
+              </a:ext>
+            </a:extLst>
+          </p:cNvPr>
+          <p:cNvSpPr txBox="1"/>
+          <p:nvPr/>
+        </p:nvSpPr>
+        <p:spPr>
+          <a:xfrm>
+            <a:off x="1811761" y="3110775"/>
+            <a:ext cx="1198990" cy="430887"/>
+          </a:xfrm>
+          <a:prstGeom prst="rect">
+            <a:avLst/>
+          </a:prstGeom>
+          <a:noFill/>
+        </p:spPr>
+        <p:txBody>
+          <a:bodyPr wrap="square" rtlCol="0">
+            <a:spAutoFit/>
+          </a:bodyPr>
+          <a:lstStyle/>
+          <a:p>
+            <a:r>
+              <a:rPr lang="en-US" sz="1100" b="1" dirty="0"/>
+              <a:t>Manual throttle control slider </a:t>
+            </a:r>
+            <a:endParaRPr lang="en-SG" sz="1100" b="1" dirty="0"/>
+          </a:p>
+        </p:txBody>
+      </p:sp>
+      <p:cxnSp>
+        <p:nvCxnSpPr>
+          <p:cNvPr id="25" name="Straight Arrow Connector 24">
+            <a:extLst>
+              <a:ext uri="{FF2B5EF4-FFF2-40B4-BE49-F238E27FC236}">
+                <a16:creationId xmlns:a16="http://schemas.microsoft.com/office/drawing/2014/main" id="{FAA321E3-2267-177F-1B32-E1A2C3319F8E}"/>
+              </a:ext>
+            </a:extLst>
+          </p:cNvPr>
+          <p:cNvCxnSpPr>
+            <a:cxnSpLocks/>
+          </p:cNvCxnSpPr>
+          <p:nvPr/>
+        </p:nvCxnSpPr>
+        <p:spPr>
+          <a:xfrm>
+            <a:off x="2967956" y="3386587"/>
+            <a:ext cx="1155988" cy="3639"/>
+          </a:xfrm>
+          <a:prstGeom prst="straightConnector1">
+            <a:avLst/>
+          </a:prstGeom>
+          <a:ln w="19050">
+            <a:solidFill>
+              <a:schemeClr val="tx2">
+                <a:lumMod val="50000"/>
+                <a:lumOff val="50000"/>
+              </a:schemeClr>
+            </a:solidFill>
+            <a:prstDash val="sysDash"/>
+            <a:tailEnd type="triangle"/>
+          </a:ln>
+        </p:spPr>
+        <p:style>
+          <a:lnRef idx="1">
+            <a:schemeClr val="accent5"/>
+          </a:lnRef>
+          <a:fillRef idx="0">
+            <a:schemeClr val="accent5"/>
+          </a:fillRef>
+          <a:effectRef idx="0">
+            <a:schemeClr val="accent5"/>
+          </a:effectRef>
+          <a:fontRef idx="minor">
+            <a:schemeClr val="tx1"/>
+          </a:fontRef>
+        </p:style>
+      </p:cxnSp>
+      <p:cxnSp>
+        <p:nvCxnSpPr>
+          <p:cNvPr id="27" name="Straight Arrow Connector 26">
+            <a:extLst>
+              <a:ext uri="{FF2B5EF4-FFF2-40B4-BE49-F238E27FC236}">
+                <a16:creationId xmlns:a16="http://schemas.microsoft.com/office/drawing/2014/main" id="{1E011C74-2EA4-D6B3-CA92-27028C4D0377}"/>
+              </a:ext>
+            </a:extLst>
+          </p:cNvPr>
+          <p:cNvCxnSpPr>
+            <a:cxnSpLocks/>
+          </p:cNvCxnSpPr>
+          <p:nvPr/>
+        </p:nvCxnSpPr>
+        <p:spPr>
+          <a:xfrm>
+            <a:off x="3001607" y="3816234"/>
+            <a:ext cx="1568575" cy="0"/>
+          </a:xfrm>
+          <a:prstGeom prst="straightConnector1">
+            <a:avLst/>
+          </a:prstGeom>
+          <a:ln w="19050">
+            <a:solidFill>
+              <a:schemeClr val="tx2">
+                <a:lumMod val="50000"/>
+                <a:lumOff val="50000"/>
+              </a:schemeClr>
+            </a:solidFill>
+            <a:prstDash val="sysDash"/>
+            <a:tailEnd type="triangle"/>
+          </a:ln>
+        </p:spPr>
+        <p:style>
+          <a:lnRef idx="1">
+            <a:schemeClr val="accent5"/>
+          </a:lnRef>
+          <a:fillRef idx="0">
+            <a:schemeClr val="accent5"/>
+          </a:fillRef>
+          <a:effectRef idx="0">
+            <a:schemeClr val="accent5"/>
+          </a:effectRef>
+          <a:fontRef idx="minor">
+            <a:schemeClr val="tx1"/>
+          </a:fontRef>
+        </p:style>
+      </p:cxnSp>
+      <p:sp>
+        <p:nvSpPr>
+          <p:cNvPr id="29" name="TextBox 28">
+            <a:extLst>
+              <a:ext uri="{FF2B5EF4-FFF2-40B4-BE49-F238E27FC236}">
+                <a16:creationId xmlns:a16="http://schemas.microsoft.com/office/drawing/2014/main" id="{8EFF7917-F98B-40FB-3F73-C81E4C3E56C1}"/>
+              </a:ext>
+            </a:extLst>
+          </p:cNvPr>
+          <p:cNvSpPr txBox="1"/>
+          <p:nvPr/>
+        </p:nvSpPr>
+        <p:spPr>
+          <a:xfrm>
+            <a:off x="1806455" y="3621519"/>
+            <a:ext cx="1198990" cy="430887"/>
+          </a:xfrm>
+          <a:prstGeom prst="rect">
+            <a:avLst/>
+          </a:prstGeom>
+          <a:noFill/>
+        </p:spPr>
+        <p:txBody>
+          <a:bodyPr wrap="square" rtlCol="0">
+            <a:spAutoFit/>
+          </a:bodyPr>
+          <a:lstStyle/>
+          <a:p>
+            <a:r>
+              <a:rPr lang="en-US" sz="1100" b="1" dirty="0"/>
+              <a:t>Current brake state indicator</a:t>
+            </a:r>
+            <a:endParaRPr lang="en-SG" sz="1100" b="1" dirty="0"/>
+          </a:p>
+        </p:txBody>
+      </p:sp>
+      <p:cxnSp>
+        <p:nvCxnSpPr>
+          <p:cNvPr id="30" name="Connector: Elbow 29">
+            <a:extLst>
+              <a:ext uri="{FF2B5EF4-FFF2-40B4-BE49-F238E27FC236}">
+                <a16:creationId xmlns:a16="http://schemas.microsoft.com/office/drawing/2014/main" id="{2DAE6121-2508-5CFD-4C1D-C6A526D38C96}"/>
+              </a:ext>
+            </a:extLst>
+          </p:cNvPr>
+          <p:cNvCxnSpPr>
+            <a:cxnSpLocks/>
+          </p:cNvCxnSpPr>
+          <p:nvPr/>
+        </p:nvCxnSpPr>
+        <p:spPr>
+          <a:xfrm flipV="1">
+            <a:off x="3056749" y="3925564"/>
+            <a:ext cx="1908443" cy="388647"/>
+          </a:xfrm>
+          <a:prstGeom prst="bentConnector3">
+            <a:avLst>
+              <a:gd name="adj1" fmla="val 100788"/>
+            </a:avLst>
+          </a:prstGeom>
+          <a:ln>
+            <a:solidFill>
+              <a:schemeClr val="tx2">
+                <a:lumMod val="50000"/>
+                <a:lumOff val="50000"/>
+              </a:schemeClr>
+            </a:solidFill>
+            <a:prstDash val="sysDash"/>
+            <a:tailEnd type="triangle"/>
+          </a:ln>
+        </p:spPr>
+        <p:style>
+          <a:lnRef idx="2">
+            <a:schemeClr val="accent1"/>
+          </a:lnRef>
+          <a:fillRef idx="0">
+            <a:schemeClr val="accent1"/>
+          </a:fillRef>
+          <a:effectRef idx="1">
+            <a:schemeClr val="accent1"/>
+          </a:effectRef>
+          <a:fontRef idx="minor">
+            <a:schemeClr val="tx1"/>
+          </a:fontRef>
+        </p:style>
+      </p:cxnSp>
+      <p:sp>
+        <p:nvSpPr>
+          <p:cNvPr id="33" name="TextBox 32">
+            <a:extLst>
+              <a:ext uri="{FF2B5EF4-FFF2-40B4-BE49-F238E27FC236}">
+                <a16:creationId xmlns:a16="http://schemas.microsoft.com/office/drawing/2014/main" id="{40CB0EE6-881F-447A-B452-C3C71738E51A}"/>
+              </a:ext>
+            </a:extLst>
+          </p:cNvPr>
+          <p:cNvSpPr txBox="1"/>
+          <p:nvPr/>
+        </p:nvSpPr>
+        <p:spPr>
+          <a:xfrm>
+            <a:off x="1832107" y="4102747"/>
+            <a:ext cx="1198990" cy="430887"/>
+          </a:xfrm>
+          <a:prstGeom prst="rect">
+            <a:avLst/>
+          </a:prstGeom>
+          <a:noFill/>
+        </p:spPr>
+        <p:txBody>
+          <a:bodyPr wrap="square" rtlCol="0">
+            <a:spAutoFit/>
+          </a:bodyPr>
+          <a:lstStyle/>
+          <a:p>
+            <a:r>
+              <a:rPr lang="en-US" sz="1100" b="1" dirty="0"/>
+              <a:t>Manual brake control slider</a:t>
+            </a:r>
+            <a:endParaRPr lang="en-SG" sz="1100" b="1" dirty="0"/>
+          </a:p>
+        </p:txBody>
+      </p:sp>
+      <p:cxnSp>
+        <p:nvCxnSpPr>
+          <p:cNvPr id="36" name="Straight Arrow Connector 35">
+            <a:extLst>
+              <a:ext uri="{FF2B5EF4-FFF2-40B4-BE49-F238E27FC236}">
+                <a16:creationId xmlns:a16="http://schemas.microsoft.com/office/drawing/2014/main" id="{1FEBADFD-9D5A-38C9-A536-7D036A22AE7A}"/>
+              </a:ext>
+            </a:extLst>
+          </p:cNvPr>
+          <p:cNvCxnSpPr>
+            <a:cxnSpLocks/>
+          </p:cNvCxnSpPr>
+          <p:nvPr/>
+        </p:nvCxnSpPr>
+        <p:spPr>
+          <a:xfrm>
+            <a:off x="2992385" y="4694179"/>
+            <a:ext cx="543334" cy="0"/>
+          </a:xfrm>
+          <a:prstGeom prst="straightConnector1">
+            <a:avLst/>
+          </a:prstGeom>
+          <a:ln w="19050">
+            <a:solidFill>
+              <a:schemeClr val="tx2">
+                <a:lumMod val="50000"/>
+                <a:lumOff val="50000"/>
+              </a:schemeClr>
+            </a:solidFill>
+            <a:prstDash val="sysDash"/>
+            <a:tailEnd type="triangle"/>
+          </a:ln>
+        </p:spPr>
+        <p:style>
+          <a:lnRef idx="1">
+            <a:schemeClr val="accent5"/>
+          </a:lnRef>
+          <a:fillRef idx="0">
+            <a:schemeClr val="accent5"/>
+          </a:fillRef>
+          <a:effectRef idx="0">
+            <a:schemeClr val="accent5"/>
+          </a:effectRef>
+          <a:fontRef idx="minor">
+            <a:schemeClr val="tx1"/>
+          </a:fontRef>
+        </p:style>
+      </p:cxnSp>
+      <p:sp>
+        <p:nvSpPr>
+          <p:cNvPr id="37" name="TextBox 36">
+            <a:extLst>
+              <a:ext uri="{FF2B5EF4-FFF2-40B4-BE49-F238E27FC236}">
+                <a16:creationId xmlns:a16="http://schemas.microsoft.com/office/drawing/2014/main" id="{0BC152D5-E119-4098-8490-998AFCEB830D}"/>
+              </a:ext>
+            </a:extLst>
+          </p:cNvPr>
+          <p:cNvSpPr txBox="1"/>
+          <p:nvPr/>
+        </p:nvSpPr>
+        <p:spPr>
+          <a:xfrm>
+            <a:off x="1815022" y="4602263"/>
+            <a:ext cx="1216075" cy="430887"/>
+          </a:xfrm>
+          <a:prstGeom prst="rect">
+            <a:avLst/>
+          </a:prstGeom>
+          <a:noFill/>
+        </p:spPr>
+        <p:txBody>
+          <a:bodyPr wrap="square" rtlCol="0">
+            <a:spAutoFit/>
+          </a:bodyPr>
+          <a:lstStyle/>
+          <a:p>
+            <a:r>
+              <a:rPr lang="en-US" sz="1100" b="1" dirty="0"/>
+              <a:t>Train Control PLC information </a:t>
+            </a:r>
+            <a:endParaRPr lang="en-SG" sz="1100" b="1" dirty="0"/>
+          </a:p>
+        </p:txBody>
+      </p:sp>
+      <p:cxnSp>
+        <p:nvCxnSpPr>
+          <p:cNvPr id="38" name="Straight Arrow Connector 37">
+            <a:extLst>
+              <a:ext uri="{FF2B5EF4-FFF2-40B4-BE49-F238E27FC236}">
+                <a16:creationId xmlns:a16="http://schemas.microsoft.com/office/drawing/2014/main" id="{C45DEBCC-2B6E-0180-3FFF-60EDD874F59F}"/>
+              </a:ext>
+            </a:extLst>
+          </p:cNvPr>
+          <p:cNvCxnSpPr>
+            <a:cxnSpLocks/>
+          </p:cNvCxnSpPr>
+          <p:nvPr/>
+        </p:nvCxnSpPr>
+        <p:spPr>
+          <a:xfrm>
+            <a:off x="2967956" y="5395219"/>
+            <a:ext cx="543334" cy="0"/>
+          </a:xfrm>
+          <a:prstGeom prst="straightConnector1">
+            <a:avLst/>
+          </a:prstGeom>
+          <a:ln w="19050">
+            <a:solidFill>
+              <a:schemeClr val="tx2">
+                <a:lumMod val="50000"/>
+                <a:lumOff val="50000"/>
+              </a:schemeClr>
+            </a:solidFill>
+            <a:prstDash val="sysDash"/>
+            <a:tailEnd type="triangle"/>
+          </a:ln>
+        </p:spPr>
+        <p:style>
+          <a:lnRef idx="1">
+            <a:schemeClr val="accent5"/>
+          </a:lnRef>
+          <a:fillRef idx="0">
+            <a:schemeClr val="accent5"/>
+          </a:fillRef>
+          <a:effectRef idx="0">
+            <a:schemeClr val="accent5"/>
+          </a:effectRef>
+          <a:fontRef idx="minor">
+            <a:schemeClr val="tx1"/>
+          </a:fontRef>
+        </p:style>
+      </p:cxnSp>
+      <p:sp>
+        <p:nvSpPr>
+          <p:cNvPr id="39" name="TextBox 38">
+            <a:extLst>
+              <a:ext uri="{FF2B5EF4-FFF2-40B4-BE49-F238E27FC236}">
+                <a16:creationId xmlns:a16="http://schemas.microsoft.com/office/drawing/2014/main" id="{31EDCE79-C67E-F5E9-418D-B2D9EA66A6BC}"/>
+              </a:ext>
+            </a:extLst>
+          </p:cNvPr>
+          <p:cNvSpPr txBox="1"/>
+          <p:nvPr/>
+        </p:nvSpPr>
+        <p:spPr>
+          <a:xfrm>
+            <a:off x="1825616" y="5112048"/>
+            <a:ext cx="1356570" cy="430887"/>
+          </a:xfrm>
+          <a:prstGeom prst="rect">
+            <a:avLst/>
+          </a:prstGeom>
+          <a:noFill/>
+        </p:spPr>
+        <p:txBody>
+          <a:bodyPr wrap="square" rtlCol="0">
+            <a:spAutoFit/>
+          </a:bodyPr>
+          <a:lstStyle/>
+          <a:p>
+            <a:r>
+              <a:rPr lang="en-US" sz="1100" b="1" dirty="0"/>
+              <a:t>PLC Input contact ID and State</a:t>
+            </a:r>
+            <a:endParaRPr lang="en-SG" sz="1100" b="1" dirty="0"/>
+          </a:p>
+        </p:txBody>
+      </p:sp>
+      <p:cxnSp>
+        <p:nvCxnSpPr>
+          <p:cNvPr id="40" name="Straight Arrow Connector 39">
+            <a:extLst>
+              <a:ext uri="{FF2B5EF4-FFF2-40B4-BE49-F238E27FC236}">
+                <a16:creationId xmlns:a16="http://schemas.microsoft.com/office/drawing/2014/main" id="{E63316EA-CB95-ED10-B0C0-F9B98605819B}"/>
+              </a:ext>
+            </a:extLst>
+          </p:cNvPr>
+          <p:cNvCxnSpPr>
+            <a:cxnSpLocks/>
+          </p:cNvCxnSpPr>
+          <p:nvPr/>
+        </p:nvCxnSpPr>
+        <p:spPr>
+          <a:xfrm>
+            <a:off x="2798014" y="5867659"/>
+            <a:ext cx="1282126" cy="0"/>
+          </a:xfrm>
+          <a:prstGeom prst="straightConnector1">
+            <a:avLst/>
+          </a:prstGeom>
+          <a:ln w="19050">
+            <a:solidFill>
+              <a:schemeClr val="tx2">
+                <a:lumMod val="50000"/>
+                <a:lumOff val="50000"/>
+              </a:schemeClr>
+            </a:solidFill>
+            <a:prstDash val="sysDash"/>
+            <a:tailEnd type="triangle"/>
+          </a:ln>
+        </p:spPr>
+        <p:style>
+          <a:lnRef idx="1">
+            <a:schemeClr val="accent5"/>
+          </a:lnRef>
+          <a:fillRef idx="0">
+            <a:schemeClr val="accent5"/>
+          </a:fillRef>
+          <a:effectRef idx="0">
+            <a:schemeClr val="accent5"/>
+          </a:effectRef>
+          <a:fontRef idx="minor">
+            <a:schemeClr val="tx1"/>
+          </a:fontRef>
+        </p:style>
+      </p:cxnSp>
+      <p:sp>
+        <p:nvSpPr>
+          <p:cNvPr id="43" name="TextBox 42">
+            <a:extLst>
+              <a:ext uri="{FF2B5EF4-FFF2-40B4-BE49-F238E27FC236}">
+                <a16:creationId xmlns:a16="http://schemas.microsoft.com/office/drawing/2014/main" id="{B2CBC153-3FF3-15C7-E751-99A23926C6EE}"/>
+              </a:ext>
+            </a:extLst>
+          </p:cNvPr>
+          <p:cNvSpPr txBox="1"/>
+          <p:nvPr/>
+        </p:nvSpPr>
+        <p:spPr>
+          <a:xfrm>
+            <a:off x="1851669" y="5672621"/>
+            <a:ext cx="1140716" cy="430887"/>
+          </a:xfrm>
+          <a:prstGeom prst="rect">
+            <a:avLst/>
+          </a:prstGeom>
+          <a:noFill/>
+        </p:spPr>
+        <p:txBody>
+          <a:bodyPr wrap="square" rtlCol="0">
+            <a:spAutoFit/>
+          </a:bodyPr>
+          <a:lstStyle/>
+          <a:p>
+            <a:r>
+              <a:rPr lang="en-US" sz="1100" b="1" dirty="0"/>
+              <a:t>PLC output coil ID</a:t>
+            </a:r>
+            <a:endParaRPr lang="en-SG" sz="1100" b="1" dirty="0"/>
+          </a:p>
+        </p:txBody>
+      </p:sp>
+      <p:cxnSp>
+        <p:nvCxnSpPr>
+          <p:cNvPr id="45" name="Connector: Elbow 44">
+            <a:extLst>
+              <a:ext uri="{FF2B5EF4-FFF2-40B4-BE49-F238E27FC236}">
+                <a16:creationId xmlns:a16="http://schemas.microsoft.com/office/drawing/2014/main" id="{51F7ED2D-EA4C-6776-9CCD-9D56869212E7}"/>
+              </a:ext>
+            </a:extLst>
+          </p:cNvPr>
+          <p:cNvCxnSpPr>
+            <a:cxnSpLocks/>
+          </p:cNvCxnSpPr>
+          <p:nvPr/>
+        </p:nvCxnSpPr>
+        <p:spPr>
+          <a:xfrm rot="10800000" flipV="1">
+            <a:off x="5934456" y="576103"/>
+            <a:ext cx="2779776" cy="419473"/>
+          </a:xfrm>
+          <a:prstGeom prst="bentConnector3">
+            <a:avLst>
+              <a:gd name="adj1" fmla="val 99671"/>
+            </a:avLst>
+          </a:prstGeom>
+          <a:ln>
+            <a:solidFill>
+              <a:schemeClr val="tx2">
+                <a:lumMod val="50000"/>
+                <a:lumOff val="50000"/>
+              </a:schemeClr>
+            </a:solidFill>
+            <a:prstDash val="sysDash"/>
+            <a:tailEnd type="triangle"/>
+          </a:ln>
+        </p:spPr>
+        <p:style>
+          <a:lnRef idx="2">
+            <a:schemeClr val="accent1"/>
+          </a:lnRef>
+          <a:fillRef idx="0">
+            <a:schemeClr val="accent1"/>
+          </a:fillRef>
+          <a:effectRef idx="1">
+            <a:schemeClr val="accent1"/>
+          </a:effectRef>
+          <a:fontRef idx="minor">
+            <a:schemeClr val="tx1"/>
+          </a:fontRef>
+        </p:style>
+      </p:cxnSp>
+      <p:sp>
+        <p:nvSpPr>
+          <p:cNvPr id="49" name="TextBox 48">
+            <a:extLst>
+              <a:ext uri="{FF2B5EF4-FFF2-40B4-BE49-F238E27FC236}">
+                <a16:creationId xmlns:a16="http://schemas.microsoft.com/office/drawing/2014/main" id="{6665BAA8-B823-34EE-54C3-8463D208D877}"/>
+              </a:ext>
+            </a:extLst>
+          </p:cNvPr>
+          <p:cNvSpPr txBox="1"/>
+          <p:nvPr/>
+        </p:nvSpPr>
+        <p:spPr>
+          <a:xfrm>
+            <a:off x="8710388" y="457879"/>
+            <a:ext cx="2244124" cy="261610"/>
+          </a:xfrm>
+          <a:prstGeom prst="rect">
+            <a:avLst/>
+          </a:prstGeom>
+          <a:noFill/>
+        </p:spPr>
+        <p:txBody>
+          <a:bodyPr wrap="square" rtlCol="0">
+            <a:spAutoFit/>
+          </a:bodyPr>
+          <a:lstStyle/>
+          <a:p>
+            <a:r>
+              <a:rPr lang="en-SG" sz="1100" b="1" dirty="0"/>
+              <a:t>Train air brake pressure gauge </a:t>
+            </a:r>
+          </a:p>
+        </p:txBody>
+      </p:sp>
+      <p:cxnSp>
+        <p:nvCxnSpPr>
+          <p:cNvPr id="50" name="Straight Arrow Connector 49">
+            <a:extLst>
+              <a:ext uri="{FF2B5EF4-FFF2-40B4-BE49-F238E27FC236}">
+                <a16:creationId xmlns:a16="http://schemas.microsoft.com/office/drawing/2014/main" id="{462B8B59-DFBC-9B46-C08D-F254F252015F}"/>
+              </a:ext>
+            </a:extLst>
+          </p:cNvPr>
+          <p:cNvCxnSpPr>
+            <a:cxnSpLocks/>
+          </p:cNvCxnSpPr>
+          <p:nvPr/>
+        </p:nvCxnSpPr>
+        <p:spPr>
+          <a:xfrm flipH="1">
+            <a:off x="7626096" y="995577"/>
+            <a:ext cx="1084292" cy="0"/>
+          </a:xfrm>
+          <a:prstGeom prst="straightConnector1">
+            <a:avLst/>
+          </a:prstGeom>
+          <a:ln w="19050">
+            <a:solidFill>
+              <a:schemeClr val="tx2">
+                <a:lumMod val="50000"/>
+                <a:lumOff val="50000"/>
+              </a:schemeClr>
+            </a:solidFill>
+            <a:prstDash val="sysDash"/>
+            <a:tailEnd type="triangle"/>
+          </a:ln>
+        </p:spPr>
+        <p:style>
+          <a:lnRef idx="1">
+            <a:schemeClr val="accent5"/>
+          </a:lnRef>
+          <a:fillRef idx="0">
+            <a:schemeClr val="accent5"/>
+          </a:fillRef>
+          <a:effectRef idx="0">
+            <a:schemeClr val="accent5"/>
+          </a:effectRef>
+          <a:fontRef idx="minor">
+            <a:schemeClr val="tx1"/>
+          </a:fontRef>
+        </p:style>
+      </p:cxnSp>
+      <p:sp>
+        <p:nvSpPr>
+          <p:cNvPr id="53" name="TextBox 52">
+            <a:extLst>
+              <a:ext uri="{FF2B5EF4-FFF2-40B4-BE49-F238E27FC236}">
+                <a16:creationId xmlns:a16="http://schemas.microsoft.com/office/drawing/2014/main" id="{9C1F08F6-6E41-FCC5-665F-E2CD076BAF39}"/>
+              </a:ext>
+            </a:extLst>
+          </p:cNvPr>
+          <p:cNvSpPr txBox="1"/>
+          <p:nvPr/>
+        </p:nvSpPr>
+        <p:spPr>
+          <a:xfrm>
+            <a:off x="8710388" y="866814"/>
+            <a:ext cx="2362995" cy="261610"/>
+          </a:xfrm>
+          <a:prstGeom prst="rect">
+            <a:avLst/>
+          </a:prstGeom>
+          <a:noFill/>
+        </p:spPr>
+        <p:txBody>
+          <a:bodyPr wrap="square" rtlCol="0">
+            <a:spAutoFit/>
+          </a:bodyPr>
+          <a:lstStyle/>
+          <a:p>
+            <a:r>
+              <a:rPr lang="en-US" sz="1100" b="1" dirty="0"/>
+              <a:t>Manual control enable checkbox </a:t>
+            </a:r>
+            <a:endParaRPr lang="en-SG" sz="1100" b="1" dirty="0"/>
+          </a:p>
+        </p:txBody>
+      </p:sp>
+      <p:cxnSp>
+        <p:nvCxnSpPr>
+          <p:cNvPr id="54" name="Straight Arrow Connector 53">
+            <a:extLst>
+              <a:ext uri="{FF2B5EF4-FFF2-40B4-BE49-F238E27FC236}">
+                <a16:creationId xmlns:a16="http://schemas.microsoft.com/office/drawing/2014/main" id="{961D3B8E-560F-5E18-631F-4FFC56C6ED92}"/>
+              </a:ext>
+            </a:extLst>
+          </p:cNvPr>
+          <p:cNvCxnSpPr>
+            <a:cxnSpLocks/>
+          </p:cNvCxnSpPr>
+          <p:nvPr/>
+        </p:nvCxnSpPr>
+        <p:spPr>
+          <a:xfrm flipH="1">
+            <a:off x="7738076" y="1426464"/>
+            <a:ext cx="972312" cy="0"/>
+          </a:xfrm>
+          <a:prstGeom prst="straightConnector1">
+            <a:avLst/>
+          </a:prstGeom>
+          <a:ln w="19050">
+            <a:solidFill>
+              <a:schemeClr val="tx2">
+                <a:lumMod val="50000"/>
+                <a:lumOff val="50000"/>
+              </a:schemeClr>
+            </a:solidFill>
+            <a:prstDash val="sysDash"/>
+            <a:tailEnd type="triangle"/>
+          </a:ln>
+        </p:spPr>
+        <p:style>
+          <a:lnRef idx="1">
+            <a:schemeClr val="accent5"/>
+          </a:lnRef>
+          <a:fillRef idx="0">
+            <a:schemeClr val="accent5"/>
+          </a:fillRef>
+          <a:effectRef idx="0">
+            <a:schemeClr val="accent5"/>
+          </a:effectRef>
+          <a:fontRef idx="minor">
+            <a:schemeClr val="tx1"/>
+          </a:fontRef>
+        </p:style>
+      </p:cxnSp>
+      <p:sp>
+        <p:nvSpPr>
+          <p:cNvPr id="56" name="TextBox 55">
+            <a:extLst>
+              <a:ext uri="{FF2B5EF4-FFF2-40B4-BE49-F238E27FC236}">
+                <a16:creationId xmlns:a16="http://schemas.microsoft.com/office/drawing/2014/main" id="{CF59EB30-2403-E1FC-486B-522861984825}"/>
+              </a:ext>
+            </a:extLst>
+          </p:cNvPr>
+          <p:cNvSpPr txBox="1"/>
+          <p:nvPr/>
+        </p:nvSpPr>
+        <p:spPr>
+          <a:xfrm>
+            <a:off x="8710388" y="1269410"/>
+            <a:ext cx="2362994" cy="261610"/>
+          </a:xfrm>
+          <a:prstGeom prst="rect">
+            <a:avLst/>
+          </a:prstGeom>
+          <a:noFill/>
+        </p:spPr>
+        <p:txBody>
+          <a:bodyPr wrap="square" rtlCol="0">
+            <a:spAutoFit/>
+          </a:bodyPr>
+          <a:lstStyle/>
+          <a:p>
+            <a:r>
+              <a:rPr lang="en-US" sz="1100" b="1" dirty="0"/>
+              <a:t>Train current operation state</a:t>
+            </a:r>
+            <a:endParaRPr lang="en-SG" sz="1100" b="1" dirty="0"/>
+          </a:p>
+        </p:txBody>
+      </p:sp>
+      <p:cxnSp>
+        <p:nvCxnSpPr>
+          <p:cNvPr id="57" name="Straight Arrow Connector 56">
+            <a:extLst>
+              <a:ext uri="{FF2B5EF4-FFF2-40B4-BE49-F238E27FC236}">
+                <a16:creationId xmlns:a16="http://schemas.microsoft.com/office/drawing/2014/main" id="{3261408E-C8D0-3FCB-60A3-FCA45DBAB83C}"/>
+              </a:ext>
+            </a:extLst>
+          </p:cNvPr>
+          <p:cNvCxnSpPr>
+            <a:cxnSpLocks/>
+          </p:cNvCxnSpPr>
+          <p:nvPr/>
+        </p:nvCxnSpPr>
+        <p:spPr>
+          <a:xfrm flipH="1">
+            <a:off x="8016172" y="1904522"/>
+            <a:ext cx="710184" cy="0"/>
+          </a:xfrm>
+          <a:prstGeom prst="straightConnector1">
+            <a:avLst/>
+          </a:prstGeom>
+          <a:ln w="19050">
+            <a:solidFill>
+              <a:schemeClr val="tx2">
+                <a:lumMod val="50000"/>
+                <a:lumOff val="50000"/>
+              </a:schemeClr>
+            </a:solidFill>
+            <a:prstDash val="sysDash"/>
+            <a:tailEnd type="triangle"/>
+          </a:ln>
+        </p:spPr>
+        <p:style>
+          <a:lnRef idx="1">
+            <a:schemeClr val="accent5"/>
+          </a:lnRef>
+          <a:fillRef idx="0">
+            <a:schemeClr val="accent5"/>
+          </a:fillRef>
+          <a:effectRef idx="0">
+            <a:schemeClr val="accent5"/>
+          </a:effectRef>
+          <a:fontRef idx="minor">
+            <a:schemeClr val="tx1"/>
+          </a:fontRef>
+        </p:style>
+      </p:cxnSp>
+      <p:sp>
+        <p:nvSpPr>
+          <p:cNvPr id="59" name="TextBox 58">
+            <a:extLst>
+              <a:ext uri="{FF2B5EF4-FFF2-40B4-BE49-F238E27FC236}">
+                <a16:creationId xmlns:a16="http://schemas.microsoft.com/office/drawing/2014/main" id="{19CD7AF3-9257-0145-31D8-E25B30230929}"/>
+              </a:ext>
+            </a:extLst>
+          </p:cNvPr>
+          <p:cNvSpPr txBox="1"/>
+          <p:nvPr/>
+        </p:nvSpPr>
+        <p:spPr>
+          <a:xfrm>
+            <a:off x="8710388" y="1743943"/>
+            <a:ext cx="2244124" cy="261610"/>
+          </a:xfrm>
+          <a:prstGeom prst="rect">
+            <a:avLst/>
+          </a:prstGeom>
+          <a:noFill/>
+        </p:spPr>
+        <p:txBody>
+          <a:bodyPr wrap="square" rtlCol="0">
+            <a:spAutoFit/>
+          </a:bodyPr>
+          <a:lstStyle/>
+          <a:p>
+            <a:r>
+              <a:rPr lang="en-US" sz="1100" b="1" dirty="0"/>
+              <a:t>Train moving direction control </a:t>
+            </a:r>
+            <a:endParaRPr lang="en-SG" sz="1100" b="1" dirty="0"/>
+          </a:p>
+        </p:txBody>
+      </p:sp>
+      <p:cxnSp>
+        <p:nvCxnSpPr>
+          <p:cNvPr id="60" name="Straight Arrow Connector 59">
+            <a:extLst>
+              <a:ext uri="{FF2B5EF4-FFF2-40B4-BE49-F238E27FC236}">
+                <a16:creationId xmlns:a16="http://schemas.microsoft.com/office/drawing/2014/main" id="{72C6E13C-00FB-B7FE-4FCD-32E33C9A64E1}"/>
+              </a:ext>
+            </a:extLst>
+          </p:cNvPr>
+          <p:cNvCxnSpPr>
+            <a:cxnSpLocks/>
+          </p:cNvCxnSpPr>
+          <p:nvPr/>
+        </p:nvCxnSpPr>
+        <p:spPr>
+          <a:xfrm flipH="1">
+            <a:off x="8027636" y="2151888"/>
+            <a:ext cx="710184" cy="0"/>
+          </a:xfrm>
+          <a:prstGeom prst="straightConnector1">
+            <a:avLst/>
+          </a:prstGeom>
+          <a:ln w="19050">
+            <a:solidFill>
+              <a:schemeClr val="tx2">
+                <a:lumMod val="50000"/>
+                <a:lumOff val="50000"/>
+              </a:schemeClr>
+            </a:solidFill>
+            <a:prstDash val="sysDash"/>
+            <a:tailEnd type="triangle"/>
+          </a:ln>
+        </p:spPr>
+        <p:style>
+          <a:lnRef idx="1">
+            <a:schemeClr val="accent5"/>
+          </a:lnRef>
+          <a:fillRef idx="0">
+            <a:schemeClr val="accent5"/>
+          </a:fillRef>
+          <a:effectRef idx="0">
+            <a:schemeClr val="accent5"/>
+          </a:effectRef>
+          <a:fontRef idx="minor">
+            <a:schemeClr val="tx1"/>
+          </a:fontRef>
+        </p:style>
+      </p:cxnSp>
+      <p:sp>
+        <p:nvSpPr>
+          <p:cNvPr id="61" name="TextBox 60">
+            <a:extLst>
+              <a:ext uri="{FF2B5EF4-FFF2-40B4-BE49-F238E27FC236}">
+                <a16:creationId xmlns:a16="http://schemas.microsoft.com/office/drawing/2014/main" id="{841ADBFF-4079-8F4F-8699-6EE6E8B1618C}"/>
+              </a:ext>
+            </a:extLst>
+          </p:cNvPr>
+          <p:cNvSpPr txBox="1"/>
+          <p:nvPr/>
+        </p:nvSpPr>
+        <p:spPr>
+          <a:xfrm>
+            <a:off x="8710388" y="2025431"/>
+            <a:ext cx="2244124" cy="261610"/>
+          </a:xfrm>
+          <a:prstGeom prst="rect">
+            <a:avLst/>
+          </a:prstGeom>
+          <a:noFill/>
+        </p:spPr>
+        <p:txBody>
+          <a:bodyPr wrap="square" rtlCol="0">
+            <a:spAutoFit/>
+          </a:bodyPr>
+          <a:lstStyle/>
+          <a:p>
+            <a:r>
+              <a:rPr lang="en-US" sz="1100" b="1" dirty="0"/>
+              <a:t>Train max speed configuration</a:t>
+            </a:r>
+            <a:endParaRPr lang="en-SG" sz="1100" b="1" dirty="0"/>
+          </a:p>
+        </p:txBody>
+      </p:sp>
+      <p:cxnSp>
+        <p:nvCxnSpPr>
+          <p:cNvPr id="62" name="Straight Arrow Connector 61">
+            <a:extLst>
+              <a:ext uri="{FF2B5EF4-FFF2-40B4-BE49-F238E27FC236}">
+                <a16:creationId xmlns:a16="http://schemas.microsoft.com/office/drawing/2014/main" id="{FBC14497-2AE0-30A7-F351-DDCD4F937374}"/>
+              </a:ext>
+            </a:extLst>
+          </p:cNvPr>
+          <p:cNvCxnSpPr>
+            <a:cxnSpLocks/>
+          </p:cNvCxnSpPr>
+          <p:nvPr/>
+        </p:nvCxnSpPr>
+        <p:spPr>
+          <a:xfrm flipH="1">
+            <a:off x="8027636" y="2417489"/>
+            <a:ext cx="710184" cy="0"/>
+          </a:xfrm>
+          <a:prstGeom prst="straightConnector1">
+            <a:avLst/>
+          </a:prstGeom>
+          <a:ln w="19050">
+            <a:solidFill>
+              <a:schemeClr val="tx2">
+                <a:lumMod val="50000"/>
+                <a:lumOff val="50000"/>
+              </a:schemeClr>
+            </a:solidFill>
+            <a:prstDash val="sysDash"/>
+            <a:tailEnd type="triangle"/>
+          </a:ln>
+        </p:spPr>
+        <p:style>
+          <a:lnRef idx="1">
+            <a:schemeClr val="accent5"/>
+          </a:lnRef>
+          <a:fillRef idx="0">
+            <a:schemeClr val="accent5"/>
+          </a:fillRef>
+          <a:effectRef idx="0">
+            <a:schemeClr val="accent5"/>
+          </a:effectRef>
+          <a:fontRef idx="minor">
+            <a:schemeClr val="tx1"/>
+          </a:fontRef>
+        </p:style>
+      </p:cxnSp>
+      <p:sp>
+        <p:nvSpPr>
+          <p:cNvPr id="63" name="TextBox 62">
+            <a:extLst>
+              <a:ext uri="{FF2B5EF4-FFF2-40B4-BE49-F238E27FC236}">
+                <a16:creationId xmlns:a16="http://schemas.microsoft.com/office/drawing/2014/main" id="{579BB086-9675-A76B-3C00-B4232A685685}"/>
+              </a:ext>
+            </a:extLst>
+          </p:cNvPr>
+          <p:cNvSpPr txBox="1"/>
+          <p:nvPr/>
+        </p:nvSpPr>
+        <p:spPr>
+          <a:xfrm>
+            <a:off x="8710388" y="2282693"/>
+            <a:ext cx="2731804" cy="261610"/>
+          </a:xfrm>
+          <a:prstGeom prst="rect">
+            <a:avLst/>
+          </a:prstGeom>
+          <a:noFill/>
+        </p:spPr>
+        <p:txBody>
+          <a:bodyPr wrap="square" rtlCol="0">
+            <a:spAutoFit/>
+          </a:bodyPr>
+          <a:lstStyle/>
+          <a:p>
+            <a:r>
+              <a:rPr lang="en-US" sz="1100" b="1" dirty="0"/>
+              <a:t>Train station waiting time configuration </a:t>
+            </a:r>
+            <a:endParaRPr lang="en-SG" sz="1100" b="1" dirty="0"/>
+          </a:p>
+        </p:txBody>
+      </p:sp>
+      <p:cxnSp>
+        <p:nvCxnSpPr>
+          <p:cNvPr id="64" name="Straight Arrow Connector 63">
+            <a:extLst>
+              <a:ext uri="{FF2B5EF4-FFF2-40B4-BE49-F238E27FC236}">
+                <a16:creationId xmlns:a16="http://schemas.microsoft.com/office/drawing/2014/main" id="{CD81FEF1-7A17-0BC3-9EEC-67751A051D5A}"/>
+              </a:ext>
+            </a:extLst>
+          </p:cNvPr>
+          <p:cNvCxnSpPr>
+            <a:cxnSpLocks/>
+          </p:cNvCxnSpPr>
+          <p:nvPr/>
+        </p:nvCxnSpPr>
+        <p:spPr>
+          <a:xfrm flipH="1">
+            <a:off x="8027636" y="2652185"/>
+            <a:ext cx="710184" cy="0"/>
+          </a:xfrm>
+          <a:prstGeom prst="straightConnector1">
+            <a:avLst/>
+          </a:prstGeom>
+          <a:ln w="19050">
+            <a:solidFill>
+              <a:schemeClr val="tx2">
+                <a:lumMod val="50000"/>
+                <a:lumOff val="50000"/>
+              </a:schemeClr>
+            </a:solidFill>
+            <a:prstDash val="sysDash"/>
+            <a:tailEnd type="triangle"/>
+          </a:ln>
+        </p:spPr>
+        <p:style>
+          <a:lnRef idx="1">
+            <a:schemeClr val="accent5"/>
+          </a:lnRef>
+          <a:fillRef idx="0">
+            <a:schemeClr val="accent5"/>
+          </a:fillRef>
+          <a:effectRef idx="0">
+            <a:schemeClr val="accent5"/>
+          </a:effectRef>
+          <a:fontRef idx="minor">
+            <a:schemeClr val="tx1"/>
+          </a:fontRef>
+        </p:style>
+      </p:cxnSp>
+      <p:sp>
+        <p:nvSpPr>
+          <p:cNvPr id="65" name="TextBox 64">
+            <a:extLst>
+              <a:ext uri="{FF2B5EF4-FFF2-40B4-BE49-F238E27FC236}">
+                <a16:creationId xmlns:a16="http://schemas.microsoft.com/office/drawing/2014/main" id="{BF7BE358-8919-9438-7B71-D55F573AB040}"/>
+              </a:ext>
+            </a:extLst>
+          </p:cNvPr>
+          <p:cNvSpPr txBox="1"/>
+          <p:nvPr/>
+        </p:nvSpPr>
+        <p:spPr>
+          <a:xfrm>
+            <a:off x="8717383" y="2521380"/>
+            <a:ext cx="2662949" cy="261610"/>
+          </a:xfrm>
+          <a:prstGeom prst="rect">
+            <a:avLst/>
+          </a:prstGeom>
+          <a:noFill/>
+        </p:spPr>
+        <p:txBody>
+          <a:bodyPr wrap="square" rtlCol="0">
+            <a:spAutoFit/>
+          </a:bodyPr>
+          <a:lstStyle/>
+          <a:p>
+            <a:r>
+              <a:rPr lang="en-US" sz="1100" b="1" dirty="0"/>
+              <a:t>Train power emergency cut off button</a:t>
+            </a:r>
+            <a:endParaRPr lang="en-SG" sz="1100" b="1" dirty="0"/>
+          </a:p>
+        </p:txBody>
+      </p:sp>
+      <p:cxnSp>
+        <p:nvCxnSpPr>
+          <p:cNvPr id="66" name="Connector: Elbow 65">
+            <a:extLst>
+              <a:ext uri="{FF2B5EF4-FFF2-40B4-BE49-F238E27FC236}">
+                <a16:creationId xmlns:a16="http://schemas.microsoft.com/office/drawing/2014/main" id="{15C0BAAB-39EF-7C49-E24D-DEF2C007CF84}"/>
+              </a:ext>
+            </a:extLst>
+          </p:cNvPr>
+          <p:cNvCxnSpPr>
+            <a:cxnSpLocks/>
+          </p:cNvCxnSpPr>
+          <p:nvPr/>
+        </p:nvCxnSpPr>
+        <p:spPr>
+          <a:xfrm rot="10800000">
+            <a:off x="7424931" y="2821446"/>
+            <a:ext cx="1319885" cy="110557"/>
+          </a:xfrm>
+          <a:prstGeom prst="bentConnector3">
+            <a:avLst>
+              <a:gd name="adj1" fmla="val 99188"/>
+            </a:avLst>
+          </a:prstGeom>
+          <a:ln>
+            <a:solidFill>
+              <a:schemeClr val="tx2">
+                <a:lumMod val="50000"/>
+                <a:lumOff val="50000"/>
+              </a:schemeClr>
+            </a:solidFill>
+            <a:prstDash val="sysDash"/>
+            <a:tailEnd type="triangle"/>
+          </a:ln>
+        </p:spPr>
+        <p:style>
+          <a:lnRef idx="2">
+            <a:schemeClr val="accent1"/>
+          </a:lnRef>
+          <a:fillRef idx="0">
+            <a:schemeClr val="accent1"/>
+          </a:fillRef>
+          <a:effectRef idx="1">
+            <a:schemeClr val="accent1"/>
+          </a:effectRef>
+          <a:fontRef idx="minor">
+            <a:schemeClr val="tx1"/>
+          </a:fontRef>
+        </p:style>
+      </p:cxnSp>
+      <p:sp>
+        <p:nvSpPr>
+          <p:cNvPr id="70" name="TextBox 69">
+            <a:extLst>
+              <a:ext uri="{FF2B5EF4-FFF2-40B4-BE49-F238E27FC236}">
+                <a16:creationId xmlns:a16="http://schemas.microsoft.com/office/drawing/2014/main" id="{5FA97A05-6E26-E744-7150-A6278BD0AC40}"/>
+              </a:ext>
+            </a:extLst>
+          </p:cNvPr>
+          <p:cNvSpPr txBox="1"/>
+          <p:nvPr/>
+        </p:nvSpPr>
+        <p:spPr>
+          <a:xfrm>
+            <a:off x="8710388" y="2809903"/>
+            <a:ext cx="2066441" cy="261610"/>
+          </a:xfrm>
+          <a:prstGeom prst="rect">
+            <a:avLst/>
+          </a:prstGeom>
+          <a:noFill/>
+        </p:spPr>
+        <p:txBody>
+          <a:bodyPr wrap="square" rtlCol="0">
+            <a:spAutoFit/>
+          </a:bodyPr>
+          <a:lstStyle/>
+          <a:p>
+            <a:r>
+              <a:rPr lang="en-US" sz="1100" b="1" dirty="0"/>
+              <a:t>Train power turn on button</a:t>
+            </a:r>
+            <a:endParaRPr lang="en-SG" sz="1100" b="1" dirty="0"/>
+          </a:p>
+        </p:txBody>
+      </p:sp>
+      <p:cxnSp>
+        <p:nvCxnSpPr>
+          <p:cNvPr id="71" name="Connector: Elbow 70">
+            <a:extLst>
+              <a:ext uri="{FF2B5EF4-FFF2-40B4-BE49-F238E27FC236}">
+                <a16:creationId xmlns:a16="http://schemas.microsoft.com/office/drawing/2014/main" id="{89F8E3E9-133E-BA78-1655-BFB9BFB9ADC7}"/>
+              </a:ext>
+            </a:extLst>
+          </p:cNvPr>
+          <p:cNvCxnSpPr>
+            <a:cxnSpLocks/>
+          </p:cNvCxnSpPr>
+          <p:nvPr/>
+        </p:nvCxnSpPr>
+        <p:spPr>
+          <a:xfrm rot="10800000">
+            <a:off x="7059168" y="2821444"/>
+            <a:ext cx="1685648" cy="418279"/>
+          </a:xfrm>
+          <a:prstGeom prst="bentConnector3">
+            <a:avLst>
+              <a:gd name="adj1" fmla="val 99364"/>
+            </a:avLst>
+          </a:prstGeom>
+          <a:ln>
+            <a:solidFill>
+              <a:schemeClr val="tx2">
+                <a:lumMod val="50000"/>
+                <a:lumOff val="50000"/>
+              </a:schemeClr>
+            </a:solidFill>
+            <a:prstDash val="sysDash"/>
+            <a:tailEnd type="triangle"/>
+          </a:ln>
+        </p:spPr>
+        <p:style>
+          <a:lnRef idx="2">
+            <a:schemeClr val="accent1"/>
+          </a:lnRef>
+          <a:fillRef idx="0">
+            <a:schemeClr val="accent1"/>
+          </a:fillRef>
+          <a:effectRef idx="1">
+            <a:schemeClr val="accent1"/>
+          </a:effectRef>
+          <a:fontRef idx="minor">
+            <a:schemeClr val="tx1"/>
+          </a:fontRef>
+        </p:style>
+      </p:cxnSp>
+      <p:sp>
+        <p:nvSpPr>
+          <p:cNvPr id="77" name="TextBox 76">
+            <a:extLst>
+              <a:ext uri="{FF2B5EF4-FFF2-40B4-BE49-F238E27FC236}">
+                <a16:creationId xmlns:a16="http://schemas.microsoft.com/office/drawing/2014/main" id="{E1E8F065-4D8B-E769-CECB-A19B77620013}"/>
+              </a:ext>
+            </a:extLst>
+          </p:cNvPr>
+          <p:cNvSpPr txBox="1"/>
+          <p:nvPr/>
+        </p:nvSpPr>
+        <p:spPr>
+          <a:xfrm>
+            <a:off x="8710387" y="3068810"/>
+            <a:ext cx="2066441" cy="261610"/>
+          </a:xfrm>
+          <a:prstGeom prst="rect">
+            <a:avLst/>
+          </a:prstGeom>
+          <a:noFill/>
+        </p:spPr>
+        <p:txBody>
+          <a:bodyPr wrap="square" rtlCol="0">
+            <a:spAutoFit/>
+          </a:bodyPr>
+          <a:lstStyle/>
+          <a:p>
+            <a:r>
+              <a:rPr lang="en-US" sz="1100" b="1" dirty="0"/>
+              <a:t>Train control reset button</a:t>
+            </a:r>
+            <a:endParaRPr lang="en-SG" sz="1100" b="1" dirty="0"/>
+          </a:p>
+        </p:txBody>
+      </p:sp>
+      <p:cxnSp>
+        <p:nvCxnSpPr>
+          <p:cNvPr id="78" name="Straight Arrow Connector 77">
+            <a:extLst>
+              <a:ext uri="{FF2B5EF4-FFF2-40B4-BE49-F238E27FC236}">
+                <a16:creationId xmlns:a16="http://schemas.microsoft.com/office/drawing/2014/main" id="{29653E66-8D13-1F7A-0BBA-D9D465D0F8BC}"/>
+              </a:ext>
+            </a:extLst>
+          </p:cNvPr>
+          <p:cNvCxnSpPr>
+            <a:cxnSpLocks/>
+          </p:cNvCxnSpPr>
+          <p:nvPr/>
+        </p:nvCxnSpPr>
+        <p:spPr>
+          <a:xfrm flipH="1">
+            <a:off x="7967404" y="3539039"/>
+            <a:ext cx="777412" cy="0"/>
+          </a:xfrm>
+          <a:prstGeom prst="straightConnector1">
+            <a:avLst/>
+          </a:prstGeom>
+          <a:ln w="19050">
+            <a:solidFill>
+              <a:schemeClr val="tx2">
+                <a:lumMod val="50000"/>
+                <a:lumOff val="50000"/>
+              </a:schemeClr>
+            </a:solidFill>
+            <a:prstDash val="sysDash"/>
+            <a:tailEnd type="triangle"/>
+          </a:ln>
+        </p:spPr>
+        <p:style>
+          <a:lnRef idx="1">
+            <a:schemeClr val="accent5"/>
+          </a:lnRef>
+          <a:fillRef idx="0">
+            <a:schemeClr val="accent5"/>
+          </a:fillRef>
+          <a:effectRef idx="0">
+            <a:schemeClr val="accent5"/>
+          </a:effectRef>
+          <a:fontRef idx="minor">
+            <a:schemeClr val="tx1"/>
+          </a:fontRef>
+        </p:style>
+      </p:cxnSp>
+      <p:sp>
+        <p:nvSpPr>
+          <p:cNvPr id="80" name="TextBox 79">
+            <a:extLst>
+              <a:ext uri="{FF2B5EF4-FFF2-40B4-BE49-F238E27FC236}">
+                <a16:creationId xmlns:a16="http://schemas.microsoft.com/office/drawing/2014/main" id="{F5C0FC06-F2EB-7F80-C120-3EE42AA421FA}"/>
+              </a:ext>
+            </a:extLst>
+          </p:cNvPr>
+          <p:cNvSpPr txBox="1"/>
+          <p:nvPr/>
+        </p:nvSpPr>
+        <p:spPr>
+          <a:xfrm>
+            <a:off x="8717383" y="3334411"/>
+            <a:ext cx="1825649" cy="430887"/>
+          </a:xfrm>
+          <a:prstGeom prst="rect">
+            <a:avLst/>
+          </a:prstGeom>
+          <a:noFill/>
+        </p:spPr>
+        <p:txBody>
+          <a:bodyPr wrap="square" rtlCol="0">
+            <a:spAutoFit/>
+          </a:bodyPr>
+          <a:lstStyle/>
+          <a:p>
+            <a:r>
+              <a:rPr lang="en-US" sz="1100" b="1" dirty="0"/>
+              <a:t>Train alert indicators display area </a:t>
+            </a:r>
+            <a:endParaRPr lang="en-SG" sz="1100" b="1" dirty="0"/>
+          </a:p>
+        </p:txBody>
+      </p:sp>
+      <p:cxnSp>
+        <p:nvCxnSpPr>
+          <p:cNvPr id="81" name="Connector: Elbow 80">
+            <a:extLst>
+              <a:ext uri="{FF2B5EF4-FFF2-40B4-BE49-F238E27FC236}">
+                <a16:creationId xmlns:a16="http://schemas.microsoft.com/office/drawing/2014/main" id="{DE5A0D7F-3A0D-E623-591B-23924CF9AC10}"/>
+              </a:ext>
+            </a:extLst>
+          </p:cNvPr>
+          <p:cNvCxnSpPr>
+            <a:cxnSpLocks/>
+          </p:cNvCxnSpPr>
+          <p:nvPr/>
+        </p:nvCxnSpPr>
+        <p:spPr>
+          <a:xfrm rot="10800000">
+            <a:off x="5387001" y="3682020"/>
+            <a:ext cx="3330384" cy="370386"/>
+          </a:xfrm>
+          <a:prstGeom prst="bentConnector3">
+            <a:avLst>
+              <a:gd name="adj1" fmla="val 81575"/>
+            </a:avLst>
+          </a:prstGeom>
+          <a:ln>
+            <a:solidFill>
+              <a:schemeClr val="tx2">
+                <a:lumMod val="50000"/>
+                <a:lumOff val="50000"/>
+              </a:schemeClr>
+            </a:solidFill>
+            <a:prstDash val="sysDash"/>
+            <a:tailEnd type="triangle"/>
+          </a:ln>
+        </p:spPr>
+        <p:style>
+          <a:lnRef idx="2">
+            <a:schemeClr val="accent1"/>
+          </a:lnRef>
+          <a:fillRef idx="0">
+            <a:schemeClr val="accent1"/>
+          </a:fillRef>
+          <a:effectRef idx="1">
+            <a:schemeClr val="accent1"/>
+          </a:effectRef>
+          <a:fontRef idx="minor">
+            <a:schemeClr val="tx1"/>
+          </a:fontRef>
+        </p:style>
+      </p:cxnSp>
+      <p:sp>
+        <p:nvSpPr>
+          <p:cNvPr id="86" name="TextBox 85">
+            <a:extLst>
+              <a:ext uri="{FF2B5EF4-FFF2-40B4-BE49-F238E27FC236}">
+                <a16:creationId xmlns:a16="http://schemas.microsoft.com/office/drawing/2014/main" id="{4DA4B0BA-0C40-E0F5-C38B-97C7BC948BB2}"/>
+              </a:ext>
+            </a:extLst>
+          </p:cNvPr>
+          <p:cNvSpPr txBox="1"/>
+          <p:nvPr/>
+        </p:nvSpPr>
+        <p:spPr>
+          <a:xfrm>
+            <a:off x="8710387" y="3896281"/>
+            <a:ext cx="1825649" cy="261610"/>
+          </a:xfrm>
+          <a:prstGeom prst="rect">
+            <a:avLst/>
+          </a:prstGeom>
+          <a:noFill/>
+        </p:spPr>
+        <p:txBody>
+          <a:bodyPr wrap="square" rtlCol="0">
+            <a:spAutoFit/>
+          </a:bodyPr>
+          <a:lstStyle/>
+          <a:p>
+            <a:r>
+              <a:rPr lang="en-US" sz="1100" b="1" dirty="0"/>
+              <a:t>Train mode control slider</a:t>
+            </a:r>
+            <a:endParaRPr lang="en-SG" sz="1100" b="1" dirty="0"/>
+          </a:p>
+        </p:txBody>
+      </p:sp>
+      <p:cxnSp>
+        <p:nvCxnSpPr>
+          <p:cNvPr id="87" name="Straight Arrow Connector 86">
+            <a:extLst>
+              <a:ext uri="{FF2B5EF4-FFF2-40B4-BE49-F238E27FC236}">
+                <a16:creationId xmlns:a16="http://schemas.microsoft.com/office/drawing/2014/main" id="{4FE0E91B-2E29-7AC9-552F-DEDC3D17A666}"/>
+              </a:ext>
+            </a:extLst>
+          </p:cNvPr>
+          <p:cNvCxnSpPr>
+            <a:cxnSpLocks/>
+          </p:cNvCxnSpPr>
+          <p:nvPr/>
+        </p:nvCxnSpPr>
+        <p:spPr>
+          <a:xfrm flipH="1">
+            <a:off x="7772505" y="4314211"/>
+            <a:ext cx="972311" cy="0"/>
+          </a:xfrm>
+          <a:prstGeom prst="straightConnector1">
+            <a:avLst/>
+          </a:prstGeom>
+          <a:ln w="19050">
+            <a:solidFill>
+              <a:schemeClr val="tx2">
+                <a:lumMod val="50000"/>
+                <a:lumOff val="50000"/>
+              </a:schemeClr>
+            </a:solidFill>
+            <a:prstDash val="sysDash"/>
+            <a:tailEnd type="triangle"/>
+          </a:ln>
+        </p:spPr>
+        <p:style>
+          <a:lnRef idx="1">
+            <a:schemeClr val="accent5"/>
+          </a:lnRef>
+          <a:fillRef idx="0">
+            <a:schemeClr val="accent5"/>
+          </a:fillRef>
+          <a:effectRef idx="0">
+            <a:schemeClr val="accent5"/>
+          </a:effectRef>
+          <a:fontRef idx="minor">
+            <a:schemeClr val="tx1"/>
+          </a:fontRef>
+        </p:style>
+      </p:cxnSp>
+      <p:sp>
+        <p:nvSpPr>
+          <p:cNvPr id="88" name="TextBox 87">
+            <a:extLst>
+              <a:ext uri="{FF2B5EF4-FFF2-40B4-BE49-F238E27FC236}">
+                <a16:creationId xmlns:a16="http://schemas.microsoft.com/office/drawing/2014/main" id="{4BAB97FD-73B1-42AA-F25E-5CF4B839ABBC}"/>
+              </a:ext>
+            </a:extLst>
+          </p:cNvPr>
+          <p:cNvSpPr txBox="1"/>
+          <p:nvPr/>
+        </p:nvSpPr>
+        <p:spPr>
+          <a:xfrm>
+            <a:off x="8717383" y="4169084"/>
+            <a:ext cx="1424886" cy="261610"/>
+          </a:xfrm>
+          <a:prstGeom prst="rect">
+            <a:avLst/>
+          </a:prstGeom>
+          <a:noFill/>
+        </p:spPr>
+        <p:txBody>
+          <a:bodyPr wrap="square" rtlCol="0">
+            <a:spAutoFit/>
+          </a:bodyPr>
+          <a:lstStyle/>
+          <a:p>
+            <a:r>
+              <a:rPr lang="en-SG" sz="1100" b="1" dirty="0"/>
+              <a:t>On Train PLC ID</a:t>
+            </a:r>
+          </a:p>
+        </p:txBody>
+      </p:sp>
+      <p:sp>
+        <p:nvSpPr>
+          <p:cNvPr id="93" name="TextBox 92">
+            <a:extLst>
+              <a:ext uri="{FF2B5EF4-FFF2-40B4-BE49-F238E27FC236}">
+                <a16:creationId xmlns:a16="http://schemas.microsoft.com/office/drawing/2014/main" id="{D96BA675-0F1C-FB56-4FFC-43658C2E3E39}"/>
+              </a:ext>
+            </a:extLst>
+          </p:cNvPr>
+          <p:cNvSpPr txBox="1"/>
+          <p:nvPr/>
+        </p:nvSpPr>
+        <p:spPr>
+          <a:xfrm>
+            <a:off x="8710387" y="4518354"/>
+            <a:ext cx="2055711" cy="261610"/>
+          </a:xfrm>
+          <a:prstGeom prst="rect">
+            <a:avLst/>
+          </a:prstGeom>
+          <a:noFill/>
+        </p:spPr>
+        <p:txBody>
+          <a:bodyPr wrap="square" rtlCol="0">
+            <a:spAutoFit/>
+          </a:bodyPr>
+          <a:lstStyle/>
+          <a:p>
+            <a:r>
+              <a:rPr lang="en-US" sz="1100" b="1" dirty="0"/>
+              <a:t>PLC IP address and port </a:t>
+            </a:r>
+            <a:endParaRPr lang="en-SG" sz="1100" b="1" dirty="0"/>
+          </a:p>
+        </p:txBody>
+      </p:sp>
+      <p:cxnSp>
+        <p:nvCxnSpPr>
+          <p:cNvPr id="95" name="Connector: Elbow 94">
+            <a:extLst>
+              <a:ext uri="{FF2B5EF4-FFF2-40B4-BE49-F238E27FC236}">
+                <a16:creationId xmlns:a16="http://schemas.microsoft.com/office/drawing/2014/main" id="{1556EE33-3605-AACE-957B-DD58834796B0}"/>
+              </a:ext>
+            </a:extLst>
+          </p:cNvPr>
+          <p:cNvCxnSpPr>
+            <a:cxnSpLocks/>
+            <a:stCxn id="93" idx="1"/>
+          </p:cNvCxnSpPr>
+          <p:nvPr/>
+        </p:nvCxnSpPr>
+        <p:spPr>
+          <a:xfrm rot="10800000">
+            <a:off x="7901997" y="4494707"/>
+            <a:ext cx="808391" cy="154453"/>
+          </a:xfrm>
+          <a:prstGeom prst="bentConnector3">
+            <a:avLst>
+              <a:gd name="adj1" fmla="val 50000"/>
+            </a:avLst>
+          </a:prstGeom>
+          <a:ln>
+            <a:solidFill>
+              <a:schemeClr val="tx2">
+                <a:lumMod val="50000"/>
+                <a:lumOff val="50000"/>
+              </a:schemeClr>
+            </a:solidFill>
+            <a:prstDash val="sysDash"/>
+            <a:tailEnd type="triangle"/>
+          </a:ln>
+        </p:spPr>
+        <p:style>
+          <a:lnRef idx="2">
+            <a:schemeClr val="accent1"/>
+          </a:lnRef>
+          <a:fillRef idx="0">
+            <a:schemeClr val="accent1"/>
+          </a:fillRef>
+          <a:effectRef idx="1">
+            <a:schemeClr val="accent1"/>
+          </a:effectRef>
+          <a:fontRef idx="minor">
+            <a:schemeClr val="tx1"/>
+          </a:fontRef>
+        </p:style>
+      </p:cxnSp>
+      <p:sp>
+        <p:nvSpPr>
+          <p:cNvPr id="97" name="TextBox 96">
+            <a:extLst>
+              <a:ext uri="{FF2B5EF4-FFF2-40B4-BE49-F238E27FC236}">
+                <a16:creationId xmlns:a16="http://schemas.microsoft.com/office/drawing/2014/main" id="{5E89B37B-7432-7E51-F14E-57FB47F066E2}"/>
+              </a:ext>
+            </a:extLst>
+          </p:cNvPr>
+          <p:cNvSpPr txBox="1"/>
+          <p:nvPr/>
+        </p:nvSpPr>
+        <p:spPr>
+          <a:xfrm>
+            <a:off x="8656284" y="4853301"/>
+            <a:ext cx="2055711" cy="261610"/>
+          </a:xfrm>
+          <a:prstGeom prst="rect">
+            <a:avLst/>
+          </a:prstGeom>
+          <a:noFill/>
+        </p:spPr>
+        <p:txBody>
+          <a:bodyPr wrap="square" rtlCol="0">
+            <a:spAutoFit/>
+          </a:bodyPr>
+          <a:lstStyle/>
+          <a:p>
+            <a:r>
+              <a:rPr lang="en-US" sz="1100" b="1" dirty="0"/>
+              <a:t>PLC connection state</a:t>
+            </a:r>
+            <a:endParaRPr lang="en-SG" sz="1100" b="1" dirty="0"/>
+          </a:p>
+        </p:txBody>
+      </p:sp>
+      <p:cxnSp>
+        <p:nvCxnSpPr>
+          <p:cNvPr id="99" name="Connector: Elbow 98">
+            <a:extLst>
+              <a:ext uri="{FF2B5EF4-FFF2-40B4-BE49-F238E27FC236}">
+                <a16:creationId xmlns:a16="http://schemas.microsoft.com/office/drawing/2014/main" id="{2C0C02F8-AD77-7A9D-27C6-34F5D76A884A}"/>
+              </a:ext>
+            </a:extLst>
+          </p:cNvPr>
+          <p:cNvCxnSpPr>
+            <a:cxnSpLocks/>
+          </p:cNvCxnSpPr>
+          <p:nvPr/>
+        </p:nvCxnSpPr>
+        <p:spPr>
+          <a:xfrm rot="10800000">
+            <a:off x="7738076" y="4672808"/>
+            <a:ext cx="972308" cy="311302"/>
+          </a:xfrm>
+          <a:prstGeom prst="bentConnector3">
+            <a:avLst>
+              <a:gd name="adj1" fmla="val 50000"/>
+            </a:avLst>
+          </a:prstGeom>
+          <a:ln>
+            <a:solidFill>
+              <a:schemeClr val="tx2">
+                <a:lumMod val="50000"/>
+                <a:lumOff val="50000"/>
+              </a:schemeClr>
+            </a:solidFill>
+            <a:prstDash val="sysDash"/>
+            <a:tailEnd type="triangle"/>
+          </a:ln>
+        </p:spPr>
+        <p:style>
+          <a:lnRef idx="2">
+            <a:schemeClr val="accent1"/>
+          </a:lnRef>
+          <a:fillRef idx="0">
+            <a:schemeClr val="accent1"/>
+          </a:fillRef>
+          <a:effectRef idx="1">
+            <a:schemeClr val="accent1"/>
+          </a:effectRef>
+          <a:fontRef idx="minor">
+            <a:schemeClr val="tx1"/>
+          </a:fontRef>
+        </p:style>
+      </p:cxnSp>
+      <p:cxnSp>
+        <p:nvCxnSpPr>
+          <p:cNvPr id="101" name="Straight Arrow Connector 100">
+            <a:extLst>
+              <a:ext uri="{FF2B5EF4-FFF2-40B4-BE49-F238E27FC236}">
+                <a16:creationId xmlns:a16="http://schemas.microsoft.com/office/drawing/2014/main" id="{15C27891-9F8B-F74B-8592-1EBD9FD94B6D}"/>
+              </a:ext>
+            </a:extLst>
+          </p:cNvPr>
+          <p:cNvCxnSpPr>
+            <a:cxnSpLocks/>
+          </p:cNvCxnSpPr>
+          <p:nvPr/>
+        </p:nvCxnSpPr>
+        <p:spPr>
+          <a:xfrm flipH="1">
+            <a:off x="7949538" y="5395219"/>
+            <a:ext cx="713308" cy="8316"/>
+          </a:xfrm>
+          <a:prstGeom prst="straightConnector1">
+            <a:avLst/>
+          </a:prstGeom>
+          <a:ln w="19050">
+            <a:solidFill>
+              <a:schemeClr val="tx2">
+                <a:lumMod val="50000"/>
+                <a:lumOff val="50000"/>
+              </a:schemeClr>
+            </a:solidFill>
+            <a:prstDash val="sysDash"/>
+            <a:tailEnd type="triangle"/>
+          </a:ln>
+        </p:spPr>
+        <p:style>
+          <a:lnRef idx="1">
+            <a:schemeClr val="accent5"/>
+          </a:lnRef>
+          <a:fillRef idx="0">
+            <a:schemeClr val="accent5"/>
+          </a:fillRef>
+          <a:effectRef idx="0">
+            <a:schemeClr val="accent5"/>
+          </a:effectRef>
+          <a:fontRef idx="minor">
+            <a:schemeClr val="tx1"/>
+          </a:fontRef>
+        </p:style>
+      </p:cxnSp>
+      <p:sp>
+        <p:nvSpPr>
+          <p:cNvPr id="104" name="TextBox 103">
+            <a:extLst>
+              <a:ext uri="{FF2B5EF4-FFF2-40B4-BE49-F238E27FC236}">
+                <a16:creationId xmlns:a16="http://schemas.microsoft.com/office/drawing/2014/main" id="{29664D33-DAFA-AAE7-077E-3AAF16C6A311}"/>
+              </a:ext>
+            </a:extLst>
+          </p:cNvPr>
+          <p:cNvSpPr txBox="1"/>
+          <p:nvPr/>
+        </p:nvSpPr>
+        <p:spPr>
+          <a:xfrm>
+            <a:off x="8744815" y="5286702"/>
+            <a:ext cx="1595515" cy="261610"/>
+          </a:xfrm>
+          <a:prstGeom prst="rect">
+            <a:avLst/>
+          </a:prstGeom>
+          <a:noFill/>
+        </p:spPr>
+        <p:txBody>
+          <a:bodyPr wrap="square" rtlCol="0">
+            <a:spAutoFit/>
+          </a:bodyPr>
+          <a:lstStyle/>
+          <a:p>
+            <a:r>
+              <a:rPr lang="en-US" sz="1100" b="1" dirty="0"/>
+              <a:t>PLC output coil state</a:t>
+            </a:r>
+            <a:endParaRPr lang="en-SG" sz="1100" b="1" dirty="0"/>
+          </a:p>
+        </p:txBody>
+      </p:sp>
+    </p:spTree>
+    <p:extLst>
+      <p:ext uri="{BB962C8B-B14F-4D97-AF65-F5344CB8AC3E}">
+        <p14:creationId xmlns:p14="http://schemas.microsoft.com/office/powerpoint/2010/main" val="761789877"/>
       </p:ext>
     </p:extLst>
   </p:cSld>

</xml_diff>